<commit_message>
Plan de seguridad equipo 9
</commit_message>
<xml_diff>
--- a/Clase 25 - Seguriddad/Consignas/C25 - Actividad Seguridad y Auditoria ( Copiar 1 x camada - tiene 11 mesas).pptx
+++ b/Clase 25 - Seguriddad/Consignas/C25 - Actividad Seguridad y Auditoria ( Copiar 1 x camada - tiene 11 mesas).pptx
@@ -1,44 +1,44 @@
 
 <file path=ppt/presentation.xml><?xml version="1.0" encoding="utf-8"?>
-<p:presentation xmlns:a="http://schemas.openxmlformats.org/drawingml/2006/main" xmlns:r="http://schemas.openxmlformats.org/officeDocument/2006/relationships" xmlns:mc="http://schemas.openxmlformats.org/markup-compatibility/2006" xmlns:mv="urn:schemas-microsoft-com:mac:vml" xmlns:p="http://schemas.openxmlformats.org/presentationml/2006/main" xmlns:c="http://schemas.openxmlformats.org/drawingml/2006/chart" xmlns:dgm="http://schemas.openxmlformats.org/drawingml/2006/diagram" xmlns:o="urn:schemas-microsoft-com:office:office" xmlns:v="urn:schemas-microsoft-com:vml" xmlns:pvml="urn:schemas-microsoft-com:office:powerpoint" xmlns:com="http://schemas.openxmlformats.org/drawingml/2006/compatibility" xmlns:p14="http://schemas.microsoft.com/office/powerpoint/2010/main" xmlns:p15="http://schemas.microsoft.com/office/powerpoint/2012/main" xmlns:ahyp="http://schemas.microsoft.com/office/drawing/2018/hyperlinkcolor" autoCompressPictures="0" embedTrueTypeFonts="1" strictFirstAndLastChars="0" saveSubsetFonts="1">
+<p:presentation xmlns:a="http://schemas.openxmlformats.org/drawingml/2006/main" xmlns:r="http://schemas.openxmlformats.org/officeDocument/2006/relationships" xmlns:p="http://schemas.openxmlformats.org/presentationml/2006/main" strictFirstAndLastChars="0" embedTrueTypeFonts="1" saveSubsetFonts="1" autoCompressPictures="0">
   <p:sldMasterIdLst>
-    <p:sldMasterId id="2147483661" r:id="rId4"/>
+    <p:sldMasterId id="2147483661" r:id="rId1"/>
   </p:sldMasterIdLst>
   <p:notesMasterIdLst>
-    <p:notesMasterId r:id="rId5"/>
+    <p:notesMasterId r:id="rId14"/>
   </p:notesMasterIdLst>
   <p:sldIdLst>
-    <p:sldId id="256" r:id="rId6"/>
-    <p:sldId id="257" r:id="rId7"/>
-    <p:sldId id="258" r:id="rId8"/>
-    <p:sldId id="259" r:id="rId9"/>
-    <p:sldId id="260" r:id="rId10"/>
-    <p:sldId id="261" r:id="rId11"/>
-    <p:sldId id="262" r:id="rId12"/>
-    <p:sldId id="263" r:id="rId13"/>
-    <p:sldId id="264" r:id="rId14"/>
-    <p:sldId id="265" r:id="rId15"/>
-    <p:sldId id="266" r:id="rId16"/>
-    <p:sldId id="267" r:id="rId17"/>
+    <p:sldId id="256" r:id="rId2"/>
+    <p:sldId id="257" r:id="rId3"/>
+    <p:sldId id="258" r:id="rId4"/>
+    <p:sldId id="259" r:id="rId5"/>
+    <p:sldId id="260" r:id="rId6"/>
+    <p:sldId id="261" r:id="rId7"/>
+    <p:sldId id="262" r:id="rId8"/>
+    <p:sldId id="263" r:id="rId9"/>
+    <p:sldId id="264" r:id="rId10"/>
+    <p:sldId id="265" r:id="rId11"/>
+    <p:sldId id="266" r:id="rId12"/>
+    <p:sldId id="267" r:id="rId13"/>
   </p:sldIdLst>
-  <p:sldSz cy="5143500" cx="9144000"/>
+  <p:sldSz cx="9144000" cy="5143500" type="screen16x9"/>
   <p:notesSz cx="6858000" cy="9144000"/>
   <p:embeddedFontLst>
     <p:embeddedFont>
-      <p:font typeface="Rajdhani"/>
-      <p:regular r:id="rId18"/>
-      <p:bold r:id="rId19"/>
+      <p:font typeface="Open Sans" panose="020B0606030504020204" pitchFamily="34" charset="0"/>
+      <p:regular r:id="rId15"/>
+      <p:bold r:id="rId16"/>
+      <p:italic r:id="rId17"/>
+      <p:boldItalic r:id="rId18"/>
     </p:embeddedFont>
     <p:embeddedFont>
-      <p:font typeface="Open Sans"/>
-      <p:regular r:id="rId20"/>
-      <p:bold r:id="rId21"/>
-      <p:italic r:id="rId22"/>
-      <p:boldItalic r:id="rId23"/>
+      <p:font typeface="Rajdhani" panose="020B0604020202020204" charset="0"/>
+      <p:regular r:id="rId19"/>
+      <p:bold r:id="rId20"/>
     </p:embeddedFont>
   </p:embeddedFontLst>
   <p:defaultTextStyle>
-    <a:defPPr lvl="0" marR="0" rtl="0" algn="l">
+    <a:defPPr marR="0" lvl="0" algn="l" rtl="0">
       <a:lnSpc>
         <a:spcPct val="100000"/>
       </a:lnSpc>
@@ -49,7 +49,7 @@
         <a:spcPts val="0"/>
       </a:spcAft>
     </a:defPPr>
-    <a:lvl1pPr lvl="0" marR="0" rtl="0" algn="l">
+    <a:lvl1pPr marR="0" lvl="0" algn="l" rtl="0">
       <a:lnSpc>
         <a:spcPct val="100000"/>
       </a:lnSpc>
@@ -63,7 +63,7 @@
         <a:srgbClr val="000000"/>
       </a:buClr>
       <a:buFont typeface="Arial"/>
-      <a:defRPr b="0" i="0" sz="1400" u="none" cap="none" strike="noStrike">
+      <a:defRPr sz="1400" b="0" i="0" u="none" strike="noStrike" cap="none">
         <a:solidFill>
           <a:srgbClr val="000000"/>
         </a:solidFill>
@@ -73,7 +73,7 @@
         <a:sym typeface="Arial"/>
       </a:defRPr>
     </a:lvl1pPr>
-    <a:lvl2pPr lvl="1" marR="0" rtl="0" algn="l">
+    <a:lvl2pPr marR="0" lvl="1" algn="l" rtl="0">
       <a:lnSpc>
         <a:spcPct val="100000"/>
       </a:lnSpc>
@@ -87,7 +87,7 @@
         <a:srgbClr val="000000"/>
       </a:buClr>
       <a:buFont typeface="Arial"/>
-      <a:defRPr b="0" i="0" sz="1400" u="none" cap="none" strike="noStrike">
+      <a:defRPr sz="1400" b="0" i="0" u="none" strike="noStrike" cap="none">
         <a:solidFill>
           <a:srgbClr val="000000"/>
         </a:solidFill>
@@ -97,7 +97,7 @@
         <a:sym typeface="Arial"/>
       </a:defRPr>
     </a:lvl2pPr>
-    <a:lvl3pPr lvl="2" marR="0" rtl="0" algn="l">
+    <a:lvl3pPr marR="0" lvl="2" algn="l" rtl="0">
       <a:lnSpc>
         <a:spcPct val="100000"/>
       </a:lnSpc>
@@ -111,7 +111,7 @@
         <a:srgbClr val="000000"/>
       </a:buClr>
       <a:buFont typeface="Arial"/>
-      <a:defRPr b="0" i="0" sz="1400" u="none" cap="none" strike="noStrike">
+      <a:defRPr sz="1400" b="0" i="0" u="none" strike="noStrike" cap="none">
         <a:solidFill>
           <a:srgbClr val="000000"/>
         </a:solidFill>
@@ -121,7 +121,7 @@
         <a:sym typeface="Arial"/>
       </a:defRPr>
     </a:lvl3pPr>
-    <a:lvl4pPr lvl="3" marR="0" rtl="0" algn="l">
+    <a:lvl4pPr marR="0" lvl="3" algn="l" rtl="0">
       <a:lnSpc>
         <a:spcPct val="100000"/>
       </a:lnSpc>
@@ -135,7 +135,7 @@
         <a:srgbClr val="000000"/>
       </a:buClr>
       <a:buFont typeface="Arial"/>
-      <a:defRPr b="0" i="0" sz="1400" u="none" cap="none" strike="noStrike">
+      <a:defRPr sz="1400" b="0" i="0" u="none" strike="noStrike" cap="none">
         <a:solidFill>
           <a:srgbClr val="000000"/>
         </a:solidFill>
@@ -145,7 +145,7 @@
         <a:sym typeface="Arial"/>
       </a:defRPr>
     </a:lvl4pPr>
-    <a:lvl5pPr lvl="4" marR="0" rtl="0" algn="l">
+    <a:lvl5pPr marR="0" lvl="4" algn="l" rtl="0">
       <a:lnSpc>
         <a:spcPct val="100000"/>
       </a:lnSpc>
@@ -159,7 +159,7 @@
         <a:srgbClr val="000000"/>
       </a:buClr>
       <a:buFont typeface="Arial"/>
-      <a:defRPr b="0" i="0" sz="1400" u="none" cap="none" strike="noStrike">
+      <a:defRPr sz="1400" b="0" i="0" u="none" strike="noStrike" cap="none">
         <a:solidFill>
           <a:srgbClr val="000000"/>
         </a:solidFill>
@@ -169,7 +169,7 @@
         <a:sym typeface="Arial"/>
       </a:defRPr>
     </a:lvl5pPr>
-    <a:lvl6pPr lvl="5" marR="0" rtl="0" algn="l">
+    <a:lvl6pPr marR="0" lvl="5" algn="l" rtl="0">
       <a:lnSpc>
         <a:spcPct val="100000"/>
       </a:lnSpc>
@@ -183,7 +183,7 @@
         <a:srgbClr val="000000"/>
       </a:buClr>
       <a:buFont typeface="Arial"/>
-      <a:defRPr b="0" i="0" sz="1400" u="none" cap="none" strike="noStrike">
+      <a:defRPr sz="1400" b="0" i="0" u="none" strike="noStrike" cap="none">
         <a:solidFill>
           <a:srgbClr val="000000"/>
         </a:solidFill>
@@ -193,7 +193,7 @@
         <a:sym typeface="Arial"/>
       </a:defRPr>
     </a:lvl6pPr>
-    <a:lvl7pPr lvl="6" marR="0" rtl="0" algn="l">
+    <a:lvl7pPr marR="0" lvl="6" algn="l" rtl="0">
       <a:lnSpc>
         <a:spcPct val="100000"/>
       </a:lnSpc>
@@ -207,7 +207,7 @@
         <a:srgbClr val="000000"/>
       </a:buClr>
       <a:buFont typeface="Arial"/>
-      <a:defRPr b="0" i="0" sz="1400" u="none" cap="none" strike="noStrike">
+      <a:defRPr sz="1400" b="0" i="0" u="none" strike="noStrike" cap="none">
         <a:solidFill>
           <a:srgbClr val="000000"/>
         </a:solidFill>
@@ -217,7 +217,7 @@
         <a:sym typeface="Arial"/>
       </a:defRPr>
     </a:lvl7pPr>
-    <a:lvl8pPr lvl="7" marR="0" rtl="0" algn="l">
+    <a:lvl8pPr marR="0" lvl="7" algn="l" rtl="0">
       <a:lnSpc>
         <a:spcPct val="100000"/>
       </a:lnSpc>
@@ -231,7 +231,7 @@
         <a:srgbClr val="000000"/>
       </a:buClr>
       <a:buFont typeface="Arial"/>
-      <a:defRPr b="0" i="0" sz="1400" u="none" cap="none" strike="noStrike">
+      <a:defRPr sz="1400" b="0" i="0" u="none" strike="noStrike" cap="none">
         <a:solidFill>
           <a:srgbClr val="000000"/>
         </a:solidFill>
@@ -241,7 +241,7 @@
         <a:sym typeface="Arial"/>
       </a:defRPr>
     </a:lvl8pPr>
-    <a:lvl9pPr lvl="8" marR="0" rtl="0" algn="l">
+    <a:lvl9pPr marR="0" lvl="8" algn="l" rtl="0">
       <a:lnSpc>
         <a:spcPct val="100000"/>
       </a:lnSpc>
@@ -255,7 +255,7 @@
         <a:srgbClr val="000000"/>
       </a:buClr>
       <a:buFont typeface="Arial"/>
-      <a:defRPr b="0" i="0" sz="1400" u="none" cap="none" strike="noStrike">
+      <a:defRPr sz="1400" b="0" i="0" u="none" strike="noStrike" cap="none">
         <a:solidFill>
           <a:srgbClr val="000000"/>
         </a:solidFill>
@@ -268,7 +268,7 @@
   </p:defaultTextStyle>
   <p:extLst>
     <p:ext uri="{EFAFB233-063F-42B5-8137-9DF3F51BA10A}">
-      <p15:sldGuideLst>
+      <p15:sldGuideLst xmlns:p15="http://schemas.microsoft.com/office/powerpoint/2012/main">
         <p15:guide id="1" orient="horz" pos="1620">
           <p15:clr>
             <a:srgbClr val="A4A3A4"/>
@@ -286,11 +286,16 @@
 </file>
 
 <file path=ppt/notesMasters/notesMaster1.xml><?xml version="1.0" encoding="utf-8"?>
-<p:notesMaster xmlns:a="http://schemas.openxmlformats.org/drawingml/2006/main" xmlns:r="http://schemas.openxmlformats.org/officeDocument/2006/relationships" xmlns:mc="http://schemas.openxmlformats.org/markup-compatibility/2006" xmlns:mv="urn:schemas-microsoft-com:mac:vml" xmlns:p="http://schemas.openxmlformats.org/presentationml/2006/main" xmlns:c="http://schemas.openxmlformats.org/drawingml/2006/chart" xmlns:dgm="http://schemas.openxmlformats.org/drawingml/2006/diagram" xmlns:o="urn:schemas-microsoft-com:office:office" xmlns:v="urn:schemas-microsoft-com:vml" xmlns:pvml="urn:schemas-microsoft-com:office:powerpoint" xmlns:com="http://schemas.openxmlformats.org/drawingml/2006/compatibility" xmlns:p14="http://schemas.microsoft.com/office/powerpoint/2010/main" xmlns:p15="http://schemas.microsoft.com/office/powerpoint/2012/main" xmlns:ahyp="http://schemas.microsoft.com/office/drawing/2018/hyperlinkcolor">
+<p:notesMaster xmlns:a="http://schemas.openxmlformats.org/drawingml/2006/main" xmlns:r="http://schemas.openxmlformats.org/officeDocument/2006/relationships" xmlns:p="http://schemas.openxmlformats.org/presentationml/2006/main">
   <p:cSld>
+    <p:bg>
+      <p:bgRef idx="1001">
+        <a:schemeClr val="bg1"/>
+      </p:bgRef>
+    </p:bg>
     <p:spTree>
       <p:nvGrpSpPr>
-        <p:cNvPr id="2" name="Shape 2"/>
+        <p:cNvPr id="1" name="Shape 2"/>
         <p:cNvGrpSpPr/>
         <p:nvPr/>
       </p:nvGrpSpPr>
@@ -305,9 +310,11 @@
       <p:sp>
         <p:nvSpPr>
           <p:cNvPr id="3" name="Google Shape;3;n"/>
-          <p:cNvSpPr/>
+          <p:cNvSpPr>
+            <a:spLocks noGrp="1" noRot="1" noChangeAspect="1"/>
+          </p:cNvSpPr>
           <p:nvPr>
-            <p:ph idx="2" type="sldImg"/>
+            <p:ph type="sldImg" idx="2"/>
           </p:nvPr>
         </p:nvSpPr>
         <p:spPr>
@@ -316,9 +323,13 @@
             <a:ext cx="6096075" cy="3429000"/>
           </a:xfrm>
           <a:custGeom>
-            <a:rect b="b" l="l" r="r" t="t"/>
+            <a:avLst/>
+            <a:gdLst/>
+            <a:ahLst/>
+            <a:cxnLst/>
+            <a:rect l="l" t="t" r="r" b="b"/>
             <a:pathLst>
-              <a:path extrusionOk="0" h="120000" w="120000">
+              <a:path w="120000" h="120000" extrusionOk="0">
                 <a:moveTo>
                   <a:pt x="0" y="0"/>
                 </a:moveTo>
@@ -336,23 +347,25 @@
             </a:pathLst>
           </a:custGeom>
           <a:noFill/>
-          <a:ln cap="flat" cmpd="sng" w="9525">
+          <a:ln w="9525" cap="flat" cmpd="sng">
             <a:solidFill>
               <a:srgbClr val="000000"/>
             </a:solidFill>
             <a:prstDash val="solid"/>
             <a:round/>
-            <a:headEnd len="sm" w="sm" type="none"/>
-            <a:tailEnd len="sm" w="sm" type="none"/>
+            <a:headEnd type="none" w="sm" len="sm"/>
+            <a:tailEnd type="none" w="sm" len="sm"/>
           </a:ln>
         </p:spPr>
       </p:sp>
       <p:sp>
         <p:nvSpPr>
           <p:cNvPr id="4" name="Google Shape;4;n"/>
-          <p:cNvSpPr txBox="1"/>
+          <p:cNvSpPr txBox="1">
+            <a:spLocks noGrp="1"/>
+          </p:cNvSpPr>
           <p:nvPr>
-            <p:ph idx="1" type="body"/>
+            <p:ph type="body" idx="1"/>
           </p:nvPr>
         </p:nvSpPr>
         <p:spPr>
@@ -369,11 +382,11 @@
           </a:ln>
         </p:spPr>
         <p:txBody>
-          <a:bodyPr anchorCtr="0" anchor="t" bIns="91425" lIns="91425" spcFirstLastPara="1" rIns="91425" wrap="square" tIns="91425">
+          <a:bodyPr spcFirstLastPara="1" wrap="square" lIns="91425" tIns="91425" rIns="91425" bIns="91425" anchor="t" anchorCtr="0">
             <a:noAutofit/>
           </a:bodyPr>
           <a:lstStyle>
-            <a:lvl1pPr indent="-298450" lvl="0" marL="457200">
+            <a:lvl1pPr marL="457200" lvl="0" indent="-298450">
               <a:spcBef>
                 <a:spcPts val="0"/>
               </a:spcBef>
@@ -384,7 +397,7 @@
               <a:buChar char="●"/>
               <a:defRPr sz="1100"/>
             </a:lvl1pPr>
-            <a:lvl2pPr indent="-298450" lvl="1" marL="914400">
+            <a:lvl2pPr marL="914400" lvl="1" indent="-298450">
               <a:spcBef>
                 <a:spcPts val="0"/>
               </a:spcBef>
@@ -395,7 +408,7 @@
               <a:buChar char="○"/>
               <a:defRPr sz="1100"/>
             </a:lvl2pPr>
-            <a:lvl3pPr indent="-298450" lvl="2" marL="1371600">
+            <a:lvl3pPr marL="1371600" lvl="2" indent="-298450">
               <a:spcBef>
                 <a:spcPts val="0"/>
               </a:spcBef>
@@ -406,7 +419,7 @@
               <a:buChar char="■"/>
               <a:defRPr sz="1100"/>
             </a:lvl3pPr>
-            <a:lvl4pPr indent="-298450" lvl="3" marL="1828800">
+            <a:lvl4pPr marL="1828800" lvl="3" indent="-298450">
               <a:spcBef>
                 <a:spcPts val="0"/>
               </a:spcBef>
@@ -417,7 +430,7 @@
               <a:buChar char="●"/>
               <a:defRPr sz="1100"/>
             </a:lvl4pPr>
-            <a:lvl5pPr indent="-298450" lvl="4" marL="2286000">
+            <a:lvl5pPr marL="2286000" lvl="4" indent="-298450">
               <a:spcBef>
                 <a:spcPts val="0"/>
               </a:spcBef>
@@ -428,7 +441,7 @@
               <a:buChar char="○"/>
               <a:defRPr sz="1100"/>
             </a:lvl5pPr>
-            <a:lvl6pPr indent="-298450" lvl="5" marL="2743200">
+            <a:lvl6pPr marL="2743200" lvl="5" indent="-298450">
               <a:spcBef>
                 <a:spcPts val="0"/>
               </a:spcBef>
@@ -439,7 +452,7 @@
               <a:buChar char="■"/>
               <a:defRPr sz="1100"/>
             </a:lvl6pPr>
-            <a:lvl7pPr indent="-298450" lvl="6" marL="3200400">
+            <a:lvl7pPr marL="3200400" lvl="6" indent="-298450">
               <a:spcBef>
                 <a:spcPts val="0"/>
               </a:spcBef>
@@ -450,7 +463,7 @@
               <a:buChar char="●"/>
               <a:defRPr sz="1100"/>
             </a:lvl7pPr>
-            <a:lvl8pPr indent="-298450" lvl="7" marL="3657600">
+            <a:lvl8pPr marL="3657600" lvl="7" indent="-298450">
               <a:spcBef>
                 <a:spcPts val="0"/>
               </a:spcBef>
@@ -461,7 +474,7 @@
               <a:buChar char="○"/>
               <a:defRPr sz="1100"/>
             </a:lvl8pPr>
-            <a:lvl9pPr indent="-298450" lvl="8" marL="4114800">
+            <a:lvl9pPr marL="4114800" lvl="8" indent="-298450">
               <a:spcBef>
                 <a:spcPts val="0"/>
               </a:spcBef>
@@ -473,14 +486,16 @@
               <a:defRPr sz="1100"/>
             </a:lvl9pPr>
           </a:lstStyle>
-          <a:p/>
+          <a:p>
+            <a:endParaRPr/>
+          </a:p>
         </p:txBody>
       </p:sp>
     </p:spTree>
   </p:cSld>
-  <p:clrMap accent1="accent1" accent2="accent2" accent3="accent3" accent4="accent4" accent5="accent5" accent6="accent6" bg1="lt1" bg2="dk2" tx1="dk1" tx2="lt2" folHlink="folHlink" hlink="hlink"/>
+  <p:clrMap bg1="lt1" tx1="dk1" bg2="dk2" tx2="lt2" accent1="accent1" accent2="accent2" accent3="accent3" accent4="accent4" accent5="accent5" accent6="accent6" hlink="hlink" folHlink="folHlink"/>
   <p:notesStyle>
-    <a:defPPr lvl="0" marR="0" rtl="0" algn="l">
+    <a:defPPr marR="0" lvl="0" algn="l" rtl="0">
       <a:lnSpc>
         <a:spcPct val="100000"/>
       </a:lnSpc>
@@ -491,7 +506,7 @@
         <a:spcPts val="0"/>
       </a:spcAft>
     </a:defPPr>
-    <a:lvl1pPr lvl="0" marR="0" rtl="0" algn="l">
+    <a:lvl1pPr marR="0" lvl="0" algn="l" rtl="0">
       <a:lnSpc>
         <a:spcPct val="100000"/>
       </a:lnSpc>
@@ -505,7 +520,7 @@
         <a:srgbClr val="000000"/>
       </a:buClr>
       <a:buFont typeface="Arial"/>
-      <a:defRPr b="0" i="0" sz="1400" u="none" cap="none" strike="noStrike">
+      <a:defRPr sz="1400" b="0" i="0" u="none" strike="noStrike" cap="none">
         <a:solidFill>
           <a:srgbClr val="000000"/>
         </a:solidFill>
@@ -515,7 +530,7 @@
         <a:sym typeface="Arial"/>
       </a:defRPr>
     </a:lvl1pPr>
-    <a:lvl2pPr lvl="1" marR="0" rtl="0" algn="l">
+    <a:lvl2pPr marR="0" lvl="1" algn="l" rtl="0">
       <a:lnSpc>
         <a:spcPct val="100000"/>
       </a:lnSpc>
@@ -529,7 +544,7 @@
         <a:srgbClr val="000000"/>
       </a:buClr>
       <a:buFont typeface="Arial"/>
-      <a:defRPr b="0" i="0" sz="1400" u="none" cap="none" strike="noStrike">
+      <a:defRPr sz="1400" b="0" i="0" u="none" strike="noStrike" cap="none">
         <a:solidFill>
           <a:srgbClr val="000000"/>
         </a:solidFill>
@@ -539,7 +554,7 @@
         <a:sym typeface="Arial"/>
       </a:defRPr>
     </a:lvl2pPr>
-    <a:lvl3pPr lvl="2" marR="0" rtl="0" algn="l">
+    <a:lvl3pPr marR="0" lvl="2" algn="l" rtl="0">
       <a:lnSpc>
         <a:spcPct val="100000"/>
       </a:lnSpc>
@@ -553,7 +568,7 @@
         <a:srgbClr val="000000"/>
       </a:buClr>
       <a:buFont typeface="Arial"/>
-      <a:defRPr b="0" i="0" sz="1400" u="none" cap="none" strike="noStrike">
+      <a:defRPr sz="1400" b="0" i="0" u="none" strike="noStrike" cap="none">
         <a:solidFill>
           <a:srgbClr val="000000"/>
         </a:solidFill>
@@ -563,7 +578,7 @@
         <a:sym typeface="Arial"/>
       </a:defRPr>
     </a:lvl3pPr>
-    <a:lvl4pPr lvl="3" marR="0" rtl="0" algn="l">
+    <a:lvl4pPr marR="0" lvl="3" algn="l" rtl="0">
       <a:lnSpc>
         <a:spcPct val="100000"/>
       </a:lnSpc>
@@ -577,7 +592,7 @@
         <a:srgbClr val="000000"/>
       </a:buClr>
       <a:buFont typeface="Arial"/>
-      <a:defRPr b="0" i="0" sz="1400" u="none" cap="none" strike="noStrike">
+      <a:defRPr sz="1400" b="0" i="0" u="none" strike="noStrike" cap="none">
         <a:solidFill>
           <a:srgbClr val="000000"/>
         </a:solidFill>
@@ -587,7 +602,7 @@
         <a:sym typeface="Arial"/>
       </a:defRPr>
     </a:lvl4pPr>
-    <a:lvl5pPr lvl="4" marR="0" rtl="0" algn="l">
+    <a:lvl5pPr marR="0" lvl="4" algn="l" rtl="0">
       <a:lnSpc>
         <a:spcPct val="100000"/>
       </a:lnSpc>
@@ -601,7 +616,7 @@
         <a:srgbClr val="000000"/>
       </a:buClr>
       <a:buFont typeface="Arial"/>
-      <a:defRPr b="0" i="0" sz="1400" u="none" cap="none" strike="noStrike">
+      <a:defRPr sz="1400" b="0" i="0" u="none" strike="noStrike" cap="none">
         <a:solidFill>
           <a:srgbClr val="000000"/>
         </a:solidFill>
@@ -611,7 +626,7 @@
         <a:sym typeface="Arial"/>
       </a:defRPr>
     </a:lvl5pPr>
-    <a:lvl6pPr lvl="5" marR="0" rtl="0" algn="l">
+    <a:lvl6pPr marR="0" lvl="5" algn="l" rtl="0">
       <a:lnSpc>
         <a:spcPct val="100000"/>
       </a:lnSpc>
@@ -625,7 +640,7 @@
         <a:srgbClr val="000000"/>
       </a:buClr>
       <a:buFont typeface="Arial"/>
-      <a:defRPr b="0" i="0" sz="1400" u="none" cap="none" strike="noStrike">
+      <a:defRPr sz="1400" b="0" i="0" u="none" strike="noStrike" cap="none">
         <a:solidFill>
           <a:srgbClr val="000000"/>
         </a:solidFill>
@@ -635,7 +650,7 @@
         <a:sym typeface="Arial"/>
       </a:defRPr>
     </a:lvl6pPr>
-    <a:lvl7pPr lvl="6" marR="0" rtl="0" algn="l">
+    <a:lvl7pPr marR="0" lvl="6" algn="l" rtl="0">
       <a:lnSpc>
         <a:spcPct val="100000"/>
       </a:lnSpc>
@@ -649,7 +664,7 @@
         <a:srgbClr val="000000"/>
       </a:buClr>
       <a:buFont typeface="Arial"/>
-      <a:defRPr b="0" i="0" sz="1400" u="none" cap="none" strike="noStrike">
+      <a:defRPr sz="1400" b="0" i="0" u="none" strike="noStrike" cap="none">
         <a:solidFill>
           <a:srgbClr val="000000"/>
         </a:solidFill>
@@ -659,7 +674,7 @@
         <a:sym typeface="Arial"/>
       </a:defRPr>
     </a:lvl7pPr>
-    <a:lvl8pPr lvl="7" marR="0" rtl="0" algn="l">
+    <a:lvl8pPr marR="0" lvl="7" algn="l" rtl="0">
       <a:lnSpc>
         <a:spcPct val="100000"/>
       </a:lnSpc>
@@ -673,7 +688,7 @@
         <a:srgbClr val="000000"/>
       </a:buClr>
       <a:buFont typeface="Arial"/>
-      <a:defRPr b="0" i="0" sz="1400" u="none" cap="none" strike="noStrike">
+      <a:defRPr sz="1400" b="0" i="0" u="none" strike="noStrike" cap="none">
         <a:solidFill>
           <a:srgbClr val="000000"/>
         </a:solidFill>
@@ -683,7 +698,7 @@
         <a:sym typeface="Arial"/>
       </a:defRPr>
     </a:lvl8pPr>
-    <a:lvl9pPr lvl="8" marR="0" rtl="0" algn="l">
+    <a:lvl9pPr marR="0" lvl="8" algn="l" rtl="0">
       <a:lnSpc>
         <a:spcPct val="100000"/>
       </a:lnSpc>
@@ -697,7 +712,7 @@
         <a:srgbClr val="000000"/>
       </a:buClr>
       <a:buFont typeface="Arial"/>
-      <a:defRPr b="0" i="0" sz="1400" u="none" cap="none" strike="noStrike">
+      <a:defRPr sz="1400" b="0" i="0" u="none" strike="noStrike" cap="none">
         <a:solidFill>
           <a:srgbClr val="000000"/>
         </a:solidFill>
@@ -712,11 +727,11 @@
 </file>
 
 <file path=ppt/notesSlides/notesSlide1.xml><?xml version="1.0" encoding="utf-8"?>
-<p:notes xmlns:a="http://schemas.openxmlformats.org/drawingml/2006/main" xmlns:r="http://schemas.openxmlformats.org/officeDocument/2006/relationships" xmlns:mc="http://schemas.openxmlformats.org/markup-compatibility/2006" xmlns:mv="urn:schemas-microsoft-com:mac:vml" xmlns:p="http://schemas.openxmlformats.org/presentationml/2006/main" xmlns:c="http://schemas.openxmlformats.org/drawingml/2006/chart" xmlns:dgm="http://schemas.openxmlformats.org/drawingml/2006/diagram" xmlns:o="urn:schemas-microsoft-com:office:office" xmlns:v="urn:schemas-microsoft-com:vml" xmlns:pvml="urn:schemas-microsoft-com:office:powerpoint" xmlns:com="http://schemas.openxmlformats.org/drawingml/2006/compatibility" xmlns:p14="http://schemas.microsoft.com/office/powerpoint/2010/main" xmlns:p15="http://schemas.microsoft.com/office/powerpoint/2012/main" xmlns:ahyp="http://schemas.microsoft.com/office/drawing/2018/hyperlinkcolor" showMasterPhAnim="0" showMasterSp="0">
+<p:notes xmlns:a="http://schemas.openxmlformats.org/drawingml/2006/main" xmlns:r="http://schemas.openxmlformats.org/officeDocument/2006/relationships" xmlns:p="http://schemas.openxmlformats.org/presentationml/2006/main" showMasterSp="0" showMasterPhAnim="0">
   <p:cSld>
     <p:spTree>
       <p:nvGrpSpPr>
-        <p:cNvPr id="49" name="Shape 49"/>
+        <p:cNvPr id="1" name="Shape 49"/>
         <p:cNvGrpSpPr/>
         <p:nvPr/>
       </p:nvGrpSpPr>
@@ -731,9 +746,11 @@
       <p:sp>
         <p:nvSpPr>
           <p:cNvPr id="50" name="Google Shape;50;p:notes"/>
-          <p:cNvSpPr/>
+          <p:cNvSpPr>
+            <a:spLocks noGrp="1" noRot="1" noChangeAspect="1"/>
+          </p:cNvSpPr>
           <p:nvPr>
-            <p:ph idx="2" type="sldImg"/>
+            <p:ph type="sldImg" idx="2"/>
           </p:nvPr>
         </p:nvSpPr>
         <p:spPr>
@@ -742,9 +759,13 @@
             <a:ext cx="6096075" cy="3429000"/>
           </a:xfrm>
           <a:custGeom>
-            <a:rect b="b" l="l" r="r" t="t"/>
+            <a:avLst/>
+            <a:gdLst/>
+            <a:ahLst/>
+            <a:cxnLst/>
+            <a:rect l="l" t="t" r="r" b="b"/>
             <a:pathLst>
-              <a:path extrusionOk="0" h="120000" w="120000">
+              <a:path w="120000" h="120000" extrusionOk="0">
                 <a:moveTo>
                   <a:pt x="0" y="0"/>
                 </a:moveTo>
@@ -766,9 +787,11 @@
       <p:sp>
         <p:nvSpPr>
           <p:cNvPr id="51" name="Google Shape;51;p:notes"/>
-          <p:cNvSpPr txBox="1"/>
+          <p:cNvSpPr txBox="1">
+            <a:spLocks noGrp="1"/>
+          </p:cNvSpPr>
           <p:nvPr>
-            <p:ph idx="1" type="body"/>
+            <p:ph type="body" idx="1"/>
           </p:nvPr>
         </p:nvSpPr>
         <p:spPr>
@@ -781,12 +804,12 @@
           </a:prstGeom>
         </p:spPr>
         <p:txBody>
-          <a:bodyPr anchorCtr="0" anchor="t" bIns="91425" lIns="91425" spcFirstLastPara="1" rIns="91425" wrap="square" tIns="91425">
+          <a:bodyPr spcFirstLastPara="1" wrap="square" lIns="91425" tIns="91425" rIns="91425" bIns="91425" anchor="t" anchorCtr="0">
             <a:noAutofit/>
           </a:bodyPr>
           <a:lstStyle/>
           <a:p>
-            <a:pPr indent="0" lvl="0" marL="0" rtl="0" algn="l">
+            <a:pPr marL="0" lvl="0" indent="0" algn="l" rtl="0">
               <a:spcBef>
                 <a:spcPts val="0"/>
               </a:spcBef>
@@ -795,9 +818,6 @@
               </a:spcAft>
               <a:buNone/>
             </a:pPr>
-            <a:r>
-              <a:t/>
-            </a:r>
             <a:endParaRPr/>
           </a:p>
         </p:txBody>
@@ -811,11 +831,11 @@
 </file>
 
 <file path=ppt/notesSlides/notesSlide10.xml><?xml version="1.0" encoding="utf-8"?>
-<p:notes xmlns:a="http://schemas.openxmlformats.org/drawingml/2006/main" xmlns:r="http://schemas.openxmlformats.org/officeDocument/2006/relationships" xmlns:mc="http://schemas.openxmlformats.org/markup-compatibility/2006" xmlns:mv="urn:schemas-microsoft-com:mac:vml" xmlns:p="http://schemas.openxmlformats.org/presentationml/2006/main" xmlns:c="http://schemas.openxmlformats.org/drawingml/2006/chart" xmlns:dgm="http://schemas.openxmlformats.org/drawingml/2006/diagram" xmlns:o="urn:schemas-microsoft-com:office:office" xmlns:v="urn:schemas-microsoft-com:vml" xmlns:pvml="urn:schemas-microsoft-com:office:powerpoint" xmlns:com="http://schemas.openxmlformats.org/drawingml/2006/compatibility" xmlns:p14="http://schemas.microsoft.com/office/powerpoint/2010/main" xmlns:p15="http://schemas.microsoft.com/office/powerpoint/2012/main" xmlns:ahyp="http://schemas.microsoft.com/office/drawing/2018/hyperlinkcolor" showMasterPhAnim="0" showMasterSp="0">
+<p:notes xmlns:a="http://schemas.openxmlformats.org/drawingml/2006/main" xmlns:r="http://schemas.openxmlformats.org/officeDocument/2006/relationships" xmlns:p="http://schemas.openxmlformats.org/presentationml/2006/main" showMasterSp="0" showMasterPhAnim="0">
   <p:cSld>
     <p:spTree>
       <p:nvGrpSpPr>
-        <p:cNvPr id="105" name="Shape 105"/>
+        <p:cNvPr id="1" name="Shape 105"/>
         <p:cNvGrpSpPr/>
         <p:nvPr/>
       </p:nvGrpSpPr>
@@ -830,20 +850,26 @@
       <p:sp>
         <p:nvSpPr>
           <p:cNvPr id="106" name="Google Shape;106;ge445934713_0_35:notes"/>
-          <p:cNvSpPr/>
+          <p:cNvSpPr>
+            <a:spLocks noGrp="1" noRot="1" noChangeAspect="1"/>
+          </p:cNvSpPr>
           <p:nvPr>
-            <p:ph idx="2" type="sldImg"/>
+            <p:ph type="sldImg" idx="2"/>
           </p:nvPr>
         </p:nvSpPr>
         <p:spPr>
           <a:xfrm>
-            <a:off x="381300" y="685800"/>
+            <a:off x="381000" y="685800"/>
             <a:ext cx="6096000" cy="3429000"/>
           </a:xfrm>
           <a:custGeom>
-            <a:rect b="b" l="l" r="r" t="t"/>
+            <a:avLst/>
+            <a:gdLst/>
+            <a:ahLst/>
+            <a:cxnLst/>
+            <a:rect l="l" t="t" r="r" b="b"/>
             <a:pathLst>
-              <a:path extrusionOk="0" h="120000" w="120000">
+              <a:path w="120000" h="120000" extrusionOk="0">
                 <a:moveTo>
                   <a:pt x="0" y="0"/>
                 </a:moveTo>
@@ -865,9 +891,11 @@
       <p:sp>
         <p:nvSpPr>
           <p:cNvPr id="107" name="Google Shape;107;ge445934713_0_35:notes"/>
-          <p:cNvSpPr txBox="1"/>
+          <p:cNvSpPr txBox="1">
+            <a:spLocks noGrp="1"/>
+          </p:cNvSpPr>
           <p:nvPr>
-            <p:ph idx="1" type="body"/>
+            <p:ph type="body" idx="1"/>
           </p:nvPr>
         </p:nvSpPr>
         <p:spPr>
@@ -880,12 +908,12 @@
           </a:prstGeom>
         </p:spPr>
         <p:txBody>
-          <a:bodyPr anchorCtr="0" anchor="t" bIns="91425" lIns="91425" spcFirstLastPara="1" rIns="91425" wrap="square" tIns="91425">
+          <a:bodyPr spcFirstLastPara="1" wrap="square" lIns="91425" tIns="91425" rIns="91425" bIns="91425" anchor="t" anchorCtr="0">
             <a:noAutofit/>
           </a:bodyPr>
           <a:lstStyle/>
           <a:p>
-            <a:pPr indent="0" lvl="0" marL="0" rtl="0" algn="l">
+            <a:pPr marL="0" lvl="0" indent="0" algn="l" rtl="0">
               <a:spcBef>
                 <a:spcPts val="0"/>
               </a:spcBef>
@@ -894,9 +922,6 @@
               </a:spcAft>
               <a:buNone/>
             </a:pPr>
-            <a:r>
-              <a:t/>
-            </a:r>
             <a:endParaRPr/>
           </a:p>
         </p:txBody>
@@ -910,11 +935,11 @@
 </file>
 
 <file path=ppt/notesSlides/notesSlide11.xml><?xml version="1.0" encoding="utf-8"?>
-<p:notes xmlns:a="http://schemas.openxmlformats.org/drawingml/2006/main" xmlns:r="http://schemas.openxmlformats.org/officeDocument/2006/relationships" xmlns:mc="http://schemas.openxmlformats.org/markup-compatibility/2006" xmlns:mv="urn:schemas-microsoft-com:mac:vml" xmlns:p="http://schemas.openxmlformats.org/presentationml/2006/main" xmlns:c="http://schemas.openxmlformats.org/drawingml/2006/chart" xmlns:dgm="http://schemas.openxmlformats.org/drawingml/2006/diagram" xmlns:o="urn:schemas-microsoft-com:office:office" xmlns:v="urn:schemas-microsoft-com:vml" xmlns:pvml="urn:schemas-microsoft-com:office:powerpoint" xmlns:com="http://schemas.openxmlformats.org/drawingml/2006/compatibility" xmlns:p14="http://schemas.microsoft.com/office/powerpoint/2010/main" xmlns:p15="http://schemas.microsoft.com/office/powerpoint/2012/main" xmlns:ahyp="http://schemas.microsoft.com/office/drawing/2018/hyperlinkcolor" showMasterPhAnim="0" showMasterSp="0">
+<p:notes xmlns:a="http://schemas.openxmlformats.org/drawingml/2006/main" xmlns:r="http://schemas.openxmlformats.org/officeDocument/2006/relationships" xmlns:p="http://schemas.openxmlformats.org/presentationml/2006/main" showMasterSp="0" showMasterPhAnim="0">
   <p:cSld>
     <p:spTree>
       <p:nvGrpSpPr>
-        <p:cNvPr id="111" name="Shape 111"/>
+        <p:cNvPr id="1" name="Shape 111"/>
         <p:cNvGrpSpPr/>
         <p:nvPr/>
       </p:nvGrpSpPr>
@@ -929,9 +954,11 @@
       <p:sp>
         <p:nvSpPr>
           <p:cNvPr id="112" name="Google Shape;112;ge445934713_0_40:notes"/>
-          <p:cNvSpPr/>
+          <p:cNvSpPr>
+            <a:spLocks noGrp="1" noRot="1" noChangeAspect="1"/>
+          </p:cNvSpPr>
           <p:nvPr>
-            <p:ph idx="2" type="sldImg"/>
+            <p:ph type="sldImg" idx="2"/>
           </p:nvPr>
         </p:nvSpPr>
         <p:spPr>
@@ -940,9 +967,13 @@
             <a:ext cx="6096000" cy="3429000"/>
           </a:xfrm>
           <a:custGeom>
-            <a:rect b="b" l="l" r="r" t="t"/>
+            <a:avLst/>
+            <a:gdLst/>
+            <a:ahLst/>
+            <a:cxnLst/>
+            <a:rect l="l" t="t" r="r" b="b"/>
             <a:pathLst>
-              <a:path extrusionOk="0" h="120000" w="120000">
+              <a:path w="120000" h="120000" extrusionOk="0">
                 <a:moveTo>
                   <a:pt x="0" y="0"/>
                 </a:moveTo>
@@ -964,9 +995,11 @@
       <p:sp>
         <p:nvSpPr>
           <p:cNvPr id="113" name="Google Shape;113;ge445934713_0_40:notes"/>
-          <p:cNvSpPr txBox="1"/>
+          <p:cNvSpPr txBox="1">
+            <a:spLocks noGrp="1"/>
+          </p:cNvSpPr>
           <p:nvPr>
-            <p:ph idx="1" type="body"/>
+            <p:ph type="body" idx="1"/>
           </p:nvPr>
         </p:nvSpPr>
         <p:spPr>
@@ -979,12 +1012,12 @@
           </a:prstGeom>
         </p:spPr>
         <p:txBody>
-          <a:bodyPr anchorCtr="0" anchor="t" bIns="91425" lIns="91425" spcFirstLastPara="1" rIns="91425" wrap="square" tIns="91425">
+          <a:bodyPr spcFirstLastPara="1" wrap="square" lIns="91425" tIns="91425" rIns="91425" bIns="91425" anchor="t" anchorCtr="0">
             <a:noAutofit/>
           </a:bodyPr>
           <a:lstStyle/>
           <a:p>
-            <a:pPr indent="0" lvl="0" marL="0" rtl="0" algn="l">
+            <a:pPr marL="0" lvl="0" indent="0" algn="l" rtl="0">
               <a:spcBef>
                 <a:spcPts val="0"/>
               </a:spcBef>
@@ -993,9 +1026,6 @@
               </a:spcAft>
               <a:buNone/>
             </a:pPr>
-            <a:r>
-              <a:t/>
-            </a:r>
             <a:endParaRPr/>
           </a:p>
         </p:txBody>
@@ -1009,11 +1039,11 @@
 </file>
 
 <file path=ppt/notesSlides/notesSlide12.xml><?xml version="1.0" encoding="utf-8"?>
-<p:notes xmlns:a="http://schemas.openxmlformats.org/drawingml/2006/main" xmlns:r="http://schemas.openxmlformats.org/officeDocument/2006/relationships" xmlns:mc="http://schemas.openxmlformats.org/markup-compatibility/2006" xmlns:mv="urn:schemas-microsoft-com:mac:vml" xmlns:p="http://schemas.openxmlformats.org/presentationml/2006/main" xmlns:c="http://schemas.openxmlformats.org/drawingml/2006/chart" xmlns:dgm="http://schemas.openxmlformats.org/drawingml/2006/diagram" xmlns:o="urn:schemas-microsoft-com:office:office" xmlns:v="urn:schemas-microsoft-com:vml" xmlns:pvml="urn:schemas-microsoft-com:office:powerpoint" xmlns:com="http://schemas.openxmlformats.org/drawingml/2006/compatibility" xmlns:p14="http://schemas.microsoft.com/office/powerpoint/2010/main" xmlns:p15="http://schemas.microsoft.com/office/powerpoint/2012/main" xmlns:ahyp="http://schemas.microsoft.com/office/drawing/2018/hyperlinkcolor" showMasterPhAnim="0" showMasterSp="0">
+<p:notes xmlns:a="http://schemas.openxmlformats.org/drawingml/2006/main" xmlns:r="http://schemas.openxmlformats.org/officeDocument/2006/relationships" xmlns:p="http://schemas.openxmlformats.org/presentationml/2006/main" showMasterSp="0" showMasterPhAnim="0">
   <p:cSld>
     <p:spTree>
       <p:nvGrpSpPr>
-        <p:cNvPr id="117" name="Shape 117"/>
+        <p:cNvPr id="1" name="Shape 117"/>
         <p:cNvGrpSpPr/>
         <p:nvPr/>
       </p:nvGrpSpPr>
@@ -1028,9 +1058,11 @@
       <p:sp>
         <p:nvSpPr>
           <p:cNvPr id="118" name="Google Shape;118;ge445934713_0_45:notes"/>
-          <p:cNvSpPr/>
+          <p:cNvSpPr>
+            <a:spLocks noGrp="1" noRot="1" noChangeAspect="1"/>
+          </p:cNvSpPr>
           <p:nvPr>
-            <p:ph idx="2" type="sldImg"/>
+            <p:ph type="sldImg" idx="2"/>
           </p:nvPr>
         </p:nvSpPr>
         <p:spPr>
@@ -1039,9 +1071,13 @@
             <a:ext cx="6096000" cy="3429000"/>
           </a:xfrm>
           <a:custGeom>
-            <a:rect b="b" l="l" r="r" t="t"/>
+            <a:avLst/>
+            <a:gdLst/>
+            <a:ahLst/>
+            <a:cxnLst/>
+            <a:rect l="l" t="t" r="r" b="b"/>
             <a:pathLst>
-              <a:path extrusionOk="0" h="120000" w="120000">
+              <a:path w="120000" h="120000" extrusionOk="0">
                 <a:moveTo>
                   <a:pt x="0" y="0"/>
                 </a:moveTo>
@@ -1063,9 +1099,11 @@
       <p:sp>
         <p:nvSpPr>
           <p:cNvPr id="119" name="Google Shape;119;ge445934713_0_45:notes"/>
-          <p:cNvSpPr txBox="1"/>
+          <p:cNvSpPr txBox="1">
+            <a:spLocks noGrp="1"/>
+          </p:cNvSpPr>
           <p:nvPr>
-            <p:ph idx="1" type="body"/>
+            <p:ph type="body" idx="1"/>
           </p:nvPr>
         </p:nvSpPr>
         <p:spPr>
@@ -1078,12 +1116,12 @@
           </a:prstGeom>
         </p:spPr>
         <p:txBody>
-          <a:bodyPr anchorCtr="0" anchor="t" bIns="91425" lIns="91425" spcFirstLastPara="1" rIns="91425" wrap="square" tIns="91425">
+          <a:bodyPr spcFirstLastPara="1" wrap="square" lIns="91425" tIns="91425" rIns="91425" bIns="91425" anchor="t" anchorCtr="0">
             <a:noAutofit/>
           </a:bodyPr>
           <a:lstStyle/>
           <a:p>
-            <a:pPr indent="0" lvl="0" marL="0" rtl="0" algn="l">
+            <a:pPr marL="0" lvl="0" indent="0" algn="l" rtl="0">
               <a:spcBef>
                 <a:spcPts val="0"/>
               </a:spcBef>
@@ -1092,9 +1130,6 @@
               </a:spcAft>
               <a:buNone/>
             </a:pPr>
-            <a:r>
-              <a:t/>
-            </a:r>
             <a:endParaRPr/>
           </a:p>
         </p:txBody>
@@ -1108,11 +1143,11 @@
 </file>
 
 <file path=ppt/notesSlides/notesSlide2.xml><?xml version="1.0" encoding="utf-8"?>
-<p:notes xmlns:a="http://schemas.openxmlformats.org/drawingml/2006/main" xmlns:r="http://schemas.openxmlformats.org/officeDocument/2006/relationships" xmlns:mc="http://schemas.openxmlformats.org/markup-compatibility/2006" xmlns:mv="urn:schemas-microsoft-com:mac:vml" xmlns:p="http://schemas.openxmlformats.org/presentationml/2006/main" xmlns:c="http://schemas.openxmlformats.org/drawingml/2006/chart" xmlns:dgm="http://schemas.openxmlformats.org/drawingml/2006/diagram" xmlns:o="urn:schemas-microsoft-com:office:office" xmlns:v="urn:schemas-microsoft-com:vml" xmlns:pvml="urn:schemas-microsoft-com:office:powerpoint" xmlns:com="http://schemas.openxmlformats.org/drawingml/2006/compatibility" xmlns:p14="http://schemas.microsoft.com/office/powerpoint/2010/main" xmlns:p15="http://schemas.microsoft.com/office/powerpoint/2012/main" xmlns:ahyp="http://schemas.microsoft.com/office/drawing/2018/hyperlinkcolor" showMasterPhAnim="0" showMasterSp="0">
+<p:notes xmlns:a="http://schemas.openxmlformats.org/drawingml/2006/main" xmlns:r="http://schemas.openxmlformats.org/officeDocument/2006/relationships" xmlns:p="http://schemas.openxmlformats.org/presentationml/2006/main" showMasterSp="0" showMasterPhAnim="0">
   <p:cSld>
     <p:spTree>
       <p:nvGrpSpPr>
-        <p:cNvPr id="57" name="Shape 57"/>
+        <p:cNvPr id="1" name="Shape 57"/>
         <p:cNvGrpSpPr/>
         <p:nvPr/>
       </p:nvGrpSpPr>
@@ -1127,9 +1162,11 @@
       <p:sp>
         <p:nvSpPr>
           <p:cNvPr id="58" name="Google Shape;58;ge4c4a8e2be_0_3:notes"/>
-          <p:cNvSpPr/>
+          <p:cNvSpPr>
+            <a:spLocks noGrp="1" noRot="1" noChangeAspect="1"/>
+          </p:cNvSpPr>
           <p:nvPr>
-            <p:ph idx="2" type="sldImg"/>
+            <p:ph type="sldImg" idx="2"/>
           </p:nvPr>
         </p:nvSpPr>
         <p:spPr>
@@ -1138,9 +1175,13 @@
             <a:ext cx="6096000" cy="3429000"/>
           </a:xfrm>
           <a:custGeom>
-            <a:rect b="b" l="l" r="r" t="t"/>
+            <a:avLst/>
+            <a:gdLst/>
+            <a:ahLst/>
+            <a:cxnLst/>
+            <a:rect l="l" t="t" r="r" b="b"/>
             <a:pathLst>
-              <a:path extrusionOk="0" h="120000" w="120000">
+              <a:path w="120000" h="120000" extrusionOk="0">
                 <a:moveTo>
                   <a:pt x="0" y="0"/>
                 </a:moveTo>
@@ -1162,9 +1203,11 @@
       <p:sp>
         <p:nvSpPr>
           <p:cNvPr id="59" name="Google Shape;59;ge4c4a8e2be_0_3:notes"/>
-          <p:cNvSpPr txBox="1"/>
+          <p:cNvSpPr txBox="1">
+            <a:spLocks noGrp="1"/>
+          </p:cNvSpPr>
           <p:nvPr>
-            <p:ph idx="1" type="body"/>
+            <p:ph type="body" idx="1"/>
           </p:nvPr>
         </p:nvSpPr>
         <p:spPr>
@@ -1177,12 +1220,12 @@
           </a:prstGeom>
         </p:spPr>
         <p:txBody>
-          <a:bodyPr anchorCtr="0" anchor="t" bIns="91425" lIns="91425" spcFirstLastPara="1" rIns="91425" wrap="square" tIns="91425">
+          <a:bodyPr spcFirstLastPara="1" wrap="square" lIns="91425" tIns="91425" rIns="91425" bIns="91425" anchor="t" anchorCtr="0">
             <a:noAutofit/>
           </a:bodyPr>
           <a:lstStyle/>
           <a:p>
-            <a:pPr indent="0" lvl="0" marL="0" rtl="0" algn="l">
+            <a:pPr marL="0" lvl="0" indent="0" algn="l" rtl="0">
               <a:spcBef>
                 <a:spcPts val="0"/>
               </a:spcBef>
@@ -1191,9 +1234,6 @@
               </a:spcAft>
               <a:buNone/>
             </a:pPr>
-            <a:r>
-              <a:t/>
-            </a:r>
             <a:endParaRPr/>
           </a:p>
         </p:txBody>
@@ -1207,11 +1247,11 @@
 </file>
 
 <file path=ppt/notesSlides/notesSlide3.xml><?xml version="1.0" encoding="utf-8"?>
-<p:notes xmlns:a="http://schemas.openxmlformats.org/drawingml/2006/main" xmlns:r="http://schemas.openxmlformats.org/officeDocument/2006/relationships" xmlns:mc="http://schemas.openxmlformats.org/markup-compatibility/2006" xmlns:mv="urn:schemas-microsoft-com:mac:vml" xmlns:p="http://schemas.openxmlformats.org/presentationml/2006/main" xmlns:c="http://schemas.openxmlformats.org/drawingml/2006/chart" xmlns:dgm="http://schemas.openxmlformats.org/drawingml/2006/diagram" xmlns:o="urn:schemas-microsoft-com:office:office" xmlns:v="urn:schemas-microsoft-com:vml" xmlns:pvml="urn:schemas-microsoft-com:office:powerpoint" xmlns:com="http://schemas.openxmlformats.org/drawingml/2006/compatibility" xmlns:p14="http://schemas.microsoft.com/office/powerpoint/2010/main" xmlns:p15="http://schemas.microsoft.com/office/powerpoint/2012/main" xmlns:ahyp="http://schemas.microsoft.com/office/drawing/2018/hyperlinkcolor" showMasterPhAnim="0" showMasterSp="0">
+<p:notes xmlns:a="http://schemas.openxmlformats.org/drawingml/2006/main" xmlns:r="http://schemas.openxmlformats.org/officeDocument/2006/relationships" xmlns:p="http://schemas.openxmlformats.org/presentationml/2006/main" showMasterSp="0" showMasterPhAnim="0">
   <p:cSld>
     <p:spTree>
       <p:nvGrpSpPr>
-        <p:cNvPr id="63" name="Shape 63"/>
+        <p:cNvPr id="1" name="Shape 63"/>
         <p:cNvGrpSpPr/>
         <p:nvPr/>
       </p:nvGrpSpPr>
@@ -1226,9 +1266,11 @@
       <p:sp>
         <p:nvSpPr>
           <p:cNvPr id="64" name="Google Shape;64;ge445934713_0_0:notes"/>
-          <p:cNvSpPr/>
+          <p:cNvSpPr>
+            <a:spLocks noGrp="1" noRot="1" noChangeAspect="1"/>
+          </p:cNvSpPr>
           <p:nvPr>
-            <p:ph idx="2" type="sldImg"/>
+            <p:ph type="sldImg" idx="2"/>
           </p:nvPr>
         </p:nvSpPr>
         <p:spPr>
@@ -1237,9 +1279,13 @@
             <a:ext cx="6096000" cy="3429000"/>
           </a:xfrm>
           <a:custGeom>
-            <a:rect b="b" l="l" r="r" t="t"/>
+            <a:avLst/>
+            <a:gdLst/>
+            <a:ahLst/>
+            <a:cxnLst/>
+            <a:rect l="l" t="t" r="r" b="b"/>
             <a:pathLst>
-              <a:path extrusionOk="0" h="120000" w="120000">
+              <a:path w="120000" h="120000" extrusionOk="0">
                 <a:moveTo>
                   <a:pt x="0" y="0"/>
                 </a:moveTo>
@@ -1261,9 +1307,11 @@
       <p:sp>
         <p:nvSpPr>
           <p:cNvPr id="65" name="Google Shape;65;ge445934713_0_0:notes"/>
-          <p:cNvSpPr txBox="1"/>
+          <p:cNvSpPr txBox="1">
+            <a:spLocks noGrp="1"/>
+          </p:cNvSpPr>
           <p:nvPr>
-            <p:ph idx="1" type="body"/>
+            <p:ph type="body" idx="1"/>
           </p:nvPr>
         </p:nvSpPr>
         <p:spPr>
@@ -1276,12 +1324,12 @@
           </a:prstGeom>
         </p:spPr>
         <p:txBody>
-          <a:bodyPr anchorCtr="0" anchor="t" bIns="91425" lIns="91425" spcFirstLastPara="1" rIns="91425" wrap="square" tIns="91425">
+          <a:bodyPr spcFirstLastPara="1" wrap="square" lIns="91425" tIns="91425" rIns="91425" bIns="91425" anchor="t" anchorCtr="0">
             <a:noAutofit/>
           </a:bodyPr>
           <a:lstStyle/>
           <a:p>
-            <a:pPr indent="0" lvl="0" marL="0" rtl="0" algn="l">
+            <a:pPr marL="0" lvl="0" indent="0" algn="l" rtl="0">
               <a:spcBef>
                 <a:spcPts val="0"/>
               </a:spcBef>
@@ -1290,9 +1338,6 @@
               </a:spcAft>
               <a:buNone/>
             </a:pPr>
-            <a:r>
-              <a:t/>
-            </a:r>
             <a:endParaRPr/>
           </a:p>
         </p:txBody>
@@ -1306,11 +1351,11 @@
 </file>
 
 <file path=ppt/notesSlides/notesSlide4.xml><?xml version="1.0" encoding="utf-8"?>
-<p:notes xmlns:a="http://schemas.openxmlformats.org/drawingml/2006/main" xmlns:r="http://schemas.openxmlformats.org/officeDocument/2006/relationships" xmlns:mc="http://schemas.openxmlformats.org/markup-compatibility/2006" xmlns:mv="urn:schemas-microsoft-com:mac:vml" xmlns:p="http://schemas.openxmlformats.org/presentationml/2006/main" xmlns:c="http://schemas.openxmlformats.org/drawingml/2006/chart" xmlns:dgm="http://schemas.openxmlformats.org/drawingml/2006/diagram" xmlns:o="urn:schemas-microsoft-com:office:office" xmlns:v="urn:schemas-microsoft-com:vml" xmlns:pvml="urn:schemas-microsoft-com:office:powerpoint" xmlns:com="http://schemas.openxmlformats.org/drawingml/2006/compatibility" xmlns:p14="http://schemas.microsoft.com/office/powerpoint/2010/main" xmlns:p15="http://schemas.microsoft.com/office/powerpoint/2012/main" xmlns:ahyp="http://schemas.microsoft.com/office/drawing/2018/hyperlinkcolor" showMasterPhAnim="0" showMasterSp="0">
+<p:notes xmlns:a="http://schemas.openxmlformats.org/drawingml/2006/main" xmlns:r="http://schemas.openxmlformats.org/officeDocument/2006/relationships" xmlns:p="http://schemas.openxmlformats.org/presentationml/2006/main" showMasterSp="0" showMasterPhAnim="0">
   <p:cSld>
     <p:spTree>
       <p:nvGrpSpPr>
-        <p:cNvPr id="69" name="Shape 69"/>
+        <p:cNvPr id="1" name="Shape 69"/>
         <p:cNvGrpSpPr/>
         <p:nvPr/>
       </p:nvGrpSpPr>
@@ -1325,9 +1370,11 @@
       <p:sp>
         <p:nvSpPr>
           <p:cNvPr id="70" name="Google Shape;70;ge445934713_0_5:notes"/>
-          <p:cNvSpPr/>
+          <p:cNvSpPr>
+            <a:spLocks noGrp="1" noRot="1" noChangeAspect="1"/>
+          </p:cNvSpPr>
           <p:nvPr>
-            <p:ph idx="2" type="sldImg"/>
+            <p:ph type="sldImg" idx="2"/>
           </p:nvPr>
         </p:nvSpPr>
         <p:spPr>
@@ -1336,9 +1383,13 @@
             <a:ext cx="6096000" cy="3429000"/>
           </a:xfrm>
           <a:custGeom>
-            <a:rect b="b" l="l" r="r" t="t"/>
+            <a:avLst/>
+            <a:gdLst/>
+            <a:ahLst/>
+            <a:cxnLst/>
+            <a:rect l="l" t="t" r="r" b="b"/>
             <a:pathLst>
-              <a:path extrusionOk="0" h="120000" w="120000">
+              <a:path w="120000" h="120000" extrusionOk="0">
                 <a:moveTo>
                   <a:pt x="0" y="0"/>
                 </a:moveTo>
@@ -1360,9 +1411,11 @@
       <p:sp>
         <p:nvSpPr>
           <p:cNvPr id="71" name="Google Shape;71;ge445934713_0_5:notes"/>
-          <p:cNvSpPr txBox="1"/>
+          <p:cNvSpPr txBox="1">
+            <a:spLocks noGrp="1"/>
+          </p:cNvSpPr>
           <p:nvPr>
-            <p:ph idx="1" type="body"/>
+            <p:ph type="body" idx="1"/>
           </p:nvPr>
         </p:nvSpPr>
         <p:spPr>
@@ -1375,12 +1428,12 @@
           </a:prstGeom>
         </p:spPr>
         <p:txBody>
-          <a:bodyPr anchorCtr="0" anchor="t" bIns="91425" lIns="91425" spcFirstLastPara="1" rIns="91425" wrap="square" tIns="91425">
+          <a:bodyPr spcFirstLastPara="1" wrap="square" lIns="91425" tIns="91425" rIns="91425" bIns="91425" anchor="t" anchorCtr="0">
             <a:noAutofit/>
           </a:bodyPr>
           <a:lstStyle/>
           <a:p>
-            <a:pPr indent="0" lvl="0" marL="0" rtl="0" algn="l">
+            <a:pPr marL="0" lvl="0" indent="0" algn="l" rtl="0">
               <a:spcBef>
                 <a:spcPts val="0"/>
               </a:spcBef>
@@ -1389,9 +1442,6 @@
               </a:spcAft>
               <a:buNone/>
             </a:pPr>
-            <a:r>
-              <a:t/>
-            </a:r>
             <a:endParaRPr/>
           </a:p>
         </p:txBody>
@@ -1405,11 +1455,11 @@
 </file>
 
 <file path=ppt/notesSlides/notesSlide5.xml><?xml version="1.0" encoding="utf-8"?>
-<p:notes xmlns:a="http://schemas.openxmlformats.org/drawingml/2006/main" xmlns:r="http://schemas.openxmlformats.org/officeDocument/2006/relationships" xmlns:mc="http://schemas.openxmlformats.org/markup-compatibility/2006" xmlns:mv="urn:schemas-microsoft-com:mac:vml" xmlns:p="http://schemas.openxmlformats.org/presentationml/2006/main" xmlns:c="http://schemas.openxmlformats.org/drawingml/2006/chart" xmlns:dgm="http://schemas.openxmlformats.org/drawingml/2006/diagram" xmlns:o="urn:schemas-microsoft-com:office:office" xmlns:v="urn:schemas-microsoft-com:vml" xmlns:pvml="urn:schemas-microsoft-com:office:powerpoint" xmlns:com="http://schemas.openxmlformats.org/drawingml/2006/compatibility" xmlns:p14="http://schemas.microsoft.com/office/powerpoint/2010/main" xmlns:p15="http://schemas.microsoft.com/office/powerpoint/2012/main" xmlns:ahyp="http://schemas.microsoft.com/office/drawing/2018/hyperlinkcolor" showMasterPhAnim="0" showMasterSp="0">
+<p:notes xmlns:a="http://schemas.openxmlformats.org/drawingml/2006/main" xmlns:r="http://schemas.openxmlformats.org/officeDocument/2006/relationships" xmlns:p="http://schemas.openxmlformats.org/presentationml/2006/main" showMasterSp="0" showMasterPhAnim="0">
   <p:cSld>
     <p:spTree>
       <p:nvGrpSpPr>
-        <p:cNvPr id="75" name="Shape 75"/>
+        <p:cNvPr id="1" name="Shape 75"/>
         <p:cNvGrpSpPr/>
         <p:nvPr/>
       </p:nvGrpSpPr>
@@ -1424,9 +1474,11 @@
       <p:sp>
         <p:nvSpPr>
           <p:cNvPr id="76" name="Google Shape;76;ge445934713_0_10:notes"/>
-          <p:cNvSpPr/>
+          <p:cNvSpPr>
+            <a:spLocks noGrp="1" noRot="1" noChangeAspect="1"/>
+          </p:cNvSpPr>
           <p:nvPr>
-            <p:ph idx="2" type="sldImg"/>
+            <p:ph type="sldImg" idx="2"/>
           </p:nvPr>
         </p:nvSpPr>
         <p:spPr>
@@ -1435,9 +1487,13 @@
             <a:ext cx="6096000" cy="3429000"/>
           </a:xfrm>
           <a:custGeom>
-            <a:rect b="b" l="l" r="r" t="t"/>
+            <a:avLst/>
+            <a:gdLst/>
+            <a:ahLst/>
+            <a:cxnLst/>
+            <a:rect l="l" t="t" r="r" b="b"/>
             <a:pathLst>
-              <a:path extrusionOk="0" h="120000" w="120000">
+              <a:path w="120000" h="120000" extrusionOk="0">
                 <a:moveTo>
                   <a:pt x="0" y="0"/>
                 </a:moveTo>
@@ -1459,9 +1515,11 @@
       <p:sp>
         <p:nvSpPr>
           <p:cNvPr id="77" name="Google Shape;77;ge445934713_0_10:notes"/>
-          <p:cNvSpPr txBox="1"/>
+          <p:cNvSpPr txBox="1">
+            <a:spLocks noGrp="1"/>
+          </p:cNvSpPr>
           <p:nvPr>
-            <p:ph idx="1" type="body"/>
+            <p:ph type="body" idx="1"/>
           </p:nvPr>
         </p:nvSpPr>
         <p:spPr>
@@ -1474,12 +1532,12 @@
           </a:prstGeom>
         </p:spPr>
         <p:txBody>
-          <a:bodyPr anchorCtr="0" anchor="t" bIns="91425" lIns="91425" spcFirstLastPara="1" rIns="91425" wrap="square" tIns="91425">
+          <a:bodyPr spcFirstLastPara="1" wrap="square" lIns="91425" tIns="91425" rIns="91425" bIns="91425" anchor="t" anchorCtr="0">
             <a:noAutofit/>
           </a:bodyPr>
           <a:lstStyle/>
           <a:p>
-            <a:pPr indent="0" lvl="0" marL="0" rtl="0" algn="l">
+            <a:pPr marL="0" lvl="0" indent="0" algn="l" rtl="0">
               <a:spcBef>
                 <a:spcPts val="0"/>
               </a:spcBef>
@@ -1488,9 +1546,6 @@
               </a:spcAft>
               <a:buNone/>
             </a:pPr>
-            <a:r>
-              <a:t/>
-            </a:r>
             <a:endParaRPr/>
           </a:p>
         </p:txBody>
@@ -1504,11 +1559,11 @@
 </file>
 
 <file path=ppt/notesSlides/notesSlide6.xml><?xml version="1.0" encoding="utf-8"?>
-<p:notes xmlns:a="http://schemas.openxmlformats.org/drawingml/2006/main" xmlns:r="http://schemas.openxmlformats.org/officeDocument/2006/relationships" xmlns:mc="http://schemas.openxmlformats.org/markup-compatibility/2006" xmlns:mv="urn:schemas-microsoft-com:mac:vml" xmlns:p="http://schemas.openxmlformats.org/presentationml/2006/main" xmlns:c="http://schemas.openxmlformats.org/drawingml/2006/chart" xmlns:dgm="http://schemas.openxmlformats.org/drawingml/2006/diagram" xmlns:o="urn:schemas-microsoft-com:office:office" xmlns:v="urn:schemas-microsoft-com:vml" xmlns:pvml="urn:schemas-microsoft-com:office:powerpoint" xmlns:com="http://schemas.openxmlformats.org/drawingml/2006/compatibility" xmlns:p14="http://schemas.microsoft.com/office/powerpoint/2010/main" xmlns:p15="http://schemas.microsoft.com/office/powerpoint/2012/main" xmlns:ahyp="http://schemas.microsoft.com/office/drawing/2018/hyperlinkcolor" showMasterPhAnim="0" showMasterSp="0">
+<p:notes xmlns:a="http://schemas.openxmlformats.org/drawingml/2006/main" xmlns:r="http://schemas.openxmlformats.org/officeDocument/2006/relationships" xmlns:p="http://schemas.openxmlformats.org/presentationml/2006/main" showMasterSp="0" showMasterPhAnim="0">
   <p:cSld>
     <p:spTree>
       <p:nvGrpSpPr>
-        <p:cNvPr id="81" name="Shape 81"/>
+        <p:cNvPr id="1" name="Shape 81"/>
         <p:cNvGrpSpPr/>
         <p:nvPr/>
       </p:nvGrpSpPr>
@@ -1523,9 +1578,11 @@
       <p:sp>
         <p:nvSpPr>
           <p:cNvPr id="82" name="Google Shape;82;ge445934713_0_15:notes"/>
-          <p:cNvSpPr/>
+          <p:cNvSpPr>
+            <a:spLocks noGrp="1" noRot="1" noChangeAspect="1"/>
+          </p:cNvSpPr>
           <p:nvPr>
-            <p:ph idx="2" type="sldImg"/>
+            <p:ph type="sldImg" idx="2"/>
           </p:nvPr>
         </p:nvSpPr>
         <p:spPr>
@@ -1534,9 +1591,13 @@
             <a:ext cx="6096000" cy="3429000"/>
           </a:xfrm>
           <a:custGeom>
-            <a:rect b="b" l="l" r="r" t="t"/>
+            <a:avLst/>
+            <a:gdLst/>
+            <a:ahLst/>
+            <a:cxnLst/>
+            <a:rect l="l" t="t" r="r" b="b"/>
             <a:pathLst>
-              <a:path extrusionOk="0" h="120000" w="120000">
+              <a:path w="120000" h="120000" extrusionOk="0">
                 <a:moveTo>
                   <a:pt x="0" y="0"/>
                 </a:moveTo>
@@ -1558,9 +1619,11 @@
       <p:sp>
         <p:nvSpPr>
           <p:cNvPr id="83" name="Google Shape;83;ge445934713_0_15:notes"/>
-          <p:cNvSpPr txBox="1"/>
+          <p:cNvSpPr txBox="1">
+            <a:spLocks noGrp="1"/>
+          </p:cNvSpPr>
           <p:nvPr>
-            <p:ph idx="1" type="body"/>
+            <p:ph type="body" idx="1"/>
           </p:nvPr>
         </p:nvSpPr>
         <p:spPr>
@@ -1573,12 +1636,12 @@
           </a:prstGeom>
         </p:spPr>
         <p:txBody>
-          <a:bodyPr anchorCtr="0" anchor="t" bIns="91425" lIns="91425" spcFirstLastPara="1" rIns="91425" wrap="square" tIns="91425">
+          <a:bodyPr spcFirstLastPara="1" wrap="square" lIns="91425" tIns="91425" rIns="91425" bIns="91425" anchor="t" anchorCtr="0">
             <a:noAutofit/>
           </a:bodyPr>
           <a:lstStyle/>
           <a:p>
-            <a:pPr indent="0" lvl="0" marL="0" rtl="0" algn="l">
+            <a:pPr marL="0" lvl="0" indent="0" algn="l" rtl="0">
               <a:spcBef>
                 <a:spcPts val="0"/>
               </a:spcBef>
@@ -1587,9 +1650,6 @@
               </a:spcAft>
               <a:buNone/>
             </a:pPr>
-            <a:r>
-              <a:t/>
-            </a:r>
             <a:endParaRPr/>
           </a:p>
         </p:txBody>
@@ -1603,11 +1663,11 @@
 </file>
 
 <file path=ppt/notesSlides/notesSlide7.xml><?xml version="1.0" encoding="utf-8"?>
-<p:notes xmlns:a="http://schemas.openxmlformats.org/drawingml/2006/main" xmlns:r="http://schemas.openxmlformats.org/officeDocument/2006/relationships" xmlns:mc="http://schemas.openxmlformats.org/markup-compatibility/2006" xmlns:mv="urn:schemas-microsoft-com:mac:vml" xmlns:p="http://schemas.openxmlformats.org/presentationml/2006/main" xmlns:c="http://schemas.openxmlformats.org/drawingml/2006/chart" xmlns:dgm="http://schemas.openxmlformats.org/drawingml/2006/diagram" xmlns:o="urn:schemas-microsoft-com:office:office" xmlns:v="urn:schemas-microsoft-com:vml" xmlns:pvml="urn:schemas-microsoft-com:office:powerpoint" xmlns:com="http://schemas.openxmlformats.org/drawingml/2006/compatibility" xmlns:p14="http://schemas.microsoft.com/office/powerpoint/2010/main" xmlns:p15="http://schemas.microsoft.com/office/powerpoint/2012/main" xmlns:ahyp="http://schemas.microsoft.com/office/drawing/2018/hyperlinkcolor" showMasterPhAnim="0" showMasterSp="0">
+<p:notes xmlns:a="http://schemas.openxmlformats.org/drawingml/2006/main" xmlns:r="http://schemas.openxmlformats.org/officeDocument/2006/relationships" xmlns:p="http://schemas.openxmlformats.org/presentationml/2006/main" showMasterSp="0" showMasterPhAnim="0">
   <p:cSld>
     <p:spTree>
       <p:nvGrpSpPr>
-        <p:cNvPr id="87" name="Shape 87"/>
+        <p:cNvPr id="1" name="Shape 87"/>
         <p:cNvGrpSpPr/>
         <p:nvPr/>
       </p:nvGrpSpPr>
@@ -1622,9 +1682,11 @@
       <p:sp>
         <p:nvSpPr>
           <p:cNvPr id="88" name="Google Shape;88;ge445934713_0_20:notes"/>
-          <p:cNvSpPr/>
+          <p:cNvSpPr>
+            <a:spLocks noGrp="1" noRot="1" noChangeAspect="1"/>
+          </p:cNvSpPr>
           <p:nvPr>
-            <p:ph idx="2" type="sldImg"/>
+            <p:ph type="sldImg" idx="2"/>
           </p:nvPr>
         </p:nvSpPr>
         <p:spPr>
@@ -1633,9 +1695,13 @@
             <a:ext cx="6096000" cy="3429000"/>
           </a:xfrm>
           <a:custGeom>
-            <a:rect b="b" l="l" r="r" t="t"/>
+            <a:avLst/>
+            <a:gdLst/>
+            <a:ahLst/>
+            <a:cxnLst/>
+            <a:rect l="l" t="t" r="r" b="b"/>
             <a:pathLst>
-              <a:path extrusionOk="0" h="120000" w="120000">
+              <a:path w="120000" h="120000" extrusionOk="0">
                 <a:moveTo>
                   <a:pt x="0" y="0"/>
                 </a:moveTo>
@@ -1657,9 +1723,11 @@
       <p:sp>
         <p:nvSpPr>
           <p:cNvPr id="89" name="Google Shape;89;ge445934713_0_20:notes"/>
-          <p:cNvSpPr txBox="1"/>
+          <p:cNvSpPr txBox="1">
+            <a:spLocks noGrp="1"/>
+          </p:cNvSpPr>
           <p:nvPr>
-            <p:ph idx="1" type="body"/>
+            <p:ph type="body" idx="1"/>
           </p:nvPr>
         </p:nvSpPr>
         <p:spPr>
@@ -1672,12 +1740,12 @@
           </a:prstGeom>
         </p:spPr>
         <p:txBody>
-          <a:bodyPr anchorCtr="0" anchor="t" bIns="91425" lIns="91425" spcFirstLastPara="1" rIns="91425" wrap="square" tIns="91425">
+          <a:bodyPr spcFirstLastPara="1" wrap="square" lIns="91425" tIns="91425" rIns="91425" bIns="91425" anchor="t" anchorCtr="0">
             <a:noAutofit/>
           </a:bodyPr>
           <a:lstStyle/>
           <a:p>
-            <a:pPr indent="0" lvl="0" marL="0" rtl="0" algn="l">
+            <a:pPr marL="0" lvl="0" indent="0" algn="l" rtl="0">
               <a:spcBef>
                 <a:spcPts val="0"/>
               </a:spcBef>
@@ -1686,9 +1754,6 @@
               </a:spcAft>
               <a:buNone/>
             </a:pPr>
-            <a:r>
-              <a:t/>
-            </a:r>
             <a:endParaRPr/>
           </a:p>
         </p:txBody>
@@ -1702,11 +1767,11 @@
 </file>
 
 <file path=ppt/notesSlides/notesSlide8.xml><?xml version="1.0" encoding="utf-8"?>
-<p:notes xmlns:a="http://schemas.openxmlformats.org/drawingml/2006/main" xmlns:r="http://schemas.openxmlformats.org/officeDocument/2006/relationships" xmlns:mc="http://schemas.openxmlformats.org/markup-compatibility/2006" xmlns:mv="urn:schemas-microsoft-com:mac:vml" xmlns:p="http://schemas.openxmlformats.org/presentationml/2006/main" xmlns:c="http://schemas.openxmlformats.org/drawingml/2006/chart" xmlns:dgm="http://schemas.openxmlformats.org/drawingml/2006/diagram" xmlns:o="urn:schemas-microsoft-com:office:office" xmlns:v="urn:schemas-microsoft-com:vml" xmlns:pvml="urn:schemas-microsoft-com:office:powerpoint" xmlns:com="http://schemas.openxmlformats.org/drawingml/2006/compatibility" xmlns:p14="http://schemas.microsoft.com/office/powerpoint/2010/main" xmlns:p15="http://schemas.microsoft.com/office/powerpoint/2012/main" xmlns:ahyp="http://schemas.microsoft.com/office/drawing/2018/hyperlinkcolor" showMasterPhAnim="0" showMasterSp="0">
+<p:notes xmlns:a="http://schemas.openxmlformats.org/drawingml/2006/main" xmlns:r="http://schemas.openxmlformats.org/officeDocument/2006/relationships" xmlns:p="http://schemas.openxmlformats.org/presentationml/2006/main" showMasterSp="0" showMasterPhAnim="0">
   <p:cSld>
     <p:spTree>
       <p:nvGrpSpPr>
-        <p:cNvPr id="93" name="Shape 93"/>
+        <p:cNvPr id="1" name="Shape 93"/>
         <p:cNvGrpSpPr/>
         <p:nvPr/>
       </p:nvGrpSpPr>
@@ -1721,9 +1786,11 @@
       <p:sp>
         <p:nvSpPr>
           <p:cNvPr id="94" name="Google Shape;94;ge445934713_0_25:notes"/>
-          <p:cNvSpPr/>
+          <p:cNvSpPr>
+            <a:spLocks noGrp="1" noRot="1" noChangeAspect="1"/>
+          </p:cNvSpPr>
           <p:nvPr>
-            <p:ph idx="2" type="sldImg"/>
+            <p:ph type="sldImg" idx="2"/>
           </p:nvPr>
         </p:nvSpPr>
         <p:spPr>
@@ -1732,9 +1799,13 @@
             <a:ext cx="6096000" cy="3429000"/>
           </a:xfrm>
           <a:custGeom>
-            <a:rect b="b" l="l" r="r" t="t"/>
+            <a:avLst/>
+            <a:gdLst/>
+            <a:ahLst/>
+            <a:cxnLst/>
+            <a:rect l="l" t="t" r="r" b="b"/>
             <a:pathLst>
-              <a:path extrusionOk="0" h="120000" w="120000">
+              <a:path w="120000" h="120000" extrusionOk="0">
                 <a:moveTo>
                   <a:pt x="0" y="0"/>
                 </a:moveTo>
@@ -1756,9 +1827,11 @@
       <p:sp>
         <p:nvSpPr>
           <p:cNvPr id="95" name="Google Shape;95;ge445934713_0_25:notes"/>
-          <p:cNvSpPr txBox="1"/>
+          <p:cNvSpPr txBox="1">
+            <a:spLocks noGrp="1"/>
+          </p:cNvSpPr>
           <p:nvPr>
-            <p:ph idx="1" type="body"/>
+            <p:ph type="body" idx="1"/>
           </p:nvPr>
         </p:nvSpPr>
         <p:spPr>
@@ -1771,12 +1844,12 @@
           </a:prstGeom>
         </p:spPr>
         <p:txBody>
-          <a:bodyPr anchorCtr="0" anchor="t" bIns="91425" lIns="91425" spcFirstLastPara="1" rIns="91425" wrap="square" tIns="91425">
+          <a:bodyPr spcFirstLastPara="1" wrap="square" lIns="91425" tIns="91425" rIns="91425" bIns="91425" anchor="t" anchorCtr="0">
             <a:noAutofit/>
           </a:bodyPr>
           <a:lstStyle/>
           <a:p>
-            <a:pPr indent="0" lvl="0" marL="0" rtl="0" algn="l">
+            <a:pPr marL="0" lvl="0" indent="0" algn="l" rtl="0">
               <a:spcBef>
                 <a:spcPts val="0"/>
               </a:spcBef>
@@ -1785,9 +1858,6 @@
               </a:spcAft>
               <a:buNone/>
             </a:pPr>
-            <a:r>
-              <a:t/>
-            </a:r>
             <a:endParaRPr/>
           </a:p>
         </p:txBody>
@@ -1801,11 +1871,11 @@
 </file>
 
 <file path=ppt/notesSlides/notesSlide9.xml><?xml version="1.0" encoding="utf-8"?>
-<p:notes xmlns:a="http://schemas.openxmlformats.org/drawingml/2006/main" xmlns:r="http://schemas.openxmlformats.org/officeDocument/2006/relationships" xmlns:mc="http://schemas.openxmlformats.org/markup-compatibility/2006" xmlns:mv="urn:schemas-microsoft-com:mac:vml" xmlns:p="http://schemas.openxmlformats.org/presentationml/2006/main" xmlns:c="http://schemas.openxmlformats.org/drawingml/2006/chart" xmlns:dgm="http://schemas.openxmlformats.org/drawingml/2006/diagram" xmlns:o="urn:schemas-microsoft-com:office:office" xmlns:v="urn:schemas-microsoft-com:vml" xmlns:pvml="urn:schemas-microsoft-com:office:powerpoint" xmlns:com="http://schemas.openxmlformats.org/drawingml/2006/compatibility" xmlns:p14="http://schemas.microsoft.com/office/powerpoint/2010/main" xmlns:p15="http://schemas.microsoft.com/office/powerpoint/2012/main" xmlns:ahyp="http://schemas.microsoft.com/office/drawing/2018/hyperlinkcolor" showMasterPhAnim="0" showMasterSp="0">
+<p:notes xmlns:a="http://schemas.openxmlformats.org/drawingml/2006/main" xmlns:r="http://schemas.openxmlformats.org/officeDocument/2006/relationships" xmlns:p="http://schemas.openxmlformats.org/presentationml/2006/main" showMasterSp="0" showMasterPhAnim="0">
   <p:cSld>
     <p:spTree>
       <p:nvGrpSpPr>
-        <p:cNvPr id="99" name="Shape 99"/>
+        <p:cNvPr id="1" name="Shape 99"/>
         <p:cNvGrpSpPr/>
         <p:nvPr/>
       </p:nvGrpSpPr>
@@ -1820,9 +1890,11 @@
       <p:sp>
         <p:nvSpPr>
           <p:cNvPr id="100" name="Google Shape;100;ge445934713_0_30:notes"/>
-          <p:cNvSpPr/>
+          <p:cNvSpPr>
+            <a:spLocks noGrp="1" noRot="1" noChangeAspect="1"/>
+          </p:cNvSpPr>
           <p:nvPr>
-            <p:ph idx="2" type="sldImg"/>
+            <p:ph type="sldImg" idx="2"/>
           </p:nvPr>
         </p:nvSpPr>
         <p:spPr>
@@ -1831,9 +1903,13 @@
             <a:ext cx="6096000" cy="3429000"/>
           </a:xfrm>
           <a:custGeom>
-            <a:rect b="b" l="l" r="r" t="t"/>
+            <a:avLst/>
+            <a:gdLst/>
+            <a:ahLst/>
+            <a:cxnLst/>
+            <a:rect l="l" t="t" r="r" b="b"/>
             <a:pathLst>
-              <a:path extrusionOk="0" h="120000" w="120000">
+              <a:path w="120000" h="120000" extrusionOk="0">
                 <a:moveTo>
                   <a:pt x="0" y="0"/>
                 </a:moveTo>
@@ -1855,9 +1931,11 @@
       <p:sp>
         <p:nvSpPr>
           <p:cNvPr id="101" name="Google Shape;101;ge445934713_0_30:notes"/>
-          <p:cNvSpPr txBox="1"/>
+          <p:cNvSpPr txBox="1">
+            <a:spLocks noGrp="1"/>
+          </p:cNvSpPr>
           <p:nvPr>
-            <p:ph idx="1" type="body"/>
+            <p:ph type="body" idx="1"/>
           </p:nvPr>
         </p:nvSpPr>
         <p:spPr>
@@ -1870,12 +1948,12 @@
           </a:prstGeom>
         </p:spPr>
         <p:txBody>
-          <a:bodyPr anchorCtr="0" anchor="t" bIns="91425" lIns="91425" spcFirstLastPara="1" rIns="91425" wrap="square" tIns="91425">
+          <a:bodyPr spcFirstLastPara="1" wrap="square" lIns="91425" tIns="91425" rIns="91425" bIns="91425" anchor="t" anchorCtr="0">
             <a:noAutofit/>
           </a:bodyPr>
           <a:lstStyle/>
           <a:p>
-            <a:pPr indent="0" lvl="0" marL="0" rtl="0" algn="l">
+            <a:pPr marL="0" lvl="0" indent="0" algn="l" rtl="0">
               <a:spcBef>
                 <a:spcPts val="0"/>
               </a:spcBef>
@@ -1884,9 +1962,6 @@
               </a:spcAft>
               <a:buNone/>
             </a:pPr>
-            <a:r>
-              <a:t/>
-            </a:r>
             <a:endParaRPr/>
           </a:p>
         </p:txBody>
@@ -1900,11 +1975,11 @@
 </file>
 
 <file path=ppt/slideLayouts/slideLayout1.xml><?xml version="1.0" encoding="utf-8"?>
-<p:sldLayout xmlns:a="http://schemas.openxmlformats.org/drawingml/2006/main" xmlns:r="http://schemas.openxmlformats.org/officeDocument/2006/relationships" xmlns:mc="http://schemas.openxmlformats.org/markup-compatibility/2006" xmlns:mv="urn:schemas-microsoft-com:mac:vml" xmlns:p="http://schemas.openxmlformats.org/presentationml/2006/main" xmlns:c="http://schemas.openxmlformats.org/drawingml/2006/chart" xmlns:dgm="http://schemas.openxmlformats.org/drawingml/2006/diagram" xmlns:o="urn:schemas-microsoft-com:office:office" xmlns:v="urn:schemas-microsoft-com:vml" xmlns:pvml="urn:schemas-microsoft-com:office:powerpoint" xmlns:com="http://schemas.openxmlformats.org/drawingml/2006/compatibility" xmlns:p14="http://schemas.microsoft.com/office/powerpoint/2010/main" xmlns:p15="http://schemas.microsoft.com/office/powerpoint/2012/main" xmlns:ahyp="http://schemas.microsoft.com/office/drawing/2018/hyperlinkcolor" matchingName="Title slide" type="title">
+<p:sldLayout xmlns:a="http://schemas.openxmlformats.org/drawingml/2006/main" xmlns:r="http://schemas.openxmlformats.org/officeDocument/2006/relationships" xmlns:p="http://schemas.openxmlformats.org/presentationml/2006/main" matchingName="Title slide" type="title">
   <p:cSld name="TITLE">
     <p:spTree>
       <p:nvGrpSpPr>
-        <p:cNvPr id="13" name="Shape 13"/>
+        <p:cNvPr id="1" name="Shape 13"/>
         <p:cNvGrpSpPr/>
         <p:nvPr/>
       </p:nvGrpSpPr>
@@ -1919,7 +1994,9 @@
       <p:sp>
         <p:nvSpPr>
           <p:cNvPr id="14" name="Google Shape;14;p2"/>
-          <p:cNvSpPr txBox="1"/>
+          <p:cNvSpPr txBox="1">
+            <a:spLocks noGrp="1"/>
+          </p:cNvSpPr>
           <p:nvPr>
             <p:ph type="ctrTitle"/>
           </p:nvPr>
@@ -1938,7 +2015,7 @@
           </a:ln>
         </p:spPr>
         <p:txBody>
-          <a:bodyPr anchorCtr="0" anchor="b" bIns="91425" lIns="91425" spcFirstLastPara="1" rIns="91425" wrap="square" tIns="91425">
+          <a:bodyPr spcFirstLastPara="1" wrap="square" lIns="91425" tIns="91425" rIns="91425" bIns="91425" anchor="b" anchorCtr="0">
             <a:noAutofit/>
           </a:bodyPr>
           <a:lstStyle>
@@ -2042,15 +2119,19 @@
               <a:defRPr sz="5200"/>
             </a:lvl9pPr>
           </a:lstStyle>
-          <a:p/>
+          <a:p>
+            <a:endParaRPr/>
+          </a:p>
         </p:txBody>
       </p:sp>
       <p:sp>
         <p:nvSpPr>
           <p:cNvPr id="15" name="Google Shape;15;p2"/>
-          <p:cNvSpPr txBox="1"/>
+          <p:cNvSpPr txBox="1">
+            <a:spLocks noGrp="1"/>
+          </p:cNvSpPr>
           <p:nvPr>
-            <p:ph idx="1" type="subTitle"/>
+            <p:ph type="subTitle" idx="1"/>
           </p:nvPr>
         </p:nvSpPr>
         <p:spPr>
@@ -2067,7 +2148,7 @@
           </a:ln>
         </p:spPr>
         <p:txBody>
-          <a:bodyPr anchorCtr="0" anchor="ctr" bIns="91425" lIns="91425" spcFirstLastPara="1" rIns="91425" wrap="square" tIns="91425">
+          <a:bodyPr spcFirstLastPara="1" wrap="square" lIns="91425" tIns="91425" rIns="91425" bIns="91425" anchor="ctr" anchorCtr="0">
             <a:noAutofit/>
           </a:bodyPr>
           <a:lstStyle>
@@ -2198,7 +2279,9 @@
               <a:defRPr sz="2800"/>
             </a:lvl9pPr>
           </a:lstStyle>
-          <a:p/>
+          <a:p>
+            <a:endParaRPr/>
+          </a:p>
         </p:txBody>
       </p:sp>
     </p:spTree>
@@ -2210,11 +2293,11 @@
 </file>
 
 <file path=ppt/slideLayouts/slideLayout10.xml><?xml version="1.0" encoding="utf-8"?>
-<p:sldLayout xmlns:a="http://schemas.openxmlformats.org/drawingml/2006/main" xmlns:r="http://schemas.openxmlformats.org/officeDocument/2006/relationships" xmlns:mc="http://schemas.openxmlformats.org/markup-compatibility/2006" xmlns:mv="urn:schemas-microsoft-com:mac:vml" xmlns:p="http://schemas.openxmlformats.org/presentationml/2006/main" xmlns:c="http://schemas.openxmlformats.org/drawingml/2006/chart" xmlns:dgm="http://schemas.openxmlformats.org/drawingml/2006/diagram" xmlns:o="urn:schemas-microsoft-com:office:office" xmlns:v="urn:schemas-microsoft-com:vml" xmlns:pvml="urn:schemas-microsoft-com:office:powerpoint" xmlns:com="http://schemas.openxmlformats.org/drawingml/2006/compatibility" xmlns:p14="http://schemas.microsoft.com/office/powerpoint/2010/main" xmlns:p15="http://schemas.microsoft.com/office/powerpoint/2012/main" xmlns:ahyp="http://schemas.microsoft.com/office/drawing/2018/hyperlinkcolor" matchingName="Big number">
+<p:sldLayout xmlns:a="http://schemas.openxmlformats.org/drawingml/2006/main" xmlns:r="http://schemas.openxmlformats.org/officeDocument/2006/relationships" xmlns:p="http://schemas.openxmlformats.org/presentationml/2006/main" matchingName="Big number">
   <p:cSld name="BIG_NUMBER">
     <p:spTree>
       <p:nvGrpSpPr>
-        <p:cNvPr id="39" name="Shape 39"/>
+        <p:cNvPr id="1" name="Shape 39"/>
         <p:cNvGrpSpPr/>
         <p:nvPr/>
       </p:nvGrpSpPr>
@@ -2229,9 +2312,11 @@
       <p:sp>
         <p:nvSpPr>
           <p:cNvPr id="40" name="Google Shape;40;p11"/>
-          <p:cNvSpPr txBox="1"/>
+          <p:cNvSpPr txBox="1">
+            <a:spLocks noGrp="1"/>
+          </p:cNvSpPr>
           <p:nvPr>
-            <p:ph hasCustomPrompt="1" type="title"/>
+            <p:ph type="title" hasCustomPrompt="1"/>
           </p:nvPr>
         </p:nvSpPr>
         <p:spPr>
@@ -2248,7 +2333,7 @@
           </a:ln>
         </p:spPr>
         <p:txBody>
-          <a:bodyPr anchorCtr="0" anchor="b" bIns="91425" lIns="91425" spcFirstLastPara="1" rIns="91425" wrap="square" tIns="91425">
+          <a:bodyPr spcFirstLastPara="1" wrap="square" lIns="91425" tIns="91425" rIns="91425" bIns="91425" anchor="b" anchorCtr="0">
             <a:noAutofit/>
           </a:bodyPr>
           <a:lstStyle>
@@ -2362,9 +2447,11 @@
       <p:sp>
         <p:nvSpPr>
           <p:cNvPr id="41" name="Google Shape;41;p11"/>
-          <p:cNvSpPr txBox="1"/>
+          <p:cNvSpPr txBox="1">
+            <a:spLocks noGrp="1"/>
+          </p:cNvSpPr>
           <p:nvPr>
-            <p:ph idx="1" type="body"/>
+            <p:ph type="body" idx="1"/>
           </p:nvPr>
         </p:nvSpPr>
         <p:spPr>
@@ -2381,11 +2468,11 @@
           </a:ln>
         </p:spPr>
         <p:txBody>
-          <a:bodyPr anchorCtr="0" anchor="ctr" bIns="91425" lIns="91425" spcFirstLastPara="1" rIns="91425" wrap="square" tIns="91425">
+          <a:bodyPr spcFirstLastPara="1" wrap="square" lIns="91425" tIns="91425" rIns="91425" bIns="91425" anchor="ctr" anchorCtr="0">
             <a:noAutofit/>
           </a:bodyPr>
           <a:lstStyle>
-            <a:lvl1pPr indent="-317500" lvl="0" marL="457200" algn="ctr">
+            <a:lvl1pPr marL="457200" lvl="0" indent="-317500" algn="ctr">
               <a:spcBef>
                 <a:spcPts val="0"/>
               </a:spcBef>
@@ -2396,7 +2483,7 @@
               <a:buChar char="●"/>
               <a:defRPr/>
             </a:lvl1pPr>
-            <a:lvl2pPr indent="-317500" lvl="1" marL="914400" algn="ctr">
+            <a:lvl2pPr marL="914400" lvl="1" indent="-317500" algn="ctr">
               <a:spcBef>
                 <a:spcPts val="0"/>
               </a:spcBef>
@@ -2407,7 +2494,7 @@
               <a:buChar char="○"/>
               <a:defRPr/>
             </a:lvl2pPr>
-            <a:lvl3pPr indent="-317500" lvl="2" marL="1371600" algn="ctr">
+            <a:lvl3pPr marL="1371600" lvl="2" indent="-317500" algn="ctr">
               <a:spcBef>
                 <a:spcPts val="0"/>
               </a:spcBef>
@@ -2418,7 +2505,7 @@
               <a:buChar char="■"/>
               <a:defRPr/>
             </a:lvl3pPr>
-            <a:lvl4pPr indent="-317500" lvl="3" marL="1828800" algn="ctr">
+            <a:lvl4pPr marL="1828800" lvl="3" indent="-317500" algn="ctr">
               <a:spcBef>
                 <a:spcPts val="0"/>
               </a:spcBef>
@@ -2429,7 +2516,7 @@
               <a:buChar char="●"/>
               <a:defRPr/>
             </a:lvl4pPr>
-            <a:lvl5pPr indent="-317500" lvl="4" marL="2286000" algn="ctr">
+            <a:lvl5pPr marL="2286000" lvl="4" indent="-317500" algn="ctr">
               <a:spcBef>
                 <a:spcPts val="0"/>
               </a:spcBef>
@@ -2440,7 +2527,7 @@
               <a:buChar char="○"/>
               <a:defRPr/>
             </a:lvl5pPr>
-            <a:lvl6pPr indent="-317500" lvl="5" marL="2743200" algn="ctr">
+            <a:lvl6pPr marL="2743200" lvl="5" indent="-317500" algn="ctr">
               <a:spcBef>
                 <a:spcPts val="0"/>
               </a:spcBef>
@@ -2451,7 +2538,7 @@
               <a:buChar char="■"/>
               <a:defRPr/>
             </a:lvl6pPr>
-            <a:lvl7pPr indent="-317500" lvl="6" marL="3200400" algn="ctr">
+            <a:lvl7pPr marL="3200400" lvl="6" indent="-317500" algn="ctr">
               <a:spcBef>
                 <a:spcPts val="0"/>
               </a:spcBef>
@@ -2462,7 +2549,7 @@
               <a:buChar char="●"/>
               <a:defRPr/>
             </a:lvl7pPr>
-            <a:lvl8pPr indent="-317500" lvl="7" marL="3657600" algn="ctr">
+            <a:lvl8pPr marL="3657600" lvl="7" indent="-317500" algn="ctr">
               <a:spcBef>
                 <a:spcPts val="0"/>
               </a:spcBef>
@@ -2473,7 +2560,7 @@
               <a:buChar char="○"/>
               <a:defRPr/>
             </a:lvl8pPr>
-            <a:lvl9pPr indent="-317500" lvl="8" marL="4114800" algn="ctr">
+            <a:lvl9pPr marL="4114800" lvl="8" indent="-317500" algn="ctr">
               <a:spcBef>
                 <a:spcPts val="0"/>
               </a:spcBef>
@@ -2485,7 +2572,9 @@
               <a:defRPr/>
             </a:lvl9pPr>
           </a:lstStyle>
-          <a:p/>
+          <a:p>
+            <a:endParaRPr/>
+          </a:p>
         </p:txBody>
       </p:sp>
     </p:spTree>
@@ -2497,11 +2586,11 @@
 </file>
 
 <file path=ppt/slideLayouts/slideLayout11.xml><?xml version="1.0" encoding="utf-8"?>
-<p:sldLayout xmlns:a="http://schemas.openxmlformats.org/drawingml/2006/main" xmlns:r="http://schemas.openxmlformats.org/officeDocument/2006/relationships" xmlns:mc="http://schemas.openxmlformats.org/markup-compatibility/2006" xmlns:mv="urn:schemas-microsoft-com:mac:vml" xmlns:p="http://schemas.openxmlformats.org/presentationml/2006/main" xmlns:c="http://schemas.openxmlformats.org/drawingml/2006/chart" xmlns:dgm="http://schemas.openxmlformats.org/drawingml/2006/diagram" xmlns:o="urn:schemas-microsoft-com:office:office" xmlns:v="urn:schemas-microsoft-com:vml" xmlns:pvml="urn:schemas-microsoft-com:office:powerpoint" xmlns:com="http://schemas.openxmlformats.org/drawingml/2006/compatibility" xmlns:p14="http://schemas.microsoft.com/office/powerpoint/2010/main" xmlns:p15="http://schemas.microsoft.com/office/powerpoint/2012/main" xmlns:ahyp="http://schemas.microsoft.com/office/drawing/2018/hyperlinkcolor" matchingName="Blank" type="blank">
+<p:sldLayout xmlns:a="http://schemas.openxmlformats.org/drawingml/2006/main" xmlns:r="http://schemas.openxmlformats.org/officeDocument/2006/relationships" xmlns:p="http://schemas.openxmlformats.org/presentationml/2006/main" matchingName="Blank" type="blank">
   <p:cSld name="BLANK">
     <p:spTree>
       <p:nvGrpSpPr>
-        <p:cNvPr id="42" name="Shape 42"/>
+        <p:cNvPr id="1" name="Shape 42"/>
         <p:cNvGrpSpPr/>
         <p:nvPr/>
       </p:nvGrpSpPr>
@@ -2522,11 +2611,11 @@
 </file>
 
 <file path=ppt/slideLayouts/slideLayout12.xml><?xml version="1.0" encoding="utf-8"?>
-<p:sldLayout xmlns:a="http://schemas.openxmlformats.org/drawingml/2006/main" xmlns:r="http://schemas.openxmlformats.org/officeDocument/2006/relationships" xmlns:mc="http://schemas.openxmlformats.org/markup-compatibility/2006" xmlns:mv="urn:schemas-microsoft-com:mac:vml" xmlns:p="http://schemas.openxmlformats.org/presentationml/2006/main" xmlns:c="http://schemas.openxmlformats.org/drawingml/2006/chart" xmlns:dgm="http://schemas.openxmlformats.org/drawingml/2006/diagram" xmlns:o="urn:schemas-microsoft-com:office:office" xmlns:v="urn:schemas-microsoft-com:vml" xmlns:pvml="urn:schemas-microsoft-com:office:powerpoint" xmlns:com="http://schemas.openxmlformats.org/drawingml/2006/compatibility" xmlns:p14="http://schemas.microsoft.com/office/powerpoint/2010/main" xmlns:p15="http://schemas.microsoft.com/office/powerpoint/2012/main" xmlns:ahyp="http://schemas.microsoft.com/office/drawing/2018/hyperlinkcolor" matchingName="Diseño personalizado 1">
+<p:sldLayout xmlns:a="http://schemas.openxmlformats.org/drawingml/2006/main" xmlns:r="http://schemas.openxmlformats.org/officeDocument/2006/relationships" xmlns:p="http://schemas.openxmlformats.org/presentationml/2006/main" matchingName="Diseño personalizado 1">
   <p:cSld name="CUSTOM_1">
     <p:spTree>
       <p:nvGrpSpPr>
-        <p:cNvPr id="43" name="Shape 43"/>
+        <p:cNvPr id="1" name="Shape 43"/>
         <p:cNvGrpSpPr/>
         <p:nvPr/>
       </p:nvGrpSpPr>
@@ -2555,23 +2644,23 @@
           <a:solidFill>
             <a:srgbClr val="33383C"/>
           </a:solidFill>
-          <a:ln cap="flat" cmpd="sng" w="9525">
+          <a:ln w="9525" cap="flat" cmpd="sng">
             <a:solidFill>
               <a:schemeClr val="dk2"/>
             </a:solidFill>
             <a:prstDash val="solid"/>
             <a:round/>
-            <a:headEnd len="sm" w="sm" type="none"/>
-            <a:tailEnd len="sm" w="sm" type="none"/>
+            <a:headEnd type="none" w="sm" len="sm"/>
+            <a:tailEnd type="none" w="sm" len="sm"/>
           </a:ln>
         </p:spPr>
         <p:txBody>
-          <a:bodyPr anchorCtr="0" anchor="ctr" bIns="91425" lIns="91425" spcFirstLastPara="1" rIns="91425" wrap="square" tIns="91425">
+          <a:bodyPr spcFirstLastPara="1" wrap="square" lIns="91425" tIns="91425" rIns="91425" bIns="91425" anchor="ctr" anchorCtr="0">
             <a:noAutofit/>
           </a:bodyPr>
           <a:lstStyle/>
           <a:p>
-            <a:pPr indent="0" lvl="0" marL="0" rtl="0" algn="l">
+            <a:pPr marL="0" lvl="0" indent="0" algn="l" rtl="0">
               <a:spcBef>
                 <a:spcPts val="0"/>
               </a:spcBef>
@@ -2580,9 +2669,6 @@
               </a:spcAft>
               <a:buNone/>
             </a:pPr>
-            <a:r>
-              <a:t/>
-            </a:r>
             <a:endParaRPr/>
           </a:p>
         </p:txBody>
@@ -2624,7 +2710,7 @@
 </file>
 
 <file path=ppt/slideLayouts/slideLayout13.xml><?xml version="1.0" encoding="utf-8"?>
-<p:sldLayout xmlns:a="http://schemas.openxmlformats.org/drawingml/2006/main" xmlns:r="http://schemas.openxmlformats.org/officeDocument/2006/relationships" xmlns:mc="http://schemas.openxmlformats.org/markup-compatibility/2006" xmlns:mv="urn:schemas-microsoft-com:mac:vml" xmlns:p="http://schemas.openxmlformats.org/presentationml/2006/main" xmlns:c="http://schemas.openxmlformats.org/drawingml/2006/chart" xmlns:dgm="http://schemas.openxmlformats.org/drawingml/2006/diagram" xmlns:o="urn:schemas-microsoft-com:office:office" xmlns:v="urn:schemas-microsoft-com:vml" xmlns:pvml="urn:schemas-microsoft-com:office:powerpoint" xmlns:com="http://schemas.openxmlformats.org/drawingml/2006/compatibility" xmlns:p14="http://schemas.microsoft.com/office/powerpoint/2010/main" xmlns:p15="http://schemas.microsoft.com/office/powerpoint/2012/main" xmlns:ahyp="http://schemas.microsoft.com/office/drawing/2018/hyperlinkcolor" matchingName="Portada">
+<p:sldLayout xmlns:a="http://schemas.openxmlformats.org/drawingml/2006/main" xmlns:r="http://schemas.openxmlformats.org/officeDocument/2006/relationships" xmlns:p="http://schemas.openxmlformats.org/presentationml/2006/main" matchingName="Portada">
   <p:cSld name="CUSTOM">
     <p:bg>
       <p:bgPr>
@@ -2636,11 +2722,12 @@
             <a:fillRect/>
           </a:stretch>
         </a:blipFill>
+        <a:effectLst/>
       </p:bgPr>
     </p:bg>
     <p:spTree>
       <p:nvGrpSpPr>
-        <p:cNvPr id="46" name="Shape 46"/>
+        <p:cNvPr id="1" name="Shape 46"/>
         <p:cNvGrpSpPr/>
         <p:nvPr/>
       </p:nvGrpSpPr>
@@ -2655,7 +2742,9 @@
       <p:sp>
         <p:nvSpPr>
           <p:cNvPr id="47" name="Google Shape;47;p14"/>
-          <p:cNvSpPr txBox="1"/>
+          <p:cNvSpPr txBox="1">
+            <a:spLocks noGrp="1"/>
+          </p:cNvSpPr>
           <p:nvPr>
             <p:ph type="title"/>
           </p:nvPr>
@@ -2674,7 +2763,7 @@
           </a:ln>
         </p:spPr>
         <p:txBody>
-          <a:bodyPr anchorCtr="0" anchor="ctr" bIns="91425" lIns="91425" spcFirstLastPara="1" rIns="91425" wrap="square" tIns="91425">
+          <a:bodyPr spcFirstLastPara="1" wrap="square" lIns="91425" tIns="91425" rIns="91425" bIns="91425" anchor="ctr" anchorCtr="0">
             <a:noAutofit/>
           </a:bodyPr>
           <a:lstStyle>
@@ -2686,7 +2775,7 @@
                 <a:spcPts val="0"/>
               </a:spcAft>
               <a:buNone/>
-              <a:defRPr b="1" sz="5000">
+              <a:defRPr sz="5000" b="1">
                 <a:solidFill>
                   <a:srgbClr val="FFFFFF"/>
                 </a:solidFill>
@@ -2704,7 +2793,7 @@
                 <a:spcPts val="0"/>
               </a:spcAft>
               <a:buNone/>
-              <a:defRPr b="1" sz="5000">
+              <a:defRPr sz="5000" b="1">
                 <a:solidFill>
                   <a:srgbClr val="FFFFFF"/>
                 </a:solidFill>
@@ -2722,7 +2811,7 @@
                 <a:spcPts val="0"/>
               </a:spcAft>
               <a:buNone/>
-              <a:defRPr b="1" sz="5000">
+              <a:defRPr sz="5000" b="1">
                 <a:solidFill>
                   <a:srgbClr val="FFFFFF"/>
                 </a:solidFill>
@@ -2740,7 +2829,7 @@
                 <a:spcPts val="0"/>
               </a:spcAft>
               <a:buNone/>
-              <a:defRPr b="1" sz="5000">
+              <a:defRPr sz="5000" b="1">
                 <a:solidFill>
                   <a:srgbClr val="FFFFFF"/>
                 </a:solidFill>
@@ -2758,7 +2847,7 @@
                 <a:spcPts val="0"/>
               </a:spcAft>
               <a:buNone/>
-              <a:defRPr b="1" sz="5000">
+              <a:defRPr sz="5000" b="1">
                 <a:solidFill>
                   <a:srgbClr val="FFFFFF"/>
                 </a:solidFill>
@@ -2776,7 +2865,7 @@
                 <a:spcPts val="0"/>
               </a:spcAft>
               <a:buNone/>
-              <a:defRPr b="1" sz="5000">
+              <a:defRPr sz="5000" b="1">
                 <a:solidFill>
                   <a:srgbClr val="FFFFFF"/>
                 </a:solidFill>
@@ -2794,7 +2883,7 @@
                 <a:spcPts val="0"/>
               </a:spcAft>
               <a:buNone/>
-              <a:defRPr b="1" sz="5000">
+              <a:defRPr sz="5000" b="1">
                 <a:solidFill>
                   <a:srgbClr val="FFFFFF"/>
                 </a:solidFill>
@@ -2812,7 +2901,7 @@
                 <a:spcPts val="0"/>
               </a:spcAft>
               <a:buNone/>
-              <a:defRPr b="1" sz="5000">
+              <a:defRPr sz="5000" b="1">
                 <a:solidFill>
                   <a:srgbClr val="FFFFFF"/>
                 </a:solidFill>
@@ -2830,7 +2919,7 @@
                 <a:spcPts val="0"/>
               </a:spcAft>
               <a:buNone/>
-              <a:defRPr b="1" sz="5000">
+              <a:defRPr sz="5000" b="1">
                 <a:solidFill>
                   <a:srgbClr val="FFFFFF"/>
                 </a:solidFill>
@@ -2841,7 +2930,9 @@
               </a:defRPr>
             </a:lvl9pPr>
           </a:lstStyle>
-          <a:p/>
+          <a:p>
+            <a:endParaRPr/>
+          </a:p>
         </p:txBody>
       </p:sp>
       <p:pic>
@@ -2881,11 +2972,11 @@
 </file>
 
 <file path=ppt/slideLayouts/slideLayout2.xml><?xml version="1.0" encoding="utf-8"?>
-<p:sldLayout xmlns:a="http://schemas.openxmlformats.org/drawingml/2006/main" xmlns:r="http://schemas.openxmlformats.org/officeDocument/2006/relationships" xmlns:mc="http://schemas.openxmlformats.org/markup-compatibility/2006" xmlns:mv="urn:schemas-microsoft-com:mac:vml" xmlns:p="http://schemas.openxmlformats.org/presentationml/2006/main" xmlns:c="http://schemas.openxmlformats.org/drawingml/2006/chart" xmlns:dgm="http://schemas.openxmlformats.org/drawingml/2006/diagram" xmlns:o="urn:schemas-microsoft-com:office:office" xmlns:v="urn:schemas-microsoft-com:vml" xmlns:pvml="urn:schemas-microsoft-com:office:powerpoint" xmlns:com="http://schemas.openxmlformats.org/drawingml/2006/compatibility" xmlns:p14="http://schemas.microsoft.com/office/powerpoint/2010/main" xmlns:p15="http://schemas.microsoft.com/office/powerpoint/2012/main" xmlns:ahyp="http://schemas.microsoft.com/office/drawing/2018/hyperlinkcolor" matchingName="Section header" type="secHead">
+<p:sldLayout xmlns:a="http://schemas.openxmlformats.org/drawingml/2006/main" xmlns:r="http://schemas.openxmlformats.org/officeDocument/2006/relationships" xmlns:p="http://schemas.openxmlformats.org/presentationml/2006/main" matchingName="Section header" type="secHead">
   <p:cSld name="SECTION_HEADER">
     <p:spTree>
       <p:nvGrpSpPr>
-        <p:cNvPr id="16" name="Shape 16"/>
+        <p:cNvPr id="1" name="Shape 16"/>
         <p:cNvGrpSpPr/>
         <p:nvPr/>
       </p:nvGrpSpPr>
@@ -2900,7 +2991,9 @@
       <p:sp>
         <p:nvSpPr>
           <p:cNvPr id="17" name="Google Shape;17;p3"/>
-          <p:cNvSpPr txBox="1"/>
+          <p:cNvSpPr txBox="1">
+            <a:spLocks noGrp="1"/>
+          </p:cNvSpPr>
           <p:nvPr>
             <p:ph type="title"/>
           </p:nvPr>
@@ -2919,7 +3012,7 @@
           </a:ln>
         </p:spPr>
         <p:txBody>
-          <a:bodyPr anchorCtr="0" anchor="ctr" bIns="91425" lIns="91425" spcFirstLastPara="1" rIns="91425" wrap="square" tIns="91425">
+          <a:bodyPr spcFirstLastPara="1" wrap="square" lIns="91425" tIns="91425" rIns="91425" bIns="91425" anchor="ctr" anchorCtr="0">
             <a:noAutofit/>
           </a:bodyPr>
           <a:lstStyle>
@@ -3023,7 +3116,9 @@
               <a:defRPr sz="3600"/>
             </a:lvl9pPr>
           </a:lstStyle>
-          <a:p/>
+          <a:p>
+            <a:endParaRPr/>
+          </a:p>
         </p:txBody>
       </p:sp>
     </p:spTree>
@@ -3035,11 +3130,11 @@
 </file>
 
 <file path=ppt/slideLayouts/slideLayout3.xml><?xml version="1.0" encoding="utf-8"?>
-<p:sldLayout xmlns:a="http://schemas.openxmlformats.org/drawingml/2006/main" xmlns:r="http://schemas.openxmlformats.org/officeDocument/2006/relationships" xmlns:mc="http://schemas.openxmlformats.org/markup-compatibility/2006" xmlns:mv="urn:schemas-microsoft-com:mac:vml" xmlns:p="http://schemas.openxmlformats.org/presentationml/2006/main" xmlns:c="http://schemas.openxmlformats.org/drawingml/2006/chart" xmlns:dgm="http://schemas.openxmlformats.org/drawingml/2006/diagram" xmlns:o="urn:schemas-microsoft-com:office:office" xmlns:v="urn:schemas-microsoft-com:vml" xmlns:pvml="urn:schemas-microsoft-com:office:powerpoint" xmlns:com="http://schemas.openxmlformats.org/drawingml/2006/compatibility" xmlns:p14="http://schemas.microsoft.com/office/powerpoint/2010/main" xmlns:p15="http://schemas.microsoft.com/office/powerpoint/2012/main" xmlns:ahyp="http://schemas.microsoft.com/office/drawing/2018/hyperlinkcolor" matchingName="Title and body" type="tx">
+<p:sldLayout xmlns:a="http://schemas.openxmlformats.org/drawingml/2006/main" xmlns:r="http://schemas.openxmlformats.org/officeDocument/2006/relationships" xmlns:p="http://schemas.openxmlformats.org/presentationml/2006/main" matchingName="Title and body" type="tx">
   <p:cSld name="TITLE_AND_BODY">
     <p:spTree>
       <p:nvGrpSpPr>
-        <p:cNvPr id="18" name="Shape 18"/>
+        <p:cNvPr id="1" name="Shape 18"/>
         <p:cNvGrpSpPr/>
         <p:nvPr/>
       </p:nvGrpSpPr>
@@ -3054,7 +3149,9 @@
       <p:sp>
         <p:nvSpPr>
           <p:cNvPr id="19" name="Google Shape;19;p4"/>
-          <p:cNvSpPr txBox="1"/>
+          <p:cNvSpPr txBox="1">
+            <a:spLocks noGrp="1"/>
+          </p:cNvSpPr>
           <p:nvPr>
             <p:ph type="title"/>
           </p:nvPr>
@@ -3073,7 +3170,7 @@
           </a:ln>
         </p:spPr>
         <p:txBody>
-          <a:bodyPr anchorCtr="0" anchor="ctr" bIns="91425" lIns="91425" spcFirstLastPara="1" rIns="91425" wrap="square" tIns="91425">
+          <a:bodyPr spcFirstLastPara="1" wrap="square" lIns="91425" tIns="91425" rIns="91425" bIns="91425" anchor="ctr" anchorCtr="0">
             <a:noAutofit/>
           </a:bodyPr>
           <a:lstStyle>
@@ -3177,15 +3274,19 @@
               <a:defRPr/>
             </a:lvl9pPr>
           </a:lstStyle>
-          <a:p/>
+          <a:p>
+            <a:endParaRPr/>
+          </a:p>
         </p:txBody>
       </p:sp>
       <p:sp>
         <p:nvSpPr>
           <p:cNvPr id="20" name="Google Shape;20;p4"/>
-          <p:cNvSpPr txBox="1"/>
+          <p:cNvSpPr txBox="1">
+            <a:spLocks noGrp="1"/>
+          </p:cNvSpPr>
           <p:nvPr>
-            <p:ph idx="1" type="body"/>
+            <p:ph type="body" idx="1"/>
           </p:nvPr>
         </p:nvSpPr>
         <p:spPr>
@@ -3202,11 +3303,11 @@
           </a:ln>
         </p:spPr>
         <p:txBody>
-          <a:bodyPr anchorCtr="0" anchor="ctr" bIns="91425" lIns="91425" spcFirstLastPara="1" rIns="91425" wrap="square" tIns="91425">
+          <a:bodyPr spcFirstLastPara="1" wrap="square" lIns="91425" tIns="91425" rIns="91425" bIns="91425" anchor="ctr" anchorCtr="0">
             <a:noAutofit/>
           </a:bodyPr>
           <a:lstStyle>
-            <a:lvl1pPr indent="-317500" lvl="0" marL="457200">
+            <a:lvl1pPr marL="457200" lvl="0" indent="-317500">
               <a:spcBef>
                 <a:spcPts val="0"/>
               </a:spcBef>
@@ -3217,7 +3318,7 @@
               <a:buChar char="●"/>
               <a:defRPr/>
             </a:lvl1pPr>
-            <a:lvl2pPr indent="-317500" lvl="1" marL="914400">
+            <a:lvl2pPr marL="914400" lvl="1" indent="-317500">
               <a:spcBef>
                 <a:spcPts val="0"/>
               </a:spcBef>
@@ -3228,7 +3329,7 @@
               <a:buChar char="○"/>
               <a:defRPr/>
             </a:lvl2pPr>
-            <a:lvl3pPr indent="-317500" lvl="2" marL="1371600">
+            <a:lvl3pPr marL="1371600" lvl="2" indent="-317500">
               <a:spcBef>
                 <a:spcPts val="0"/>
               </a:spcBef>
@@ -3239,7 +3340,7 @@
               <a:buChar char="■"/>
               <a:defRPr/>
             </a:lvl3pPr>
-            <a:lvl4pPr indent="-317500" lvl="3" marL="1828800">
+            <a:lvl4pPr marL="1828800" lvl="3" indent="-317500">
               <a:spcBef>
                 <a:spcPts val="0"/>
               </a:spcBef>
@@ -3250,7 +3351,7 @@
               <a:buChar char="●"/>
               <a:defRPr/>
             </a:lvl4pPr>
-            <a:lvl5pPr indent="-317500" lvl="4" marL="2286000">
+            <a:lvl5pPr marL="2286000" lvl="4" indent="-317500">
               <a:spcBef>
                 <a:spcPts val="0"/>
               </a:spcBef>
@@ -3261,7 +3362,7 @@
               <a:buChar char="○"/>
               <a:defRPr/>
             </a:lvl5pPr>
-            <a:lvl6pPr indent="-317500" lvl="5" marL="2743200">
+            <a:lvl6pPr marL="2743200" lvl="5" indent="-317500">
               <a:spcBef>
                 <a:spcPts val="0"/>
               </a:spcBef>
@@ -3272,7 +3373,7 @@
               <a:buChar char="■"/>
               <a:defRPr/>
             </a:lvl6pPr>
-            <a:lvl7pPr indent="-317500" lvl="6" marL="3200400">
+            <a:lvl7pPr marL="3200400" lvl="6" indent="-317500">
               <a:spcBef>
                 <a:spcPts val="0"/>
               </a:spcBef>
@@ -3283,7 +3384,7 @@
               <a:buChar char="●"/>
               <a:defRPr/>
             </a:lvl7pPr>
-            <a:lvl8pPr indent="-317500" lvl="7" marL="3657600">
+            <a:lvl8pPr marL="3657600" lvl="7" indent="-317500">
               <a:spcBef>
                 <a:spcPts val="0"/>
               </a:spcBef>
@@ -3294,7 +3395,7 @@
               <a:buChar char="○"/>
               <a:defRPr/>
             </a:lvl8pPr>
-            <a:lvl9pPr indent="-317500" lvl="8" marL="4114800">
+            <a:lvl9pPr marL="4114800" lvl="8" indent="-317500">
               <a:spcBef>
                 <a:spcPts val="0"/>
               </a:spcBef>
@@ -3306,7 +3407,9 @@
               <a:defRPr/>
             </a:lvl9pPr>
           </a:lstStyle>
-          <a:p/>
+          <a:p>
+            <a:endParaRPr/>
+          </a:p>
         </p:txBody>
       </p:sp>
     </p:spTree>
@@ -3318,11 +3421,11 @@
 </file>
 
 <file path=ppt/slideLayouts/slideLayout4.xml><?xml version="1.0" encoding="utf-8"?>
-<p:sldLayout xmlns:a="http://schemas.openxmlformats.org/drawingml/2006/main" xmlns:r="http://schemas.openxmlformats.org/officeDocument/2006/relationships" xmlns:mc="http://schemas.openxmlformats.org/markup-compatibility/2006" xmlns:mv="urn:schemas-microsoft-com:mac:vml" xmlns:p="http://schemas.openxmlformats.org/presentationml/2006/main" xmlns:c="http://schemas.openxmlformats.org/drawingml/2006/chart" xmlns:dgm="http://schemas.openxmlformats.org/drawingml/2006/diagram" xmlns:o="urn:schemas-microsoft-com:office:office" xmlns:v="urn:schemas-microsoft-com:vml" xmlns:pvml="urn:schemas-microsoft-com:office:powerpoint" xmlns:com="http://schemas.openxmlformats.org/drawingml/2006/compatibility" xmlns:p14="http://schemas.microsoft.com/office/powerpoint/2010/main" xmlns:p15="http://schemas.microsoft.com/office/powerpoint/2012/main" xmlns:ahyp="http://schemas.microsoft.com/office/drawing/2018/hyperlinkcolor" matchingName="Title and two columns" type="twoColTx">
+<p:sldLayout xmlns:a="http://schemas.openxmlformats.org/drawingml/2006/main" xmlns:r="http://schemas.openxmlformats.org/officeDocument/2006/relationships" xmlns:p="http://schemas.openxmlformats.org/presentationml/2006/main" matchingName="Title and two columns" type="twoColTx">
   <p:cSld name="TITLE_AND_TWO_COLUMNS">
     <p:spTree>
       <p:nvGrpSpPr>
-        <p:cNvPr id="21" name="Shape 21"/>
+        <p:cNvPr id="1" name="Shape 21"/>
         <p:cNvGrpSpPr/>
         <p:nvPr/>
       </p:nvGrpSpPr>
@@ -3337,7 +3440,9 @@
       <p:sp>
         <p:nvSpPr>
           <p:cNvPr id="22" name="Google Shape;22;p5"/>
-          <p:cNvSpPr txBox="1"/>
+          <p:cNvSpPr txBox="1">
+            <a:spLocks noGrp="1"/>
+          </p:cNvSpPr>
           <p:nvPr>
             <p:ph type="title"/>
           </p:nvPr>
@@ -3356,7 +3461,7 @@
           </a:ln>
         </p:spPr>
         <p:txBody>
-          <a:bodyPr anchorCtr="0" anchor="ctr" bIns="91425" lIns="91425" spcFirstLastPara="1" rIns="91425" wrap="square" tIns="91425">
+          <a:bodyPr spcFirstLastPara="1" wrap="square" lIns="91425" tIns="91425" rIns="91425" bIns="91425" anchor="ctr" anchorCtr="0">
             <a:noAutofit/>
           </a:bodyPr>
           <a:lstStyle>
@@ -3460,15 +3565,19 @@
               <a:defRPr/>
             </a:lvl9pPr>
           </a:lstStyle>
-          <a:p/>
+          <a:p>
+            <a:endParaRPr/>
+          </a:p>
         </p:txBody>
       </p:sp>
       <p:sp>
         <p:nvSpPr>
           <p:cNvPr id="23" name="Google Shape;23;p5"/>
-          <p:cNvSpPr txBox="1"/>
+          <p:cNvSpPr txBox="1">
+            <a:spLocks noGrp="1"/>
+          </p:cNvSpPr>
           <p:nvPr>
-            <p:ph idx="1" type="body"/>
+            <p:ph type="body" idx="1"/>
           </p:nvPr>
         </p:nvSpPr>
         <p:spPr>
@@ -3485,11 +3594,11 @@
           </a:ln>
         </p:spPr>
         <p:txBody>
-          <a:bodyPr anchorCtr="0" anchor="ctr" bIns="91425" lIns="91425" spcFirstLastPara="1" rIns="91425" wrap="square" tIns="91425">
+          <a:bodyPr spcFirstLastPara="1" wrap="square" lIns="91425" tIns="91425" rIns="91425" bIns="91425" anchor="ctr" anchorCtr="0">
             <a:noAutofit/>
           </a:bodyPr>
           <a:lstStyle>
-            <a:lvl1pPr indent="-317500" lvl="0" marL="457200">
+            <a:lvl1pPr marL="457200" lvl="0" indent="-317500">
               <a:spcBef>
                 <a:spcPts val="0"/>
               </a:spcBef>
@@ -3500,7 +3609,7 @@
               <a:buChar char="●"/>
               <a:defRPr sz="1400"/>
             </a:lvl1pPr>
-            <a:lvl2pPr indent="-304800" lvl="1" marL="914400">
+            <a:lvl2pPr marL="914400" lvl="1" indent="-304800">
               <a:spcBef>
                 <a:spcPts val="0"/>
               </a:spcBef>
@@ -3511,7 +3620,7 @@
               <a:buChar char="○"/>
               <a:defRPr sz="1200"/>
             </a:lvl2pPr>
-            <a:lvl3pPr indent="-304800" lvl="2" marL="1371600">
+            <a:lvl3pPr marL="1371600" lvl="2" indent="-304800">
               <a:spcBef>
                 <a:spcPts val="0"/>
               </a:spcBef>
@@ -3522,7 +3631,7 @@
               <a:buChar char="■"/>
               <a:defRPr sz="1200"/>
             </a:lvl3pPr>
-            <a:lvl4pPr indent="-304800" lvl="3" marL="1828800">
+            <a:lvl4pPr marL="1828800" lvl="3" indent="-304800">
               <a:spcBef>
                 <a:spcPts val="0"/>
               </a:spcBef>
@@ -3533,7 +3642,7 @@
               <a:buChar char="●"/>
               <a:defRPr sz="1200"/>
             </a:lvl4pPr>
-            <a:lvl5pPr indent="-304800" lvl="4" marL="2286000">
+            <a:lvl5pPr marL="2286000" lvl="4" indent="-304800">
               <a:spcBef>
                 <a:spcPts val="0"/>
               </a:spcBef>
@@ -3544,7 +3653,7 @@
               <a:buChar char="○"/>
               <a:defRPr sz="1200"/>
             </a:lvl5pPr>
-            <a:lvl6pPr indent="-304800" lvl="5" marL="2743200">
+            <a:lvl6pPr marL="2743200" lvl="5" indent="-304800">
               <a:spcBef>
                 <a:spcPts val="0"/>
               </a:spcBef>
@@ -3555,7 +3664,7 @@
               <a:buChar char="■"/>
               <a:defRPr sz="1200"/>
             </a:lvl6pPr>
-            <a:lvl7pPr indent="-304800" lvl="6" marL="3200400">
+            <a:lvl7pPr marL="3200400" lvl="6" indent="-304800">
               <a:spcBef>
                 <a:spcPts val="0"/>
               </a:spcBef>
@@ -3566,7 +3675,7 @@
               <a:buChar char="●"/>
               <a:defRPr sz="1200"/>
             </a:lvl7pPr>
-            <a:lvl8pPr indent="-304800" lvl="7" marL="3657600">
+            <a:lvl8pPr marL="3657600" lvl="7" indent="-304800">
               <a:spcBef>
                 <a:spcPts val="0"/>
               </a:spcBef>
@@ -3577,7 +3686,7 @@
               <a:buChar char="○"/>
               <a:defRPr sz="1200"/>
             </a:lvl8pPr>
-            <a:lvl9pPr indent="-304800" lvl="8" marL="4114800">
+            <a:lvl9pPr marL="4114800" lvl="8" indent="-304800">
               <a:spcBef>
                 <a:spcPts val="0"/>
               </a:spcBef>
@@ -3589,15 +3698,19 @@
               <a:defRPr sz="1200"/>
             </a:lvl9pPr>
           </a:lstStyle>
-          <a:p/>
+          <a:p>
+            <a:endParaRPr/>
+          </a:p>
         </p:txBody>
       </p:sp>
       <p:sp>
         <p:nvSpPr>
           <p:cNvPr id="24" name="Google Shape;24;p5"/>
-          <p:cNvSpPr txBox="1"/>
+          <p:cNvSpPr txBox="1">
+            <a:spLocks noGrp="1"/>
+          </p:cNvSpPr>
           <p:nvPr>
-            <p:ph idx="2" type="body"/>
+            <p:ph type="body" idx="2"/>
           </p:nvPr>
         </p:nvSpPr>
         <p:spPr>
@@ -3614,11 +3727,11 @@
           </a:ln>
         </p:spPr>
         <p:txBody>
-          <a:bodyPr anchorCtr="0" anchor="ctr" bIns="91425" lIns="91425" spcFirstLastPara="1" rIns="91425" wrap="square" tIns="91425">
+          <a:bodyPr spcFirstLastPara="1" wrap="square" lIns="91425" tIns="91425" rIns="91425" bIns="91425" anchor="ctr" anchorCtr="0">
             <a:noAutofit/>
           </a:bodyPr>
           <a:lstStyle>
-            <a:lvl1pPr indent="-317500" lvl="0" marL="457200">
+            <a:lvl1pPr marL="457200" lvl="0" indent="-317500">
               <a:spcBef>
                 <a:spcPts val="0"/>
               </a:spcBef>
@@ -3629,7 +3742,7 @@
               <a:buChar char="●"/>
               <a:defRPr sz="1400"/>
             </a:lvl1pPr>
-            <a:lvl2pPr indent="-304800" lvl="1" marL="914400">
+            <a:lvl2pPr marL="914400" lvl="1" indent="-304800">
               <a:spcBef>
                 <a:spcPts val="0"/>
               </a:spcBef>
@@ -3640,7 +3753,7 @@
               <a:buChar char="○"/>
               <a:defRPr sz="1200"/>
             </a:lvl2pPr>
-            <a:lvl3pPr indent="-304800" lvl="2" marL="1371600">
+            <a:lvl3pPr marL="1371600" lvl="2" indent="-304800">
               <a:spcBef>
                 <a:spcPts val="0"/>
               </a:spcBef>
@@ -3651,7 +3764,7 @@
               <a:buChar char="■"/>
               <a:defRPr sz="1200"/>
             </a:lvl3pPr>
-            <a:lvl4pPr indent="-304800" lvl="3" marL="1828800">
+            <a:lvl4pPr marL="1828800" lvl="3" indent="-304800">
               <a:spcBef>
                 <a:spcPts val="0"/>
               </a:spcBef>
@@ -3662,7 +3775,7 @@
               <a:buChar char="●"/>
               <a:defRPr sz="1200"/>
             </a:lvl4pPr>
-            <a:lvl5pPr indent="-304800" lvl="4" marL="2286000">
+            <a:lvl5pPr marL="2286000" lvl="4" indent="-304800">
               <a:spcBef>
                 <a:spcPts val="0"/>
               </a:spcBef>
@@ -3673,7 +3786,7 @@
               <a:buChar char="○"/>
               <a:defRPr sz="1200"/>
             </a:lvl5pPr>
-            <a:lvl6pPr indent="-304800" lvl="5" marL="2743200">
+            <a:lvl6pPr marL="2743200" lvl="5" indent="-304800">
               <a:spcBef>
                 <a:spcPts val="0"/>
               </a:spcBef>
@@ -3684,7 +3797,7 @@
               <a:buChar char="■"/>
               <a:defRPr sz="1200"/>
             </a:lvl6pPr>
-            <a:lvl7pPr indent="-304800" lvl="6" marL="3200400">
+            <a:lvl7pPr marL="3200400" lvl="6" indent="-304800">
               <a:spcBef>
                 <a:spcPts val="0"/>
               </a:spcBef>
@@ -3695,7 +3808,7 @@
               <a:buChar char="●"/>
               <a:defRPr sz="1200"/>
             </a:lvl7pPr>
-            <a:lvl8pPr indent="-304800" lvl="7" marL="3657600">
+            <a:lvl8pPr marL="3657600" lvl="7" indent="-304800">
               <a:spcBef>
                 <a:spcPts val="0"/>
               </a:spcBef>
@@ -3706,7 +3819,7 @@
               <a:buChar char="○"/>
               <a:defRPr sz="1200"/>
             </a:lvl8pPr>
-            <a:lvl9pPr indent="-304800" lvl="8" marL="4114800">
+            <a:lvl9pPr marL="4114800" lvl="8" indent="-304800">
               <a:spcBef>
                 <a:spcPts val="0"/>
               </a:spcBef>
@@ -3718,7 +3831,9 @@
               <a:defRPr sz="1200"/>
             </a:lvl9pPr>
           </a:lstStyle>
-          <a:p/>
+          <a:p>
+            <a:endParaRPr/>
+          </a:p>
         </p:txBody>
       </p:sp>
     </p:spTree>
@@ -3730,11 +3845,11 @@
 </file>
 
 <file path=ppt/slideLayouts/slideLayout5.xml><?xml version="1.0" encoding="utf-8"?>
-<p:sldLayout xmlns:a="http://schemas.openxmlformats.org/drawingml/2006/main" xmlns:r="http://schemas.openxmlformats.org/officeDocument/2006/relationships" xmlns:mc="http://schemas.openxmlformats.org/markup-compatibility/2006" xmlns:mv="urn:schemas-microsoft-com:mac:vml" xmlns:p="http://schemas.openxmlformats.org/presentationml/2006/main" xmlns:c="http://schemas.openxmlformats.org/drawingml/2006/chart" xmlns:dgm="http://schemas.openxmlformats.org/drawingml/2006/diagram" xmlns:o="urn:schemas-microsoft-com:office:office" xmlns:v="urn:schemas-microsoft-com:vml" xmlns:pvml="urn:schemas-microsoft-com:office:powerpoint" xmlns:com="http://schemas.openxmlformats.org/drawingml/2006/compatibility" xmlns:p14="http://schemas.microsoft.com/office/powerpoint/2010/main" xmlns:p15="http://schemas.microsoft.com/office/powerpoint/2012/main" xmlns:ahyp="http://schemas.microsoft.com/office/drawing/2018/hyperlinkcolor" matchingName="Title only" type="titleOnly">
+<p:sldLayout xmlns:a="http://schemas.openxmlformats.org/drawingml/2006/main" xmlns:r="http://schemas.openxmlformats.org/officeDocument/2006/relationships" xmlns:p="http://schemas.openxmlformats.org/presentationml/2006/main" matchingName="Title only" type="titleOnly">
   <p:cSld name="TITLE_ONLY">
     <p:spTree>
       <p:nvGrpSpPr>
-        <p:cNvPr id="25" name="Shape 25"/>
+        <p:cNvPr id="1" name="Shape 25"/>
         <p:cNvGrpSpPr/>
         <p:nvPr/>
       </p:nvGrpSpPr>
@@ -3749,7 +3864,9 @@
       <p:sp>
         <p:nvSpPr>
           <p:cNvPr id="26" name="Google Shape;26;p6"/>
-          <p:cNvSpPr txBox="1"/>
+          <p:cNvSpPr txBox="1">
+            <a:spLocks noGrp="1"/>
+          </p:cNvSpPr>
           <p:nvPr>
             <p:ph type="title"/>
           </p:nvPr>
@@ -3768,7 +3885,7 @@
           </a:ln>
         </p:spPr>
         <p:txBody>
-          <a:bodyPr anchorCtr="0" anchor="ctr" bIns="91425" lIns="91425" spcFirstLastPara="1" rIns="91425" wrap="square" tIns="91425">
+          <a:bodyPr spcFirstLastPara="1" wrap="square" lIns="91425" tIns="91425" rIns="91425" bIns="91425" anchor="ctr" anchorCtr="0">
             <a:noAutofit/>
           </a:bodyPr>
           <a:lstStyle>
@@ -3872,7 +3989,9 @@
               <a:defRPr/>
             </a:lvl9pPr>
           </a:lstStyle>
-          <a:p/>
+          <a:p>
+            <a:endParaRPr/>
+          </a:p>
         </p:txBody>
       </p:sp>
     </p:spTree>
@@ -3884,11 +4003,11 @@
 </file>
 
 <file path=ppt/slideLayouts/slideLayout6.xml><?xml version="1.0" encoding="utf-8"?>
-<p:sldLayout xmlns:a="http://schemas.openxmlformats.org/drawingml/2006/main" xmlns:r="http://schemas.openxmlformats.org/officeDocument/2006/relationships" xmlns:mc="http://schemas.openxmlformats.org/markup-compatibility/2006" xmlns:mv="urn:schemas-microsoft-com:mac:vml" xmlns:p="http://schemas.openxmlformats.org/presentationml/2006/main" xmlns:c="http://schemas.openxmlformats.org/drawingml/2006/chart" xmlns:dgm="http://schemas.openxmlformats.org/drawingml/2006/diagram" xmlns:o="urn:schemas-microsoft-com:office:office" xmlns:v="urn:schemas-microsoft-com:vml" xmlns:pvml="urn:schemas-microsoft-com:office:powerpoint" xmlns:com="http://schemas.openxmlformats.org/drawingml/2006/compatibility" xmlns:p14="http://schemas.microsoft.com/office/powerpoint/2010/main" xmlns:p15="http://schemas.microsoft.com/office/powerpoint/2012/main" xmlns:ahyp="http://schemas.microsoft.com/office/drawing/2018/hyperlinkcolor" matchingName="One column text">
+<p:sldLayout xmlns:a="http://schemas.openxmlformats.org/drawingml/2006/main" xmlns:r="http://schemas.openxmlformats.org/officeDocument/2006/relationships" xmlns:p="http://schemas.openxmlformats.org/presentationml/2006/main" matchingName="One column text">
   <p:cSld name="ONE_COLUMN_TEXT">
     <p:spTree>
       <p:nvGrpSpPr>
-        <p:cNvPr id="27" name="Shape 27"/>
+        <p:cNvPr id="1" name="Shape 27"/>
         <p:cNvGrpSpPr/>
         <p:nvPr/>
       </p:nvGrpSpPr>
@@ -3903,7 +4022,9 @@
       <p:sp>
         <p:nvSpPr>
           <p:cNvPr id="28" name="Google Shape;28;p7"/>
-          <p:cNvSpPr txBox="1"/>
+          <p:cNvSpPr txBox="1">
+            <a:spLocks noGrp="1"/>
+          </p:cNvSpPr>
           <p:nvPr>
             <p:ph type="title"/>
           </p:nvPr>
@@ -3922,7 +4043,7 @@
           </a:ln>
         </p:spPr>
         <p:txBody>
-          <a:bodyPr anchorCtr="0" anchor="b" bIns="91425" lIns="91425" spcFirstLastPara="1" rIns="91425" wrap="square" tIns="91425">
+          <a:bodyPr spcFirstLastPara="1" wrap="square" lIns="91425" tIns="91425" rIns="91425" bIns="91425" anchor="b" anchorCtr="0">
             <a:noAutofit/>
           </a:bodyPr>
           <a:lstStyle>
@@ -4026,15 +4147,19 @@
               <a:defRPr sz="2400"/>
             </a:lvl9pPr>
           </a:lstStyle>
-          <a:p/>
+          <a:p>
+            <a:endParaRPr/>
+          </a:p>
         </p:txBody>
       </p:sp>
       <p:sp>
         <p:nvSpPr>
           <p:cNvPr id="29" name="Google Shape;29;p7"/>
-          <p:cNvSpPr txBox="1"/>
+          <p:cNvSpPr txBox="1">
+            <a:spLocks noGrp="1"/>
+          </p:cNvSpPr>
           <p:nvPr>
-            <p:ph idx="1" type="body"/>
+            <p:ph type="body" idx="1"/>
           </p:nvPr>
         </p:nvSpPr>
         <p:spPr>
@@ -4051,11 +4176,11 @@
           </a:ln>
         </p:spPr>
         <p:txBody>
-          <a:bodyPr anchorCtr="0" anchor="ctr" bIns="91425" lIns="91425" spcFirstLastPara="1" rIns="91425" wrap="square" tIns="91425">
+          <a:bodyPr spcFirstLastPara="1" wrap="square" lIns="91425" tIns="91425" rIns="91425" bIns="91425" anchor="ctr" anchorCtr="0">
             <a:noAutofit/>
           </a:bodyPr>
           <a:lstStyle>
-            <a:lvl1pPr indent="-304800" lvl="0" marL="457200">
+            <a:lvl1pPr marL="457200" lvl="0" indent="-304800">
               <a:spcBef>
                 <a:spcPts val="0"/>
               </a:spcBef>
@@ -4066,7 +4191,7 @@
               <a:buChar char="●"/>
               <a:defRPr sz="1200"/>
             </a:lvl1pPr>
-            <a:lvl2pPr indent="-304800" lvl="1" marL="914400">
+            <a:lvl2pPr marL="914400" lvl="1" indent="-304800">
               <a:spcBef>
                 <a:spcPts val="0"/>
               </a:spcBef>
@@ -4077,7 +4202,7 @@
               <a:buChar char="○"/>
               <a:defRPr sz="1200"/>
             </a:lvl2pPr>
-            <a:lvl3pPr indent="-304800" lvl="2" marL="1371600">
+            <a:lvl3pPr marL="1371600" lvl="2" indent="-304800">
               <a:spcBef>
                 <a:spcPts val="0"/>
               </a:spcBef>
@@ -4088,7 +4213,7 @@
               <a:buChar char="■"/>
               <a:defRPr sz="1200"/>
             </a:lvl3pPr>
-            <a:lvl4pPr indent="-304800" lvl="3" marL="1828800">
+            <a:lvl4pPr marL="1828800" lvl="3" indent="-304800">
               <a:spcBef>
                 <a:spcPts val="0"/>
               </a:spcBef>
@@ -4099,7 +4224,7 @@
               <a:buChar char="●"/>
               <a:defRPr sz="1200"/>
             </a:lvl4pPr>
-            <a:lvl5pPr indent="-304800" lvl="4" marL="2286000">
+            <a:lvl5pPr marL="2286000" lvl="4" indent="-304800">
               <a:spcBef>
                 <a:spcPts val="0"/>
               </a:spcBef>
@@ -4110,7 +4235,7 @@
               <a:buChar char="○"/>
               <a:defRPr sz="1200"/>
             </a:lvl5pPr>
-            <a:lvl6pPr indent="-304800" lvl="5" marL="2743200">
+            <a:lvl6pPr marL="2743200" lvl="5" indent="-304800">
               <a:spcBef>
                 <a:spcPts val="0"/>
               </a:spcBef>
@@ -4121,7 +4246,7 @@
               <a:buChar char="■"/>
               <a:defRPr sz="1200"/>
             </a:lvl6pPr>
-            <a:lvl7pPr indent="-304800" lvl="6" marL="3200400">
+            <a:lvl7pPr marL="3200400" lvl="6" indent="-304800">
               <a:spcBef>
                 <a:spcPts val="0"/>
               </a:spcBef>
@@ -4132,7 +4257,7 @@
               <a:buChar char="●"/>
               <a:defRPr sz="1200"/>
             </a:lvl7pPr>
-            <a:lvl8pPr indent="-304800" lvl="7" marL="3657600">
+            <a:lvl8pPr marL="3657600" lvl="7" indent="-304800">
               <a:spcBef>
                 <a:spcPts val="0"/>
               </a:spcBef>
@@ -4143,7 +4268,7 @@
               <a:buChar char="○"/>
               <a:defRPr sz="1200"/>
             </a:lvl8pPr>
-            <a:lvl9pPr indent="-304800" lvl="8" marL="4114800">
+            <a:lvl9pPr marL="4114800" lvl="8" indent="-304800">
               <a:spcBef>
                 <a:spcPts val="0"/>
               </a:spcBef>
@@ -4155,7 +4280,9 @@
               <a:defRPr sz="1200"/>
             </a:lvl9pPr>
           </a:lstStyle>
-          <a:p/>
+          <a:p>
+            <a:endParaRPr/>
+          </a:p>
         </p:txBody>
       </p:sp>
     </p:spTree>
@@ -4167,11 +4294,11 @@
 </file>
 
 <file path=ppt/slideLayouts/slideLayout7.xml><?xml version="1.0" encoding="utf-8"?>
-<p:sldLayout xmlns:a="http://schemas.openxmlformats.org/drawingml/2006/main" xmlns:r="http://schemas.openxmlformats.org/officeDocument/2006/relationships" xmlns:mc="http://schemas.openxmlformats.org/markup-compatibility/2006" xmlns:mv="urn:schemas-microsoft-com:mac:vml" xmlns:p="http://schemas.openxmlformats.org/presentationml/2006/main" xmlns:c="http://schemas.openxmlformats.org/drawingml/2006/chart" xmlns:dgm="http://schemas.openxmlformats.org/drawingml/2006/diagram" xmlns:o="urn:schemas-microsoft-com:office:office" xmlns:v="urn:schemas-microsoft-com:vml" xmlns:pvml="urn:schemas-microsoft-com:office:powerpoint" xmlns:com="http://schemas.openxmlformats.org/drawingml/2006/compatibility" xmlns:p14="http://schemas.microsoft.com/office/powerpoint/2010/main" xmlns:p15="http://schemas.microsoft.com/office/powerpoint/2012/main" xmlns:ahyp="http://schemas.microsoft.com/office/drawing/2018/hyperlinkcolor" matchingName="Main point">
+<p:sldLayout xmlns:a="http://schemas.openxmlformats.org/drawingml/2006/main" xmlns:r="http://schemas.openxmlformats.org/officeDocument/2006/relationships" xmlns:p="http://schemas.openxmlformats.org/presentationml/2006/main" matchingName="Main point">
   <p:cSld name="MAIN_POINT">
     <p:spTree>
       <p:nvGrpSpPr>
-        <p:cNvPr id="30" name="Shape 30"/>
+        <p:cNvPr id="1" name="Shape 30"/>
         <p:cNvGrpSpPr/>
         <p:nvPr/>
       </p:nvGrpSpPr>
@@ -4186,7 +4313,9 @@
       <p:sp>
         <p:nvSpPr>
           <p:cNvPr id="31" name="Google Shape;31;p8"/>
-          <p:cNvSpPr txBox="1"/>
+          <p:cNvSpPr txBox="1">
+            <a:spLocks noGrp="1"/>
+          </p:cNvSpPr>
           <p:nvPr>
             <p:ph type="title"/>
           </p:nvPr>
@@ -4205,7 +4334,7 @@
           </a:ln>
         </p:spPr>
         <p:txBody>
-          <a:bodyPr anchorCtr="0" anchor="ctr" bIns="91425" lIns="91425" spcFirstLastPara="1" rIns="91425" wrap="square" tIns="91425">
+          <a:bodyPr spcFirstLastPara="1" wrap="square" lIns="91425" tIns="91425" rIns="91425" bIns="91425" anchor="ctr" anchorCtr="0">
             <a:noAutofit/>
           </a:bodyPr>
           <a:lstStyle>
@@ -4309,7 +4438,9 @@
               <a:defRPr sz="4800"/>
             </a:lvl9pPr>
           </a:lstStyle>
-          <a:p/>
+          <a:p>
+            <a:endParaRPr/>
+          </a:p>
         </p:txBody>
       </p:sp>
     </p:spTree>
@@ -4321,11 +4452,11 @@
 </file>
 
 <file path=ppt/slideLayouts/slideLayout8.xml><?xml version="1.0" encoding="utf-8"?>
-<p:sldLayout xmlns:a="http://schemas.openxmlformats.org/drawingml/2006/main" xmlns:r="http://schemas.openxmlformats.org/officeDocument/2006/relationships" xmlns:mc="http://schemas.openxmlformats.org/markup-compatibility/2006" xmlns:mv="urn:schemas-microsoft-com:mac:vml" xmlns:p="http://schemas.openxmlformats.org/presentationml/2006/main" xmlns:c="http://schemas.openxmlformats.org/drawingml/2006/chart" xmlns:dgm="http://schemas.openxmlformats.org/drawingml/2006/diagram" xmlns:o="urn:schemas-microsoft-com:office:office" xmlns:v="urn:schemas-microsoft-com:vml" xmlns:pvml="urn:schemas-microsoft-com:office:powerpoint" xmlns:com="http://schemas.openxmlformats.org/drawingml/2006/compatibility" xmlns:p14="http://schemas.microsoft.com/office/powerpoint/2010/main" xmlns:p15="http://schemas.microsoft.com/office/powerpoint/2012/main" xmlns:ahyp="http://schemas.microsoft.com/office/drawing/2018/hyperlinkcolor" matchingName="Section title and description">
+<p:sldLayout xmlns:a="http://schemas.openxmlformats.org/drawingml/2006/main" xmlns:r="http://schemas.openxmlformats.org/officeDocument/2006/relationships" xmlns:p="http://schemas.openxmlformats.org/presentationml/2006/main" matchingName="Section title and description">
   <p:cSld name="SECTION_TITLE_AND_DESCRIPTION">
     <p:spTree>
       <p:nvGrpSpPr>
-        <p:cNvPr id="32" name="Shape 32"/>
+        <p:cNvPr id="1" name="Shape 32"/>
         <p:cNvGrpSpPr/>
         <p:nvPr/>
       </p:nvGrpSpPr>
@@ -4359,12 +4490,12 @@
           </a:ln>
         </p:spPr>
         <p:txBody>
-          <a:bodyPr anchorCtr="0" anchor="ctr" bIns="91425" lIns="91425" spcFirstLastPara="1" rIns="91425" wrap="square" tIns="91425">
+          <a:bodyPr spcFirstLastPara="1" wrap="square" lIns="91425" tIns="91425" rIns="91425" bIns="91425" anchor="ctr" anchorCtr="0">
             <a:noAutofit/>
           </a:bodyPr>
           <a:lstStyle/>
           <a:p>
-            <a:pPr indent="0" lvl="0" marL="0" rtl="0" algn="l">
+            <a:pPr marL="0" lvl="0" indent="0" algn="l" rtl="0">
               <a:spcBef>
                 <a:spcPts val="0"/>
               </a:spcBef>
@@ -4373,9 +4504,6 @@
               </a:spcAft>
               <a:buNone/>
             </a:pPr>
-            <a:r>
-              <a:t/>
-            </a:r>
             <a:endParaRPr/>
           </a:p>
         </p:txBody>
@@ -4383,7 +4511,9 @@
       <p:sp>
         <p:nvSpPr>
           <p:cNvPr id="34" name="Google Shape;34;p9"/>
-          <p:cNvSpPr txBox="1"/>
+          <p:cNvSpPr txBox="1">
+            <a:spLocks noGrp="1"/>
+          </p:cNvSpPr>
           <p:nvPr>
             <p:ph type="title"/>
           </p:nvPr>
@@ -4402,7 +4532,7 @@
           </a:ln>
         </p:spPr>
         <p:txBody>
-          <a:bodyPr anchorCtr="0" anchor="b" bIns="91425" lIns="91425" spcFirstLastPara="1" rIns="91425" wrap="square" tIns="91425">
+          <a:bodyPr spcFirstLastPara="1" wrap="square" lIns="91425" tIns="91425" rIns="91425" bIns="91425" anchor="b" anchorCtr="0">
             <a:noAutofit/>
           </a:bodyPr>
           <a:lstStyle>
@@ -4506,15 +4636,19 @@
               <a:defRPr sz="4200"/>
             </a:lvl9pPr>
           </a:lstStyle>
-          <a:p/>
+          <a:p>
+            <a:endParaRPr/>
+          </a:p>
         </p:txBody>
       </p:sp>
       <p:sp>
         <p:nvSpPr>
           <p:cNvPr id="35" name="Google Shape;35;p9"/>
-          <p:cNvSpPr txBox="1"/>
+          <p:cNvSpPr txBox="1">
+            <a:spLocks noGrp="1"/>
+          </p:cNvSpPr>
           <p:nvPr>
-            <p:ph idx="1" type="subTitle"/>
+            <p:ph type="subTitle" idx="1"/>
           </p:nvPr>
         </p:nvSpPr>
         <p:spPr>
@@ -4531,7 +4665,7 @@
           </a:ln>
         </p:spPr>
         <p:txBody>
-          <a:bodyPr anchorCtr="0" anchor="ctr" bIns="91425" lIns="91425" spcFirstLastPara="1" rIns="91425" wrap="square" tIns="91425">
+          <a:bodyPr spcFirstLastPara="1" wrap="square" lIns="91425" tIns="91425" rIns="91425" bIns="91425" anchor="ctr" anchorCtr="0">
             <a:noAutofit/>
           </a:bodyPr>
           <a:lstStyle>
@@ -4662,15 +4796,19 @@
               <a:defRPr sz="2100"/>
             </a:lvl9pPr>
           </a:lstStyle>
-          <a:p/>
+          <a:p>
+            <a:endParaRPr/>
+          </a:p>
         </p:txBody>
       </p:sp>
       <p:sp>
         <p:nvSpPr>
           <p:cNvPr id="36" name="Google Shape;36;p9"/>
-          <p:cNvSpPr txBox="1"/>
+          <p:cNvSpPr txBox="1">
+            <a:spLocks noGrp="1"/>
+          </p:cNvSpPr>
           <p:nvPr>
-            <p:ph idx="2" type="body"/>
+            <p:ph type="body" idx="2"/>
           </p:nvPr>
         </p:nvSpPr>
         <p:spPr>
@@ -4687,11 +4825,11 @@
           </a:ln>
         </p:spPr>
         <p:txBody>
-          <a:bodyPr anchorCtr="0" anchor="ctr" bIns="91425" lIns="91425" spcFirstLastPara="1" rIns="91425" wrap="square" tIns="91425">
+          <a:bodyPr spcFirstLastPara="1" wrap="square" lIns="91425" tIns="91425" rIns="91425" bIns="91425" anchor="ctr" anchorCtr="0">
             <a:noAutofit/>
           </a:bodyPr>
           <a:lstStyle>
-            <a:lvl1pPr indent="-317500" lvl="0" marL="457200">
+            <a:lvl1pPr marL="457200" lvl="0" indent="-317500">
               <a:spcBef>
                 <a:spcPts val="0"/>
               </a:spcBef>
@@ -4702,7 +4840,7 @@
               <a:buChar char="●"/>
               <a:defRPr/>
             </a:lvl1pPr>
-            <a:lvl2pPr indent="-317500" lvl="1" marL="914400">
+            <a:lvl2pPr marL="914400" lvl="1" indent="-317500">
               <a:spcBef>
                 <a:spcPts val="0"/>
               </a:spcBef>
@@ -4713,7 +4851,7 @@
               <a:buChar char="○"/>
               <a:defRPr/>
             </a:lvl2pPr>
-            <a:lvl3pPr indent="-317500" lvl="2" marL="1371600">
+            <a:lvl3pPr marL="1371600" lvl="2" indent="-317500">
               <a:spcBef>
                 <a:spcPts val="0"/>
               </a:spcBef>
@@ -4724,7 +4862,7 @@
               <a:buChar char="■"/>
               <a:defRPr/>
             </a:lvl3pPr>
-            <a:lvl4pPr indent="-317500" lvl="3" marL="1828800">
+            <a:lvl4pPr marL="1828800" lvl="3" indent="-317500">
               <a:spcBef>
                 <a:spcPts val="0"/>
               </a:spcBef>
@@ -4735,7 +4873,7 @@
               <a:buChar char="●"/>
               <a:defRPr/>
             </a:lvl4pPr>
-            <a:lvl5pPr indent="-317500" lvl="4" marL="2286000">
+            <a:lvl5pPr marL="2286000" lvl="4" indent="-317500">
               <a:spcBef>
                 <a:spcPts val="0"/>
               </a:spcBef>
@@ -4746,7 +4884,7 @@
               <a:buChar char="○"/>
               <a:defRPr/>
             </a:lvl5pPr>
-            <a:lvl6pPr indent="-317500" lvl="5" marL="2743200">
+            <a:lvl6pPr marL="2743200" lvl="5" indent="-317500">
               <a:spcBef>
                 <a:spcPts val="0"/>
               </a:spcBef>
@@ -4757,7 +4895,7 @@
               <a:buChar char="■"/>
               <a:defRPr/>
             </a:lvl6pPr>
-            <a:lvl7pPr indent="-317500" lvl="6" marL="3200400">
+            <a:lvl7pPr marL="3200400" lvl="6" indent="-317500">
               <a:spcBef>
                 <a:spcPts val="0"/>
               </a:spcBef>
@@ -4768,7 +4906,7 @@
               <a:buChar char="●"/>
               <a:defRPr/>
             </a:lvl7pPr>
-            <a:lvl8pPr indent="-317500" lvl="7" marL="3657600">
+            <a:lvl8pPr marL="3657600" lvl="7" indent="-317500">
               <a:spcBef>
                 <a:spcPts val="0"/>
               </a:spcBef>
@@ -4779,7 +4917,7 @@
               <a:buChar char="○"/>
               <a:defRPr/>
             </a:lvl8pPr>
-            <a:lvl9pPr indent="-317500" lvl="8" marL="4114800">
+            <a:lvl9pPr marL="4114800" lvl="8" indent="-317500">
               <a:spcBef>
                 <a:spcPts val="0"/>
               </a:spcBef>
@@ -4791,7 +4929,9 @@
               <a:defRPr/>
             </a:lvl9pPr>
           </a:lstStyle>
-          <a:p/>
+          <a:p>
+            <a:endParaRPr/>
+          </a:p>
         </p:txBody>
       </p:sp>
     </p:spTree>
@@ -4803,11 +4943,11 @@
 </file>
 
 <file path=ppt/slideLayouts/slideLayout9.xml><?xml version="1.0" encoding="utf-8"?>
-<p:sldLayout xmlns:a="http://schemas.openxmlformats.org/drawingml/2006/main" xmlns:r="http://schemas.openxmlformats.org/officeDocument/2006/relationships" xmlns:mc="http://schemas.openxmlformats.org/markup-compatibility/2006" xmlns:mv="urn:schemas-microsoft-com:mac:vml" xmlns:p="http://schemas.openxmlformats.org/presentationml/2006/main" xmlns:c="http://schemas.openxmlformats.org/drawingml/2006/chart" xmlns:dgm="http://schemas.openxmlformats.org/drawingml/2006/diagram" xmlns:o="urn:schemas-microsoft-com:office:office" xmlns:v="urn:schemas-microsoft-com:vml" xmlns:pvml="urn:schemas-microsoft-com:office:powerpoint" xmlns:com="http://schemas.openxmlformats.org/drawingml/2006/compatibility" xmlns:p14="http://schemas.microsoft.com/office/powerpoint/2010/main" xmlns:p15="http://schemas.microsoft.com/office/powerpoint/2012/main" xmlns:ahyp="http://schemas.microsoft.com/office/drawing/2018/hyperlinkcolor" matchingName="Caption">
+<p:sldLayout xmlns:a="http://schemas.openxmlformats.org/drawingml/2006/main" xmlns:r="http://schemas.openxmlformats.org/officeDocument/2006/relationships" xmlns:p="http://schemas.openxmlformats.org/presentationml/2006/main" matchingName="Caption">
   <p:cSld name="CAPTION_ONLY">
     <p:spTree>
       <p:nvGrpSpPr>
-        <p:cNvPr id="37" name="Shape 37"/>
+        <p:cNvPr id="1" name="Shape 37"/>
         <p:cNvGrpSpPr/>
         <p:nvPr/>
       </p:nvGrpSpPr>
@@ -4822,9 +4962,11 @@
       <p:sp>
         <p:nvSpPr>
           <p:cNvPr id="38" name="Google Shape;38;p10"/>
-          <p:cNvSpPr txBox="1"/>
+          <p:cNvSpPr txBox="1">
+            <a:spLocks noGrp="1"/>
+          </p:cNvSpPr>
           <p:nvPr>
-            <p:ph idx="1" type="body"/>
+            <p:ph type="body" idx="1"/>
           </p:nvPr>
         </p:nvSpPr>
         <p:spPr>
@@ -4841,11 +4983,11 @@
           </a:ln>
         </p:spPr>
         <p:txBody>
-          <a:bodyPr anchorCtr="0" anchor="ctr" bIns="91425" lIns="91425" spcFirstLastPara="1" rIns="91425" wrap="square" tIns="91425">
+          <a:bodyPr spcFirstLastPara="1" wrap="square" lIns="91425" tIns="91425" rIns="91425" bIns="91425" anchor="ctr" anchorCtr="0">
             <a:noAutofit/>
           </a:bodyPr>
           <a:lstStyle>
-            <a:lvl1pPr indent="-228600" lvl="0" marL="457200">
+            <a:lvl1pPr marL="457200" lvl="0" indent="-228600">
               <a:lnSpc>
                 <a:spcPct val="100000"/>
               </a:lnSpc>
@@ -4860,7 +5002,9 @@
               <a:defRPr/>
             </a:lvl1pPr>
           </a:lstStyle>
-          <a:p/>
+          <a:p>
+            <a:endParaRPr/>
+          </a:p>
         </p:txBody>
       </p:sp>
     </p:spTree>
@@ -4872,18 +5016,19 @@
 </file>
 
 <file path=ppt/slideMasters/slideMaster1.xml><?xml version="1.0" encoding="utf-8"?>
-<p:sldMaster xmlns:a="http://schemas.openxmlformats.org/drawingml/2006/main" xmlns:r="http://schemas.openxmlformats.org/officeDocument/2006/relationships" xmlns:mc="http://schemas.openxmlformats.org/markup-compatibility/2006" xmlns:mv="urn:schemas-microsoft-com:mac:vml" xmlns:p="http://schemas.openxmlformats.org/presentationml/2006/main" xmlns:c="http://schemas.openxmlformats.org/drawingml/2006/chart" xmlns:dgm="http://schemas.openxmlformats.org/drawingml/2006/diagram" xmlns:o="urn:schemas-microsoft-com:office:office" xmlns:v="urn:schemas-microsoft-com:vml" xmlns:pvml="urn:schemas-microsoft-com:office:powerpoint" xmlns:com="http://schemas.openxmlformats.org/drawingml/2006/compatibility" xmlns:p14="http://schemas.microsoft.com/office/powerpoint/2010/main" xmlns:p15="http://schemas.microsoft.com/office/powerpoint/2012/main" xmlns:ahyp="http://schemas.microsoft.com/office/drawing/2018/hyperlinkcolor">
+<p:sldMaster xmlns:a="http://schemas.openxmlformats.org/drawingml/2006/main" xmlns:r="http://schemas.openxmlformats.org/officeDocument/2006/relationships" xmlns:p="http://schemas.openxmlformats.org/presentationml/2006/main">
   <p:cSld name="simple-light-2">
     <p:bg>
       <p:bgPr>
         <a:solidFill>
           <a:schemeClr val="lt1"/>
         </a:solidFill>
+        <a:effectLst/>
       </p:bgPr>
     </p:bg>
     <p:spTree>
       <p:nvGrpSpPr>
-        <p:cNvPr id="5" name="Shape 5"/>
+        <p:cNvPr id="1" name="Shape 5"/>
         <p:cNvGrpSpPr/>
         <p:nvPr/>
       </p:nvGrpSpPr>
@@ -4910,14 +5055,14 @@
             <a:avLst/>
           </a:prstGeom>
           <a:noFill/>
-          <a:ln cap="flat" cmpd="sng" w="9525">
+          <a:ln w="9525" cap="flat" cmpd="sng">
             <a:solidFill>
               <a:srgbClr val="FCD8D6"/>
             </a:solidFill>
             <a:prstDash val="dot"/>
             <a:round/>
-            <a:headEnd len="med" w="med" type="none"/>
-            <a:tailEnd len="med" w="med" type="none"/>
+            <a:headEnd type="none" w="med" len="med"/>
+            <a:tailEnd type="none" w="med" len="med"/>
           </a:ln>
         </p:spPr>
       </p:cxnSp>
@@ -4936,14 +5081,14 @@
             <a:avLst/>
           </a:prstGeom>
           <a:noFill/>
-          <a:ln cap="flat" cmpd="sng" w="9525">
+          <a:ln w="9525" cap="flat" cmpd="sng">
             <a:solidFill>
               <a:srgbClr val="FCD8D6"/>
             </a:solidFill>
             <a:prstDash val="dot"/>
             <a:round/>
-            <a:headEnd len="med" w="med" type="none"/>
-            <a:tailEnd len="med" w="med" type="none"/>
+            <a:headEnd type="none" w="med" len="med"/>
+            <a:tailEnd type="none" w="med" len="med"/>
           </a:ln>
         </p:spPr>
       </p:cxnSp>
@@ -4954,7 +5099,7 @@
           <p:nvPr/>
         </p:nvCxnSpPr>
         <p:spPr>
-          <a:xfrm flipH="1" rot="10800000">
+          <a:xfrm rot="10800000" flipH="1">
             <a:off x="-8000" y="1178475"/>
             <a:ext cx="9175200" cy="5400"/>
           </a:xfrm>
@@ -4962,14 +5107,14 @@
             <a:avLst/>
           </a:prstGeom>
           <a:noFill/>
-          <a:ln cap="flat" cmpd="sng" w="9525">
+          <a:ln w="9525" cap="flat" cmpd="sng">
             <a:solidFill>
               <a:srgbClr val="FCD8D6"/>
             </a:solidFill>
             <a:prstDash val="dot"/>
             <a:round/>
-            <a:headEnd len="med" w="med" type="none"/>
-            <a:tailEnd len="med" w="med" type="none"/>
+            <a:headEnd type="none" w="med" len="med"/>
+            <a:tailEnd type="none" w="med" len="med"/>
           </a:ln>
         </p:spPr>
       </p:cxnSp>
@@ -4980,7 +5125,7 @@
           <p:nvPr/>
         </p:nvCxnSpPr>
         <p:spPr>
-          <a:xfrm flipH="1" rot="10800000">
+          <a:xfrm rot="10800000" flipH="1">
             <a:off x="-15600" y="4860825"/>
             <a:ext cx="9175200" cy="5400"/>
           </a:xfrm>
@@ -4988,14 +5133,14 @@
             <a:avLst/>
           </a:prstGeom>
           <a:noFill/>
-          <a:ln cap="flat" cmpd="sng" w="9525">
+          <a:ln w="9525" cap="flat" cmpd="sng">
             <a:solidFill>
               <a:srgbClr val="FCD8D6"/>
             </a:solidFill>
             <a:prstDash val="dot"/>
             <a:round/>
-            <a:headEnd len="med" w="med" type="none"/>
-            <a:tailEnd len="med" w="med" type="none"/>
+            <a:headEnd type="none" w="med" len="med"/>
+            <a:tailEnd type="none" w="med" len="med"/>
           </a:ln>
         </p:spPr>
       </p:cxnSp>
@@ -5021,12 +5166,12 @@
           </a:ln>
         </p:spPr>
         <p:txBody>
-          <a:bodyPr anchorCtr="0" anchor="ctr" bIns="91425" lIns="91425" spcFirstLastPara="1" rIns="91425" wrap="square" tIns="91425">
+          <a:bodyPr spcFirstLastPara="1" wrap="square" lIns="91425" tIns="91425" rIns="91425" bIns="91425" anchor="ctr" anchorCtr="0">
             <a:noAutofit/>
           </a:bodyPr>
           <a:lstStyle/>
           <a:p>
-            <a:pPr indent="0" lvl="0" marL="0" rtl="0" algn="l">
+            <a:pPr marL="0" lvl="0" indent="0" algn="l" rtl="0">
               <a:spcBef>
                 <a:spcPts val="0"/>
               </a:spcBef>
@@ -5035,9 +5180,6 @@
               </a:spcAft>
               <a:buNone/>
             </a:pPr>
-            <a:r>
-              <a:t/>
-            </a:r>
             <a:endParaRPr/>
           </a:p>
         </p:txBody>
@@ -5062,12 +5204,12 @@
           </a:ln>
         </p:spPr>
         <p:txBody>
-          <a:bodyPr anchorCtr="0" anchor="ctr" bIns="22850" lIns="45725" spcFirstLastPara="1" rIns="45725" wrap="square" tIns="22850">
+          <a:bodyPr spcFirstLastPara="1" wrap="square" lIns="45725" tIns="22850" rIns="45725" bIns="22850" anchor="ctr" anchorCtr="0">
             <a:noAutofit/>
           </a:bodyPr>
           <a:lstStyle/>
           <a:p>
-            <a:pPr indent="0" lvl="0" marL="0" rtl="0" algn="l">
+            <a:pPr marL="0" lvl="0" indent="0" algn="l" rtl="0">
               <a:spcBef>
                 <a:spcPts val="0"/>
               </a:spcBef>
@@ -5107,7 +5249,7 @@
           <p:nvPr/>
         </p:nvPicPr>
         <p:blipFill>
-          <a:blip r:embed="rId1">
+          <a:blip r:embed="rId15">
             <a:alphaModFix/>
           </a:blip>
           <a:stretch>
@@ -5130,26 +5272,26 @@
       </p:pic>
     </p:spTree>
   </p:cSld>
-  <p:clrMap accent1="accent1" accent2="accent2" accent3="accent3" accent4="accent4" accent5="accent5" accent6="accent6" bg1="lt1" bg2="dk2" tx1="dk1" tx2="lt2" folHlink="folHlink" hlink="hlink"/>
+  <p:clrMap bg1="lt1" tx1="dk1" bg2="dk2" tx2="lt2" accent1="accent1" accent2="accent2" accent3="accent3" accent4="accent4" accent5="accent5" accent6="accent6" hlink="hlink" folHlink="folHlink"/>
   <p:sldLayoutIdLst>
-    <p:sldLayoutId id="2147483648" r:id="rId2"/>
-    <p:sldLayoutId id="2147483649" r:id="rId3"/>
-    <p:sldLayoutId id="2147483650" r:id="rId4"/>
-    <p:sldLayoutId id="2147483651" r:id="rId5"/>
-    <p:sldLayoutId id="2147483652" r:id="rId6"/>
-    <p:sldLayoutId id="2147483653" r:id="rId7"/>
-    <p:sldLayoutId id="2147483654" r:id="rId8"/>
-    <p:sldLayoutId id="2147483655" r:id="rId9"/>
-    <p:sldLayoutId id="2147483656" r:id="rId10"/>
-    <p:sldLayoutId id="2147483657" r:id="rId11"/>
-    <p:sldLayoutId id="2147483658" r:id="rId12"/>
-    <p:sldLayoutId id="2147483659" r:id="rId13"/>
-    <p:sldLayoutId id="2147483660" r:id="rId14"/>
+    <p:sldLayoutId id="2147483648" r:id="rId1"/>
+    <p:sldLayoutId id="2147483649" r:id="rId2"/>
+    <p:sldLayoutId id="2147483650" r:id="rId3"/>
+    <p:sldLayoutId id="2147483651" r:id="rId4"/>
+    <p:sldLayoutId id="2147483652" r:id="rId5"/>
+    <p:sldLayoutId id="2147483653" r:id="rId6"/>
+    <p:sldLayoutId id="2147483654" r:id="rId7"/>
+    <p:sldLayoutId id="2147483655" r:id="rId8"/>
+    <p:sldLayoutId id="2147483656" r:id="rId9"/>
+    <p:sldLayoutId id="2147483657" r:id="rId10"/>
+    <p:sldLayoutId id="2147483658" r:id="rId11"/>
+    <p:sldLayoutId id="2147483659" r:id="rId12"/>
+    <p:sldLayoutId id="2147483660" r:id="rId13"/>
   </p:sldLayoutIdLst>
-  <p:hf dt="0" ftr="0" hdr="0" sldNum="0"/>
+  <p:hf sldNum="0" hdr="0" ftr="0" dt="0"/>
   <p:txStyles>
     <p:titleStyle>
-      <a:defPPr lvl="0" marR="0" rtl="0" algn="l">
+      <a:defPPr marR="0" lvl="0" algn="l" rtl="0">
         <a:lnSpc>
           <a:spcPct val="100000"/>
         </a:lnSpc>
@@ -5160,7 +5302,7 @@
           <a:spcPts val="0"/>
         </a:spcAft>
       </a:defPPr>
-      <a:lvl1pPr lvl="0" marR="0" rtl="0" algn="l">
+      <a:lvl1pPr marR="0" lvl="0" algn="l" rtl="0">
         <a:lnSpc>
           <a:spcPct val="100000"/>
         </a:lnSpc>
@@ -5174,7 +5316,7 @@
           <a:srgbClr val="000000"/>
         </a:buClr>
         <a:buFont typeface="Arial"/>
-        <a:defRPr b="0" i="0" sz="1400" u="none" cap="none" strike="noStrike">
+        <a:defRPr sz="1400" b="0" i="0" u="none" strike="noStrike" cap="none">
           <a:solidFill>
             <a:srgbClr val="000000"/>
           </a:solidFill>
@@ -5184,7 +5326,7 @@
           <a:sym typeface="Arial"/>
         </a:defRPr>
       </a:lvl1pPr>
-      <a:lvl2pPr lvl="1" marR="0" rtl="0" algn="l">
+      <a:lvl2pPr marR="0" lvl="1" algn="l" rtl="0">
         <a:lnSpc>
           <a:spcPct val="100000"/>
         </a:lnSpc>
@@ -5198,7 +5340,7 @@
           <a:srgbClr val="000000"/>
         </a:buClr>
         <a:buFont typeface="Arial"/>
-        <a:defRPr b="0" i="0" sz="1400" u="none" cap="none" strike="noStrike">
+        <a:defRPr sz="1400" b="0" i="0" u="none" strike="noStrike" cap="none">
           <a:solidFill>
             <a:srgbClr val="000000"/>
           </a:solidFill>
@@ -5208,7 +5350,7 @@
           <a:sym typeface="Arial"/>
         </a:defRPr>
       </a:lvl2pPr>
-      <a:lvl3pPr lvl="2" marR="0" rtl="0" algn="l">
+      <a:lvl3pPr marR="0" lvl="2" algn="l" rtl="0">
         <a:lnSpc>
           <a:spcPct val="100000"/>
         </a:lnSpc>
@@ -5222,7 +5364,7 @@
           <a:srgbClr val="000000"/>
         </a:buClr>
         <a:buFont typeface="Arial"/>
-        <a:defRPr b="0" i="0" sz="1400" u="none" cap="none" strike="noStrike">
+        <a:defRPr sz="1400" b="0" i="0" u="none" strike="noStrike" cap="none">
           <a:solidFill>
             <a:srgbClr val="000000"/>
           </a:solidFill>
@@ -5232,7 +5374,7 @@
           <a:sym typeface="Arial"/>
         </a:defRPr>
       </a:lvl3pPr>
-      <a:lvl4pPr lvl="3" marR="0" rtl="0" algn="l">
+      <a:lvl4pPr marR="0" lvl="3" algn="l" rtl="0">
         <a:lnSpc>
           <a:spcPct val="100000"/>
         </a:lnSpc>
@@ -5246,7 +5388,7 @@
           <a:srgbClr val="000000"/>
         </a:buClr>
         <a:buFont typeface="Arial"/>
-        <a:defRPr b="0" i="0" sz="1400" u="none" cap="none" strike="noStrike">
+        <a:defRPr sz="1400" b="0" i="0" u="none" strike="noStrike" cap="none">
           <a:solidFill>
             <a:srgbClr val="000000"/>
           </a:solidFill>
@@ -5256,7 +5398,7 @@
           <a:sym typeface="Arial"/>
         </a:defRPr>
       </a:lvl4pPr>
-      <a:lvl5pPr lvl="4" marR="0" rtl="0" algn="l">
+      <a:lvl5pPr marR="0" lvl="4" algn="l" rtl="0">
         <a:lnSpc>
           <a:spcPct val="100000"/>
         </a:lnSpc>
@@ -5270,7 +5412,7 @@
           <a:srgbClr val="000000"/>
         </a:buClr>
         <a:buFont typeface="Arial"/>
-        <a:defRPr b="0" i="0" sz="1400" u="none" cap="none" strike="noStrike">
+        <a:defRPr sz="1400" b="0" i="0" u="none" strike="noStrike" cap="none">
           <a:solidFill>
             <a:srgbClr val="000000"/>
           </a:solidFill>
@@ -5280,7 +5422,7 @@
           <a:sym typeface="Arial"/>
         </a:defRPr>
       </a:lvl5pPr>
-      <a:lvl6pPr lvl="5" marR="0" rtl="0" algn="l">
+      <a:lvl6pPr marR="0" lvl="5" algn="l" rtl="0">
         <a:lnSpc>
           <a:spcPct val="100000"/>
         </a:lnSpc>
@@ -5294,7 +5436,7 @@
           <a:srgbClr val="000000"/>
         </a:buClr>
         <a:buFont typeface="Arial"/>
-        <a:defRPr b="0" i="0" sz="1400" u="none" cap="none" strike="noStrike">
+        <a:defRPr sz="1400" b="0" i="0" u="none" strike="noStrike" cap="none">
           <a:solidFill>
             <a:srgbClr val="000000"/>
           </a:solidFill>
@@ -5304,7 +5446,7 @@
           <a:sym typeface="Arial"/>
         </a:defRPr>
       </a:lvl6pPr>
-      <a:lvl7pPr lvl="6" marR="0" rtl="0" algn="l">
+      <a:lvl7pPr marR="0" lvl="6" algn="l" rtl="0">
         <a:lnSpc>
           <a:spcPct val="100000"/>
         </a:lnSpc>
@@ -5318,7 +5460,7 @@
           <a:srgbClr val="000000"/>
         </a:buClr>
         <a:buFont typeface="Arial"/>
-        <a:defRPr b="0" i="0" sz="1400" u="none" cap="none" strike="noStrike">
+        <a:defRPr sz="1400" b="0" i="0" u="none" strike="noStrike" cap="none">
           <a:solidFill>
             <a:srgbClr val="000000"/>
           </a:solidFill>
@@ -5328,7 +5470,7 @@
           <a:sym typeface="Arial"/>
         </a:defRPr>
       </a:lvl7pPr>
-      <a:lvl8pPr lvl="7" marR="0" rtl="0" algn="l">
+      <a:lvl8pPr marR="0" lvl="7" algn="l" rtl="0">
         <a:lnSpc>
           <a:spcPct val="100000"/>
         </a:lnSpc>
@@ -5342,7 +5484,7 @@
           <a:srgbClr val="000000"/>
         </a:buClr>
         <a:buFont typeface="Arial"/>
-        <a:defRPr b="0" i="0" sz="1400" u="none" cap="none" strike="noStrike">
+        <a:defRPr sz="1400" b="0" i="0" u="none" strike="noStrike" cap="none">
           <a:solidFill>
             <a:srgbClr val="000000"/>
           </a:solidFill>
@@ -5352,7 +5494,7 @@
           <a:sym typeface="Arial"/>
         </a:defRPr>
       </a:lvl8pPr>
-      <a:lvl9pPr lvl="8" marR="0" rtl="0" algn="l">
+      <a:lvl9pPr marR="0" lvl="8" algn="l" rtl="0">
         <a:lnSpc>
           <a:spcPct val="100000"/>
         </a:lnSpc>
@@ -5366,7 +5508,7 @@
           <a:srgbClr val="000000"/>
         </a:buClr>
         <a:buFont typeface="Arial"/>
-        <a:defRPr b="0" i="0" sz="1400" u="none" cap="none" strike="noStrike">
+        <a:defRPr sz="1400" b="0" i="0" u="none" strike="noStrike" cap="none">
           <a:solidFill>
             <a:srgbClr val="000000"/>
           </a:solidFill>
@@ -5378,7 +5520,7 @@
       </a:lvl9pPr>
     </p:titleStyle>
     <p:bodyStyle>
-      <a:defPPr lvl="0" marR="0" rtl="0" algn="l">
+      <a:defPPr marR="0" lvl="0" algn="l" rtl="0">
         <a:lnSpc>
           <a:spcPct val="100000"/>
         </a:lnSpc>
@@ -5389,7 +5531,7 @@
           <a:spcPts val="0"/>
         </a:spcAft>
       </a:defPPr>
-      <a:lvl1pPr lvl="0" marR="0" rtl="0" algn="l">
+      <a:lvl1pPr marR="0" lvl="0" algn="l" rtl="0">
         <a:lnSpc>
           <a:spcPct val="100000"/>
         </a:lnSpc>
@@ -5403,7 +5545,7 @@
           <a:srgbClr val="000000"/>
         </a:buClr>
         <a:buFont typeface="Arial"/>
-        <a:defRPr b="0" i="0" sz="1400" u="none" cap="none" strike="noStrike">
+        <a:defRPr sz="1400" b="0" i="0" u="none" strike="noStrike" cap="none">
           <a:solidFill>
             <a:srgbClr val="000000"/>
           </a:solidFill>
@@ -5413,7 +5555,7 @@
           <a:sym typeface="Arial"/>
         </a:defRPr>
       </a:lvl1pPr>
-      <a:lvl2pPr lvl="1" marR="0" rtl="0" algn="l">
+      <a:lvl2pPr marR="0" lvl="1" algn="l" rtl="0">
         <a:lnSpc>
           <a:spcPct val="100000"/>
         </a:lnSpc>
@@ -5427,7 +5569,7 @@
           <a:srgbClr val="000000"/>
         </a:buClr>
         <a:buFont typeface="Arial"/>
-        <a:defRPr b="0" i="0" sz="1400" u="none" cap="none" strike="noStrike">
+        <a:defRPr sz="1400" b="0" i="0" u="none" strike="noStrike" cap="none">
           <a:solidFill>
             <a:srgbClr val="000000"/>
           </a:solidFill>
@@ -5437,7 +5579,7 @@
           <a:sym typeface="Arial"/>
         </a:defRPr>
       </a:lvl2pPr>
-      <a:lvl3pPr lvl="2" marR="0" rtl="0" algn="l">
+      <a:lvl3pPr marR="0" lvl="2" algn="l" rtl="0">
         <a:lnSpc>
           <a:spcPct val="100000"/>
         </a:lnSpc>
@@ -5451,7 +5593,7 @@
           <a:srgbClr val="000000"/>
         </a:buClr>
         <a:buFont typeface="Arial"/>
-        <a:defRPr b="0" i="0" sz="1400" u="none" cap="none" strike="noStrike">
+        <a:defRPr sz="1400" b="0" i="0" u="none" strike="noStrike" cap="none">
           <a:solidFill>
             <a:srgbClr val="000000"/>
           </a:solidFill>
@@ -5461,7 +5603,7 @@
           <a:sym typeface="Arial"/>
         </a:defRPr>
       </a:lvl3pPr>
-      <a:lvl4pPr lvl="3" marR="0" rtl="0" algn="l">
+      <a:lvl4pPr marR="0" lvl="3" algn="l" rtl="0">
         <a:lnSpc>
           <a:spcPct val="100000"/>
         </a:lnSpc>
@@ -5475,7 +5617,7 @@
           <a:srgbClr val="000000"/>
         </a:buClr>
         <a:buFont typeface="Arial"/>
-        <a:defRPr b="0" i="0" sz="1400" u="none" cap="none" strike="noStrike">
+        <a:defRPr sz="1400" b="0" i="0" u="none" strike="noStrike" cap="none">
           <a:solidFill>
             <a:srgbClr val="000000"/>
           </a:solidFill>
@@ -5485,7 +5627,7 @@
           <a:sym typeface="Arial"/>
         </a:defRPr>
       </a:lvl4pPr>
-      <a:lvl5pPr lvl="4" marR="0" rtl="0" algn="l">
+      <a:lvl5pPr marR="0" lvl="4" algn="l" rtl="0">
         <a:lnSpc>
           <a:spcPct val="100000"/>
         </a:lnSpc>
@@ -5499,7 +5641,7 @@
           <a:srgbClr val="000000"/>
         </a:buClr>
         <a:buFont typeface="Arial"/>
-        <a:defRPr b="0" i="0" sz="1400" u="none" cap="none" strike="noStrike">
+        <a:defRPr sz="1400" b="0" i="0" u="none" strike="noStrike" cap="none">
           <a:solidFill>
             <a:srgbClr val="000000"/>
           </a:solidFill>
@@ -5509,7 +5651,7 @@
           <a:sym typeface="Arial"/>
         </a:defRPr>
       </a:lvl5pPr>
-      <a:lvl6pPr lvl="5" marR="0" rtl="0" algn="l">
+      <a:lvl6pPr marR="0" lvl="5" algn="l" rtl="0">
         <a:lnSpc>
           <a:spcPct val="100000"/>
         </a:lnSpc>
@@ -5523,7 +5665,7 @@
           <a:srgbClr val="000000"/>
         </a:buClr>
         <a:buFont typeface="Arial"/>
-        <a:defRPr b="0" i="0" sz="1400" u="none" cap="none" strike="noStrike">
+        <a:defRPr sz="1400" b="0" i="0" u="none" strike="noStrike" cap="none">
           <a:solidFill>
             <a:srgbClr val="000000"/>
           </a:solidFill>
@@ -5533,7 +5675,7 @@
           <a:sym typeface="Arial"/>
         </a:defRPr>
       </a:lvl6pPr>
-      <a:lvl7pPr lvl="6" marR="0" rtl="0" algn="l">
+      <a:lvl7pPr marR="0" lvl="6" algn="l" rtl="0">
         <a:lnSpc>
           <a:spcPct val="100000"/>
         </a:lnSpc>
@@ -5547,7 +5689,7 @@
           <a:srgbClr val="000000"/>
         </a:buClr>
         <a:buFont typeface="Arial"/>
-        <a:defRPr b="0" i="0" sz="1400" u="none" cap="none" strike="noStrike">
+        <a:defRPr sz="1400" b="0" i="0" u="none" strike="noStrike" cap="none">
           <a:solidFill>
             <a:srgbClr val="000000"/>
           </a:solidFill>
@@ -5557,7 +5699,7 @@
           <a:sym typeface="Arial"/>
         </a:defRPr>
       </a:lvl7pPr>
-      <a:lvl8pPr lvl="7" marR="0" rtl="0" algn="l">
+      <a:lvl8pPr marR="0" lvl="7" algn="l" rtl="0">
         <a:lnSpc>
           <a:spcPct val="100000"/>
         </a:lnSpc>
@@ -5571,7 +5713,7 @@
           <a:srgbClr val="000000"/>
         </a:buClr>
         <a:buFont typeface="Arial"/>
-        <a:defRPr b="0" i="0" sz="1400" u="none" cap="none" strike="noStrike">
+        <a:defRPr sz="1400" b="0" i="0" u="none" strike="noStrike" cap="none">
           <a:solidFill>
             <a:srgbClr val="000000"/>
           </a:solidFill>
@@ -5581,7 +5723,7 @@
           <a:sym typeface="Arial"/>
         </a:defRPr>
       </a:lvl8pPr>
-      <a:lvl9pPr lvl="8" marR="0" rtl="0" algn="l">
+      <a:lvl9pPr marR="0" lvl="8" algn="l" rtl="0">
         <a:lnSpc>
           <a:spcPct val="100000"/>
         </a:lnSpc>
@@ -5595,7 +5737,7 @@
           <a:srgbClr val="000000"/>
         </a:buClr>
         <a:buFont typeface="Arial"/>
-        <a:defRPr b="0" i="0" sz="1400" u="none" cap="none" strike="noStrike">
+        <a:defRPr sz="1400" b="0" i="0" u="none" strike="noStrike" cap="none">
           <a:solidFill>
             <a:srgbClr val="000000"/>
           </a:solidFill>
@@ -5607,7 +5749,7 @@
       </a:lvl9pPr>
     </p:bodyStyle>
     <p:otherStyle>
-      <a:defPPr lvl="0" marR="0" rtl="0" algn="l">
+      <a:defPPr marR="0" lvl="0" algn="l" rtl="0">
         <a:lnSpc>
           <a:spcPct val="100000"/>
         </a:lnSpc>
@@ -5618,7 +5760,7 @@
           <a:spcPts val="0"/>
         </a:spcAft>
       </a:defPPr>
-      <a:lvl1pPr lvl="0" marR="0" rtl="0" algn="l">
+      <a:lvl1pPr marR="0" lvl="0" algn="l" rtl="0">
         <a:lnSpc>
           <a:spcPct val="100000"/>
         </a:lnSpc>
@@ -5632,7 +5774,7 @@
           <a:srgbClr val="000000"/>
         </a:buClr>
         <a:buFont typeface="Arial"/>
-        <a:defRPr b="0" i="0" sz="1400" u="none" cap="none" strike="noStrike">
+        <a:defRPr sz="1400" b="0" i="0" u="none" strike="noStrike" cap="none">
           <a:solidFill>
             <a:srgbClr val="000000"/>
           </a:solidFill>
@@ -5642,7 +5784,7 @@
           <a:sym typeface="Arial"/>
         </a:defRPr>
       </a:lvl1pPr>
-      <a:lvl2pPr lvl="1" marR="0" rtl="0" algn="l">
+      <a:lvl2pPr marR="0" lvl="1" algn="l" rtl="0">
         <a:lnSpc>
           <a:spcPct val="100000"/>
         </a:lnSpc>
@@ -5656,7 +5798,7 @@
           <a:srgbClr val="000000"/>
         </a:buClr>
         <a:buFont typeface="Arial"/>
-        <a:defRPr b="0" i="0" sz="1400" u="none" cap="none" strike="noStrike">
+        <a:defRPr sz="1400" b="0" i="0" u="none" strike="noStrike" cap="none">
           <a:solidFill>
             <a:srgbClr val="000000"/>
           </a:solidFill>
@@ -5666,7 +5808,7 @@
           <a:sym typeface="Arial"/>
         </a:defRPr>
       </a:lvl2pPr>
-      <a:lvl3pPr lvl="2" marR="0" rtl="0" algn="l">
+      <a:lvl3pPr marR="0" lvl="2" algn="l" rtl="0">
         <a:lnSpc>
           <a:spcPct val="100000"/>
         </a:lnSpc>
@@ -5680,7 +5822,7 @@
           <a:srgbClr val="000000"/>
         </a:buClr>
         <a:buFont typeface="Arial"/>
-        <a:defRPr b="0" i="0" sz="1400" u="none" cap="none" strike="noStrike">
+        <a:defRPr sz="1400" b="0" i="0" u="none" strike="noStrike" cap="none">
           <a:solidFill>
             <a:srgbClr val="000000"/>
           </a:solidFill>
@@ -5690,7 +5832,7 @@
           <a:sym typeface="Arial"/>
         </a:defRPr>
       </a:lvl3pPr>
-      <a:lvl4pPr lvl="3" marR="0" rtl="0" algn="l">
+      <a:lvl4pPr marR="0" lvl="3" algn="l" rtl="0">
         <a:lnSpc>
           <a:spcPct val="100000"/>
         </a:lnSpc>
@@ -5704,7 +5846,7 @@
           <a:srgbClr val="000000"/>
         </a:buClr>
         <a:buFont typeface="Arial"/>
-        <a:defRPr b="0" i="0" sz="1400" u="none" cap="none" strike="noStrike">
+        <a:defRPr sz="1400" b="0" i="0" u="none" strike="noStrike" cap="none">
           <a:solidFill>
             <a:srgbClr val="000000"/>
           </a:solidFill>
@@ -5714,7 +5856,7 @@
           <a:sym typeface="Arial"/>
         </a:defRPr>
       </a:lvl4pPr>
-      <a:lvl5pPr lvl="4" marR="0" rtl="0" algn="l">
+      <a:lvl5pPr marR="0" lvl="4" algn="l" rtl="0">
         <a:lnSpc>
           <a:spcPct val="100000"/>
         </a:lnSpc>
@@ -5728,7 +5870,7 @@
           <a:srgbClr val="000000"/>
         </a:buClr>
         <a:buFont typeface="Arial"/>
-        <a:defRPr b="0" i="0" sz="1400" u="none" cap="none" strike="noStrike">
+        <a:defRPr sz="1400" b="0" i="0" u="none" strike="noStrike" cap="none">
           <a:solidFill>
             <a:srgbClr val="000000"/>
           </a:solidFill>
@@ -5738,7 +5880,7 @@
           <a:sym typeface="Arial"/>
         </a:defRPr>
       </a:lvl5pPr>
-      <a:lvl6pPr lvl="5" marR="0" rtl="0" algn="l">
+      <a:lvl6pPr marR="0" lvl="5" algn="l" rtl="0">
         <a:lnSpc>
           <a:spcPct val="100000"/>
         </a:lnSpc>
@@ -5752,7 +5894,7 @@
           <a:srgbClr val="000000"/>
         </a:buClr>
         <a:buFont typeface="Arial"/>
-        <a:defRPr b="0" i="0" sz="1400" u="none" cap="none" strike="noStrike">
+        <a:defRPr sz="1400" b="0" i="0" u="none" strike="noStrike" cap="none">
           <a:solidFill>
             <a:srgbClr val="000000"/>
           </a:solidFill>
@@ -5762,7 +5904,7 @@
           <a:sym typeface="Arial"/>
         </a:defRPr>
       </a:lvl6pPr>
-      <a:lvl7pPr lvl="6" marR="0" rtl="0" algn="l">
+      <a:lvl7pPr marR="0" lvl="6" algn="l" rtl="0">
         <a:lnSpc>
           <a:spcPct val="100000"/>
         </a:lnSpc>
@@ -5776,7 +5918,7 @@
           <a:srgbClr val="000000"/>
         </a:buClr>
         <a:buFont typeface="Arial"/>
-        <a:defRPr b="0" i="0" sz="1400" u="none" cap="none" strike="noStrike">
+        <a:defRPr sz="1400" b="0" i="0" u="none" strike="noStrike" cap="none">
           <a:solidFill>
             <a:srgbClr val="000000"/>
           </a:solidFill>
@@ -5786,7 +5928,7 @@
           <a:sym typeface="Arial"/>
         </a:defRPr>
       </a:lvl7pPr>
-      <a:lvl8pPr lvl="7" marR="0" rtl="0" algn="l">
+      <a:lvl8pPr marR="0" lvl="7" algn="l" rtl="0">
         <a:lnSpc>
           <a:spcPct val="100000"/>
         </a:lnSpc>
@@ -5800,7 +5942,7 @@
           <a:srgbClr val="000000"/>
         </a:buClr>
         <a:buFont typeface="Arial"/>
-        <a:defRPr b="0" i="0" sz="1400" u="none" cap="none" strike="noStrike">
+        <a:defRPr sz="1400" b="0" i="0" u="none" strike="noStrike" cap="none">
           <a:solidFill>
             <a:srgbClr val="000000"/>
           </a:solidFill>
@@ -5810,7 +5952,7 @@
           <a:sym typeface="Arial"/>
         </a:defRPr>
       </a:lvl8pPr>
-      <a:lvl9pPr lvl="8" marR="0" rtl="0" algn="l">
+      <a:lvl9pPr marR="0" lvl="8" algn="l" rtl="0">
         <a:lnSpc>
           <a:spcPct val="100000"/>
         </a:lnSpc>
@@ -5824,7 +5966,7 @@
           <a:srgbClr val="000000"/>
         </a:buClr>
         <a:buFont typeface="Arial"/>
-        <a:defRPr b="0" i="0" sz="1400" u="none" cap="none" strike="noStrike">
+        <a:defRPr sz="1400" b="0" i="0" u="none" strike="noStrike" cap="none">
           <a:solidFill>
             <a:srgbClr val="000000"/>
           </a:solidFill>
@@ -5840,11 +5982,11 @@
 </file>
 
 <file path=ppt/slides/slide1.xml><?xml version="1.0" encoding="utf-8"?>
-<p:sld xmlns:a="http://schemas.openxmlformats.org/drawingml/2006/main" xmlns:r="http://schemas.openxmlformats.org/officeDocument/2006/relationships" xmlns:mc="http://schemas.openxmlformats.org/markup-compatibility/2006" xmlns:mv="urn:schemas-microsoft-com:mac:vml" xmlns:p="http://schemas.openxmlformats.org/presentationml/2006/main" xmlns:c="http://schemas.openxmlformats.org/drawingml/2006/chart" xmlns:dgm="http://schemas.openxmlformats.org/drawingml/2006/diagram" xmlns:o="urn:schemas-microsoft-com:office:office" xmlns:v="urn:schemas-microsoft-com:vml" xmlns:pvml="urn:schemas-microsoft-com:office:powerpoint" xmlns:com="http://schemas.openxmlformats.org/drawingml/2006/compatibility" xmlns:p14="http://schemas.microsoft.com/office/powerpoint/2010/main" xmlns:p15="http://schemas.microsoft.com/office/powerpoint/2012/main" xmlns:ahyp="http://schemas.microsoft.com/office/drawing/2018/hyperlinkcolor">
+<p:sld xmlns:a="http://schemas.openxmlformats.org/drawingml/2006/main" xmlns:r="http://schemas.openxmlformats.org/officeDocument/2006/relationships" xmlns:p="http://schemas.openxmlformats.org/presentationml/2006/main">
   <p:cSld>
     <p:spTree>
       <p:nvGrpSpPr>
-        <p:cNvPr id="52" name="Shape 52"/>
+        <p:cNvPr id="1" name="Shape 52"/>
         <p:cNvGrpSpPr/>
         <p:nvPr/>
       </p:nvGrpSpPr>
@@ -5876,12 +6018,12 @@
           </a:ln>
         </p:spPr>
         <p:txBody>
-          <a:bodyPr anchorCtr="0" anchor="t" bIns="91425" lIns="91425" spcFirstLastPara="1" rIns="91425" wrap="square" tIns="91425">
+          <a:bodyPr spcFirstLastPara="1" wrap="square" lIns="91425" tIns="91425" rIns="91425" bIns="91425" anchor="t" anchorCtr="0">
             <a:spAutoFit/>
           </a:bodyPr>
           <a:lstStyle/>
           <a:p>
-            <a:pPr indent="0" lvl="0" marL="0" rtl="0" algn="l">
+            <a:pPr marL="0" lvl="0" indent="0" algn="l" rtl="0">
               <a:lnSpc>
                 <a:spcPct val="90000"/>
               </a:lnSpc>
@@ -5899,7 +6041,7 @@
               <a:buNone/>
             </a:pPr>
             <a:r>
-              <a:rPr b="1" lang="es" sz="3000">
+              <a:rPr lang="es" sz="3000" b="1">
                 <a:solidFill>
                   <a:srgbClr val="EC183F"/>
                 </a:solidFill>
@@ -5911,7 +6053,7 @@
               <a:t>Actividad </a:t>
             </a:r>
             <a:r>
-              <a:rPr b="1" lang="es" sz="3000">
+              <a:rPr lang="es" sz="3000" b="1">
                 <a:solidFill>
                   <a:srgbClr val="434343"/>
                 </a:solidFill>
@@ -5922,7 +6064,7 @@
               </a:rPr>
               <a:t>Diseño del plan de seguridad y auditoria</a:t>
             </a:r>
-            <a:endParaRPr b="1" sz="3000">
+            <a:endParaRPr sz="3000" b="1">
               <a:solidFill>
                 <a:srgbClr val="3F3F3F"/>
               </a:solidFill>
@@ -5933,7 +6075,7 @@
             </a:endParaRPr>
           </a:p>
           <a:p>
-            <a:pPr indent="0" lvl="0" marL="0" rtl="0" algn="ctr">
+            <a:pPr marL="0" lvl="0" indent="0" algn="ctr" rtl="0">
               <a:spcBef>
                 <a:spcPts val="0"/>
               </a:spcBef>
@@ -5942,9 +6084,6 @@
               </a:spcAft>
               <a:buNone/>
             </a:pPr>
-            <a:r>
-              <a:t/>
-            </a:r>
             <a:endParaRPr b="1" u="sng"/>
           </a:p>
         </p:txBody>
@@ -5969,12 +6108,12 @@
           </a:ln>
         </p:spPr>
         <p:txBody>
-          <a:bodyPr anchorCtr="0" anchor="t" bIns="91425" lIns="91425" spcFirstLastPara="1" rIns="91425" wrap="square" tIns="91425">
+          <a:bodyPr spcFirstLastPara="1" wrap="square" lIns="91425" tIns="91425" rIns="91425" bIns="91425" anchor="t" anchorCtr="0">
             <a:spAutoFit/>
           </a:bodyPr>
           <a:lstStyle/>
           <a:p>
-            <a:pPr indent="0" lvl="0" marL="0" rtl="0" algn="l">
+            <a:pPr marL="0" lvl="0" indent="0" algn="l" rtl="0">
               <a:spcBef>
                 <a:spcPts val="0"/>
               </a:spcBef>
@@ -5988,13 +6127,10 @@
               <a:buFont typeface="Arial"/>
               <a:buNone/>
             </a:pPr>
-            <a:r>
-              <a:t/>
-            </a:r>
             <a:endParaRPr/>
           </a:p>
           <a:p>
-            <a:pPr indent="0" lvl="0" marL="0" rtl="0" algn="l">
+            <a:pPr marL="0" lvl="0" indent="0" algn="l" rtl="0">
               <a:spcBef>
                 <a:spcPts val="0"/>
               </a:spcBef>
@@ -6003,9 +6139,6 @@
               </a:spcAft>
               <a:buNone/>
             </a:pPr>
-            <a:r>
-              <a:t/>
-            </a:r>
             <a:endParaRPr/>
           </a:p>
         </p:txBody>
@@ -6030,12 +6163,12 @@
           </a:ln>
         </p:spPr>
         <p:txBody>
-          <a:bodyPr anchorCtr="0" anchor="t" bIns="91425" lIns="91425" spcFirstLastPara="1" rIns="91425" wrap="square" tIns="91425">
+          <a:bodyPr spcFirstLastPara="1" wrap="square" lIns="91425" tIns="91425" rIns="91425" bIns="91425" anchor="t" anchorCtr="0">
             <a:spAutoFit/>
           </a:bodyPr>
           <a:lstStyle/>
           <a:p>
-            <a:pPr indent="0" lvl="0" marL="0" rtl="0" algn="l">
+            <a:pPr marL="0" lvl="0" indent="0" algn="l" rtl="0">
               <a:spcBef>
                 <a:spcPts val="0"/>
               </a:spcBef>
@@ -6054,79 +6187,7 @@
                 <a:cs typeface="Open Sans"/>
                 <a:sym typeface="Open Sans"/>
               </a:rPr>
-              <a:t>Utilizando este documento de presentación, cada </a:t>
-            </a:r>
-            <a:r>
-              <a:rPr lang="es" sz="1600">
-                <a:solidFill>
-                  <a:srgbClr val="3F3F3F"/>
-                </a:solidFill>
-                <a:latin typeface="Open Sans"/>
-                <a:ea typeface="Open Sans"/>
-                <a:cs typeface="Open Sans"/>
-                <a:sym typeface="Open Sans"/>
-              </a:rPr>
-              <a:t>mesa</a:t>
-            </a:r>
-            <a:r>
-              <a:rPr lang="es" sz="1600">
-                <a:solidFill>
-                  <a:srgbClr val="3F3F3F"/>
-                </a:solidFill>
-                <a:latin typeface="Open Sans"/>
-                <a:ea typeface="Open Sans"/>
-                <a:cs typeface="Open Sans"/>
-                <a:sym typeface="Open Sans"/>
-              </a:rPr>
-              <a:t> deberá resolver y completar en cada hoja , que le corresponde </a:t>
-            </a:r>
-            <a:r>
-              <a:rPr lang="es" sz="1600">
-                <a:solidFill>
-                  <a:srgbClr val="3F3F3F"/>
-                </a:solidFill>
-                <a:latin typeface="Open Sans"/>
-                <a:ea typeface="Open Sans"/>
-                <a:cs typeface="Open Sans"/>
-                <a:sym typeface="Open Sans"/>
-              </a:rPr>
-              <a:t>según</a:t>
-            </a:r>
-            <a:r>
-              <a:rPr lang="es" sz="1600">
-                <a:solidFill>
-                  <a:srgbClr val="3F3F3F"/>
-                </a:solidFill>
-                <a:latin typeface="Open Sans"/>
-                <a:ea typeface="Open Sans"/>
-                <a:cs typeface="Open Sans"/>
-                <a:sym typeface="Open Sans"/>
-              </a:rPr>
-              <a:t> su </a:t>
-            </a:r>
-            <a:r>
-              <a:rPr lang="es" sz="1600">
-                <a:solidFill>
-                  <a:srgbClr val="3F3F3F"/>
-                </a:solidFill>
-                <a:latin typeface="Open Sans"/>
-                <a:ea typeface="Open Sans"/>
-                <a:cs typeface="Open Sans"/>
-                <a:sym typeface="Open Sans"/>
-              </a:rPr>
-              <a:t>número</a:t>
-            </a:r>
-            <a:r>
-              <a:rPr lang="es" sz="1600">
-                <a:solidFill>
-                  <a:srgbClr val="3F3F3F"/>
-                </a:solidFill>
-                <a:latin typeface="Open Sans"/>
-                <a:ea typeface="Open Sans"/>
-                <a:cs typeface="Open Sans"/>
-                <a:sym typeface="Open Sans"/>
-              </a:rPr>
-              <a:t> de mesa.</a:t>
+              <a:t>Utilizando este documento de presentación, cada mesa deberá resolver y completar en cada hoja , que le corresponde según su número de mesa.</a:t>
             </a:r>
             <a:endParaRPr/>
           </a:p>
@@ -6169,11 +6230,11 @@
 </file>
 
 <file path=ppt/slides/slide10.xml><?xml version="1.0" encoding="utf-8"?>
-<p:sld xmlns:a="http://schemas.openxmlformats.org/drawingml/2006/main" xmlns:r="http://schemas.openxmlformats.org/officeDocument/2006/relationships" xmlns:mc="http://schemas.openxmlformats.org/markup-compatibility/2006" xmlns:mv="urn:schemas-microsoft-com:mac:vml" xmlns:p="http://schemas.openxmlformats.org/presentationml/2006/main" xmlns:c="http://schemas.openxmlformats.org/drawingml/2006/chart" xmlns:dgm="http://schemas.openxmlformats.org/drawingml/2006/diagram" xmlns:o="urn:schemas-microsoft-com:office:office" xmlns:v="urn:schemas-microsoft-com:vml" xmlns:pvml="urn:schemas-microsoft-com:office:powerpoint" xmlns:com="http://schemas.openxmlformats.org/drawingml/2006/compatibility" xmlns:p14="http://schemas.microsoft.com/office/powerpoint/2010/main" xmlns:p15="http://schemas.microsoft.com/office/powerpoint/2012/main" xmlns:ahyp="http://schemas.microsoft.com/office/drawing/2018/hyperlinkcolor">
+<p:sld xmlns:a="http://schemas.openxmlformats.org/drawingml/2006/main" xmlns:r="http://schemas.openxmlformats.org/officeDocument/2006/relationships" xmlns:p="http://schemas.openxmlformats.org/presentationml/2006/main">
   <p:cSld>
     <p:spTree>
       <p:nvGrpSpPr>
-        <p:cNvPr id="108" name="Shape 108"/>
+        <p:cNvPr id="1" name="Shape 108"/>
         <p:cNvGrpSpPr/>
         <p:nvPr/>
       </p:nvGrpSpPr>
@@ -6205,12 +6266,12 @@
           </a:ln>
         </p:spPr>
         <p:txBody>
-          <a:bodyPr anchorCtr="0" anchor="t" bIns="91425" lIns="91425" spcFirstLastPara="1" rIns="91425" wrap="square" tIns="91425">
+          <a:bodyPr spcFirstLastPara="1" wrap="square" lIns="91425" tIns="91425" rIns="91425" bIns="91425" anchor="t" anchorCtr="0">
             <a:spAutoFit/>
           </a:bodyPr>
           <a:lstStyle/>
           <a:p>
-            <a:pPr indent="0" lvl="0" marL="0" rtl="0" algn="l">
+            <a:pPr marL="0" lvl="0" indent="0" algn="l" rtl="0">
               <a:lnSpc>
                 <a:spcPct val="90000"/>
               </a:lnSpc>
@@ -6228,7 +6289,7 @@
               <a:buNone/>
             </a:pPr>
             <a:r>
-              <a:rPr b="1" lang="es" sz="3000">
+              <a:rPr lang="es" sz="3000" b="1">
                 <a:solidFill>
                   <a:srgbClr val="EC183F"/>
                 </a:solidFill>
@@ -6240,7 +6301,7 @@
               <a:t>Mesa</a:t>
             </a:r>
             <a:r>
-              <a:rPr b="1" lang="es" sz="3000">
+              <a:rPr lang="es" sz="3000" b="1">
                 <a:solidFill>
                   <a:srgbClr val="434343"/>
                 </a:solidFill>
@@ -6264,7 +6325,7 @@
         <p:spPr>
           <a:xfrm>
             <a:off x="766075" y="1203800"/>
-            <a:ext cx="7633200" cy="1385400"/>
+            <a:ext cx="7633200" cy="2369849"/>
           </a:xfrm>
           <a:prstGeom prst="rect">
             <a:avLst/>
@@ -6275,12 +6336,12 @@
           </a:ln>
         </p:spPr>
         <p:txBody>
-          <a:bodyPr anchorCtr="0" anchor="t" bIns="91425" lIns="91425" spcFirstLastPara="1" rIns="91425" wrap="square" tIns="91425">
+          <a:bodyPr spcFirstLastPara="1" wrap="square" lIns="91425" tIns="91425" rIns="91425" bIns="91425" anchor="t" anchorCtr="0">
             <a:spAutoFit/>
           </a:bodyPr>
           <a:lstStyle/>
           <a:p>
-            <a:pPr indent="0" lvl="0" marL="0" rtl="0" algn="l">
+            <a:pPr marL="0" lvl="0" indent="0" algn="l" rtl="0">
               <a:lnSpc>
                 <a:spcPct val="200000"/>
               </a:lnSpc>
@@ -6293,7 +6354,7 @@
               <a:buNone/>
             </a:pPr>
             <a:r>
-              <a:rPr lang="es" sz="1600">
+              <a:rPr lang="es" sz="1600" dirty="0">
                 <a:solidFill>
                   <a:srgbClr val="3F3F3F"/>
                 </a:solidFill>
@@ -6302,10 +6363,22 @@
                 <a:cs typeface="Open Sans"/>
                 <a:sym typeface="Open Sans"/>
               </a:rPr>
-              <a:t>Mesa 9 - Plan de seguridad : &lt;Poner el link&gt;</a:t>
+              <a:t>Mesa 9 - Plan de seguridad : </a:t>
+            </a:r>
+            <a:r>
+              <a:rPr lang="en-US" sz="1600">
+                <a:solidFill>
+                  <a:srgbClr val="3F3F3F"/>
+                </a:solidFill>
+                <a:latin typeface="Open Sans"/>
+                <a:ea typeface="Open Sans"/>
+                <a:cs typeface="Open Sans"/>
+                <a:sym typeface="Open Sans"/>
+              </a:rPr>
+              <a:t>https://docs.google.com/document/d/1I9kRf2tyAUebmQYdrWXdjaefxJ8fASTOhmuAijjZ0u4/edit</a:t>
             </a:r>
             <a:br>
-              <a:rPr lang="es" sz="1600">
+              <a:rPr lang="es" sz="1600" dirty="0">
                 <a:solidFill>
                   <a:srgbClr val="3F3F3F"/>
                 </a:solidFill>
@@ -6316,7 +6389,7 @@
               </a:rPr>
             </a:br>
             <a:r>
-              <a:rPr lang="es" sz="1600">
+              <a:rPr lang="es" sz="1600" dirty="0">
                 <a:solidFill>
                   <a:srgbClr val="3F3F3F"/>
                 </a:solidFill>
@@ -6327,10 +6400,10 @@
               </a:rPr>
               <a:t>Mesa 10 - Auditoría del plan de Seguridad :   &lt;Poner el link&gt;</a:t>
             </a:r>
-            <a:endParaRPr/>
+            <a:endParaRPr dirty="0"/>
           </a:p>
           <a:p>
-            <a:pPr indent="0" lvl="0" marL="0" rtl="0" algn="l">
+            <a:pPr marL="0" lvl="0" indent="0" algn="l" rtl="0">
               <a:spcBef>
                 <a:spcPts val="0"/>
               </a:spcBef>
@@ -6339,10 +6412,7 @@
               </a:spcAft>
               <a:buNone/>
             </a:pPr>
-            <a:r>
-              <a:t/>
-            </a:r>
-            <a:endParaRPr/>
+            <a:endParaRPr dirty="0"/>
           </a:p>
         </p:txBody>
       </p:sp>
@@ -6355,11 +6425,11 @@
 </file>
 
 <file path=ppt/slides/slide11.xml><?xml version="1.0" encoding="utf-8"?>
-<p:sld xmlns:a="http://schemas.openxmlformats.org/drawingml/2006/main" xmlns:r="http://schemas.openxmlformats.org/officeDocument/2006/relationships" xmlns:mc="http://schemas.openxmlformats.org/markup-compatibility/2006" xmlns:mv="urn:schemas-microsoft-com:mac:vml" xmlns:p="http://schemas.openxmlformats.org/presentationml/2006/main" xmlns:c="http://schemas.openxmlformats.org/drawingml/2006/chart" xmlns:dgm="http://schemas.openxmlformats.org/drawingml/2006/diagram" xmlns:o="urn:schemas-microsoft-com:office:office" xmlns:v="urn:schemas-microsoft-com:vml" xmlns:pvml="urn:schemas-microsoft-com:office:powerpoint" xmlns:com="http://schemas.openxmlformats.org/drawingml/2006/compatibility" xmlns:p14="http://schemas.microsoft.com/office/powerpoint/2010/main" xmlns:p15="http://schemas.microsoft.com/office/powerpoint/2012/main" xmlns:ahyp="http://schemas.microsoft.com/office/drawing/2018/hyperlinkcolor">
+<p:sld xmlns:a="http://schemas.openxmlformats.org/drawingml/2006/main" xmlns:r="http://schemas.openxmlformats.org/officeDocument/2006/relationships" xmlns:p="http://schemas.openxmlformats.org/presentationml/2006/main">
   <p:cSld>
     <p:spTree>
       <p:nvGrpSpPr>
-        <p:cNvPr id="114" name="Shape 114"/>
+        <p:cNvPr id="1" name="Shape 114"/>
         <p:cNvGrpSpPr/>
         <p:nvPr/>
       </p:nvGrpSpPr>
@@ -6391,12 +6461,12 @@
           </a:ln>
         </p:spPr>
         <p:txBody>
-          <a:bodyPr anchorCtr="0" anchor="t" bIns="91425" lIns="91425" spcFirstLastPara="1" rIns="91425" wrap="square" tIns="91425">
+          <a:bodyPr spcFirstLastPara="1" wrap="square" lIns="91425" tIns="91425" rIns="91425" bIns="91425" anchor="t" anchorCtr="0">
             <a:spAutoFit/>
           </a:bodyPr>
           <a:lstStyle/>
           <a:p>
-            <a:pPr indent="0" lvl="0" marL="0" rtl="0" algn="l">
+            <a:pPr marL="0" lvl="0" indent="0" algn="l" rtl="0">
               <a:lnSpc>
                 <a:spcPct val="90000"/>
               </a:lnSpc>
@@ -6414,7 +6484,7 @@
               <a:buNone/>
             </a:pPr>
             <a:r>
-              <a:rPr b="1" lang="es" sz="3000">
+              <a:rPr lang="es" sz="3000" b="1">
                 <a:solidFill>
                   <a:srgbClr val="EC183F"/>
                 </a:solidFill>
@@ -6426,7 +6496,7 @@
               <a:t>Mesa</a:t>
             </a:r>
             <a:r>
-              <a:rPr b="1" lang="es" sz="3000">
+              <a:rPr lang="es" sz="3000" b="1">
                 <a:solidFill>
                   <a:srgbClr val="434343"/>
                 </a:solidFill>
@@ -6461,12 +6531,12 @@
           </a:ln>
         </p:spPr>
         <p:txBody>
-          <a:bodyPr anchorCtr="0" anchor="t" bIns="91425" lIns="91425" spcFirstLastPara="1" rIns="91425" wrap="square" tIns="91425">
+          <a:bodyPr spcFirstLastPara="1" wrap="square" lIns="91425" tIns="91425" rIns="91425" bIns="91425" anchor="t" anchorCtr="0">
             <a:spAutoFit/>
           </a:bodyPr>
           <a:lstStyle/>
           <a:p>
-            <a:pPr indent="0" lvl="0" marL="0" rtl="0" algn="l">
+            <a:pPr marL="0" lvl="0" indent="0" algn="l" rtl="0">
               <a:lnSpc>
                 <a:spcPct val="200000"/>
               </a:lnSpc>
@@ -6516,7 +6586,7 @@
             <a:endParaRPr/>
           </a:p>
           <a:p>
-            <a:pPr indent="0" lvl="0" marL="0" rtl="0" algn="l">
+            <a:pPr marL="0" lvl="0" indent="0" algn="l" rtl="0">
               <a:spcBef>
                 <a:spcPts val="0"/>
               </a:spcBef>
@@ -6525,9 +6595,6 @@
               </a:spcAft>
               <a:buNone/>
             </a:pPr>
-            <a:r>
-              <a:t/>
-            </a:r>
             <a:endParaRPr/>
           </a:p>
         </p:txBody>
@@ -6541,11 +6608,11 @@
 </file>
 
 <file path=ppt/slides/slide12.xml><?xml version="1.0" encoding="utf-8"?>
-<p:sld xmlns:a="http://schemas.openxmlformats.org/drawingml/2006/main" xmlns:r="http://schemas.openxmlformats.org/officeDocument/2006/relationships" xmlns:mc="http://schemas.openxmlformats.org/markup-compatibility/2006" xmlns:mv="urn:schemas-microsoft-com:mac:vml" xmlns:p="http://schemas.openxmlformats.org/presentationml/2006/main" xmlns:c="http://schemas.openxmlformats.org/drawingml/2006/chart" xmlns:dgm="http://schemas.openxmlformats.org/drawingml/2006/diagram" xmlns:o="urn:schemas-microsoft-com:office:office" xmlns:v="urn:schemas-microsoft-com:vml" xmlns:pvml="urn:schemas-microsoft-com:office:powerpoint" xmlns:com="http://schemas.openxmlformats.org/drawingml/2006/compatibility" xmlns:p14="http://schemas.microsoft.com/office/powerpoint/2010/main" xmlns:p15="http://schemas.microsoft.com/office/powerpoint/2012/main" xmlns:ahyp="http://schemas.microsoft.com/office/drawing/2018/hyperlinkcolor">
+<p:sld xmlns:a="http://schemas.openxmlformats.org/drawingml/2006/main" xmlns:r="http://schemas.openxmlformats.org/officeDocument/2006/relationships" xmlns:p="http://schemas.openxmlformats.org/presentationml/2006/main">
   <p:cSld>
     <p:spTree>
       <p:nvGrpSpPr>
-        <p:cNvPr id="120" name="Shape 120"/>
+        <p:cNvPr id="1" name="Shape 120"/>
         <p:cNvGrpSpPr/>
         <p:nvPr/>
       </p:nvGrpSpPr>
@@ -6577,12 +6644,12 @@
           </a:ln>
         </p:spPr>
         <p:txBody>
-          <a:bodyPr anchorCtr="0" anchor="t" bIns="91425" lIns="91425" spcFirstLastPara="1" rIns="91425" wrap="square" tIns="91425">
+          <a:bodyPr spcFirstLastPara="1" wrap="square" lIns="91425" tIns="91425" rIns="91425" bIns="91425" anchor="t" anchorCtr="0">
             <a:spAutoFit/>
           </a:bodyPr>
           <a:lstStyle/>
           <a:p>
-            <a:pPr indent="0" lvl="0" marL="0" rtl="0" algn="l">
+            <a:pPr marL="0" lvl="0" indent="0" algn="l" rtl="0">
               <a:lnSpc>
                 <a:spcPct val="90000"/>
               </a:lnSpc>
@@ -6600,7 +6667,7 @@
               <a:buNone/>
             </a:pPr>
             <a:r>
-              <a:rPr b="1" lang="es" sz="3000">
+              <a:rPr lang="es" sz="3000" b="1">
                 <a:solidFill>
                   <a:srgbClr val="EC183F"/>
                 </a:solidFill>
@@ -6612,7 +6679,7 @@
               <a:t>Mesa</a:t>
             </a:r>
             <a:r>
-              <a:rPr b="1" lang="es" sz="3000">
+              <a:rPr lang="es" sz="3000" b="1">
                 <a:solidFill>
                   <a:srgbClr val="434343"/>
                 </a:solidFill>
@@ -6647,12 +6714,12 @@
           </a:ln>
         </p:spPr>
         <p:txBody>
-          <a:bodyPr anchorCtr="0" anchor="t" bIns="91425" lIns="91425" spcFirstLastPara="1" rIns="91425" wrap="square" tIns="91425">
+          <a:bodyPr spcFirstLastPara="1" wrap="square" lIns="91425" tIns="91425" rIns="91425" bIns="91425" anchor="t" anchorCtr="0">
             <a:spAutoFit/>
           </a:bodyPr>
           <a:lstStyle/>
           <a:p>
-            <a:pPr indent="0" lvl="0" marL="0" rtl="0" algn="l">
+            <a:pPr marL="0" lvl="0" indent="0" algn="l" rtl="0">
               <a:lnSpc>
                 <a:spcPct val="200000"/>
               </a:lnSpc>
@@ -6702,7 +6769,7 @@
             <a:endParaRPr/>
           </a:p>
           <a:p>
-            <a:pPr indent="0" lvl="0" marL="0" rtl="0" algn="l">
+            <a:pPr marL="0" lvl="0" indent="0" algn="l" rtl="0">
               <a:spcBef>
                 <a:spcPts val="0"/>
               </a:spcBef>
@@ -6711,9 +6778,6 @@
               </a:spcAft>
               <a:buNone/>
             </a:pPr>
-            <a:r>
-              <a:t/>
-            </a:r>
             <a:endParaRPr/>
           </a:p>
         </p:txBody>
@@ -6727,11 +6791,11 @@
 </file>
 
 <file path=ppt/slides/slide2.xml><?xml version="1.0" encoding="utf-8"?>
-<p:sld xmlns:a="http://schemas.openxmlformats.org/drawingml/2006/main" xmlns:r="http://schemas.openxmlformats.org/officeDocument/2006/relationships" xmlns:mc="http://schemas.openxmlformats.org/markup-compatibility/2006" xmlns:mv="urn:schemas-microsoft-com:mac:vml" xmlns:p="http://schemas.openxmlformats.org/presentationml/2006/main" xmlns:c="http://schemas.openxmlformats.org/drawingml/2006/chart" xmlns:dgm="http://schemas.openxmlformats.org/drawingml/2006/diagram" xmlns:o="urn:schemas-microsoft-com:office:office" xmlns:v="urn:schemas-microsoft-com:vml" xmlns:pvml="urn:schemas-microsoft-com:office:powerpoint" xmlns:com="http://schemas.openxmlformats.org/drawingml/2006/compatibility" xmlns:p14="http://schemas.microsoft.com/office/powerpoint/2010/main" xmlns:p15="http://schemas.microsoft.com/office/powerpoint/2012/main" xmlns:ahyp="http://schemas.microsoft.com/office/drawing/2018/hyperlinkcolor">
+<p:sld xmlns:a="http://schemas.openxmlformats.org/drawingml/2006/main" xmlns:r="http://schemas.openxmlformats.org/officeDocument/2006/relationships" xmlns:p="http://schemas.openxmlformats.org/presentationml/2006/main">
   <p:cSld>
     <p:spTree>
       <p:nvGrpSpPr>
-        <p:cNvPr id="60" name="Shape 60"/>
+        <p:cNvPr id="1" name="Shape 60"/>
         <p:cNvGrpSpPr/>
         <p:nvPr/>
       </p:nvGrpSpPr>
@@ -6763,12 +6827,12 @@
           </a:ln>
         </p:spPr>
         <p:txBody>
-          <a:bodyPr anchorCtr="0" anchor="t" bIns="91425" lIns="91425" spcFirstLastPara="1" rIns="91425" wrap="square" tIns="91425">
+          <a:bodyPr spcFirstLastPara="1" wrap="square" lIns="91425" tIns="91425" rIns="91425" bIns="91425" anchor="t" anchorCtr="0">
             <a:spAutoFit/>
           </a:bodyPr>
           <a:lstStyle/>
           <a:p>
-            <a:pPr indent="0" lvl="0" marL="0" rtl="0" algn="l">
+            <a:pPr marL="0" lvl="0" indent="0" algn="l" rtl="0">
               <a:lnSpc>
                 <a:spcPct val="90000"/>
               </a:lnSpc>
@@ -6786,7 +6850,7 @@
               <a:buNone/>
             </a:pPr>
             <a:r>
-              <a:rPr b="1" lang="es" sz="3000">
+              <a:rPr lang="es" sz="3000" b="1">
                 <a:solidFill>
                   <a:srgbClr val="EC183F"/>
                 </a:solidFill>
@@ -6798,7 +6862,7 @@
               <a:t>Mesa</a:t>
             </a:r>
             <a:r>
-              <a:rPr b="1" lang="es" sz="3000">
+              <a:rPr lang="es" sz="3000" b="1">
                 <a:solidFill>
                   <a:srgbClr val="434343"/>
                 </a:solidFill>
@@ -6833,12 +6897,12 @@
           </a:ln>
         </p:spPr>
         <p:txBody>
-          <a:bodyPr anchorCtr="0" anchor="t" bIns="91425" lIns="91425" spcFirstLastPara="1" rIns="91425" wrap="square" tIns="91425">
+          <a:bodyPr spcFirstLastPara="1" wrap="square" lIns="91425" tIns="91425" rIns="91425" bIns="91425" anchor="t" anchorCtr="0">
             <a:spAutoFit/>
           </a:bodyPr>
           <a:lstStyle/>
           <a:p>
-            <a:pPr indent="0" lvl="0" marL="0" rtl="0" algn="l">
+            <a:pPr marL="0" lvl="0" indent="0" algn="l" rtl="0">
               <a:lnSpc>
                 <a:spcPct val="200000"/>
               </a:lnSpc>
@@ -6860,19 +6924,7 @@
                 <a:cs typeface="Open Sans"/>
                 <a:sym typeface="Open Sans"/>
               </a:rPr>
-              <a:t>Mesa 1 - Plan de seguridad </a:t>
-            </a:r>
-            <a:r>
-              <a:rPr lang="es" sz="1600">
-                <a:solidFill>
-                  <a:srgbClr val="3F3F3F"/>
-                </a:solidFill>
-                <a:latin typeface="Open Sans"/>
-                <a:ea typeface="Open Sans"/>
-                <a:cs typeface="Open Sans"/>
-                <a:sym typeface="Open Sans"/>
-              </a:rPr>
-              <a:t>: &lt;Poner el link&gt;</a:t>
+              <a:t>Mesa 1 - Plan de seguridad : &lt;Poner el link&gt;</a:t>
             </a:r>
             <a:br>
               <a:rPr lang="es" sz="1600">
@@ -6900,7 +6952,7 @@
             <a:endParaRPr/>
           </a:p>
           <a:p>
-            <a:pPr indent="0" lvl="0" marL="0" rtl="0" algn="l">
+            <a:pPr marL="0" lvl="0" indent="0" algn="l" rtl="0">
               <a:spcBef>
                 <a:spcPts val="0"/>
               </a:spcBef>
@@ -6909,9 +6961,6 @@
               </a:spcAft>
               <a:buNone/>
             </a:pPr>
-            <a:r>
-              <a:t/>
-            </a:r>
             <a:endParaRPr/>
           </a:p>
         </p:txBody>
@@ -6925,11 +6974,11 @@
 </file>
 
 <file path=ppt/slides/slide3.xml><?xml version="1.0" encoding="utf-8"?>
-<p:sld xmlns:a="http://schemas.openxmlformats.org/drawingml/2006/main" xmlns:r="http://schemas.openxmlformats.org/officeDocument/2006/relationships" xmlns:mc="http://schemas.openxmlformats.org/markup-compatibility/2006" xmlns:mv="urn:schemas-microsoft-com:mac:vml" xmlns:p="http://schemas.openxmlformats.org/presentationml/2006/main" xmlns:c="http://schemas.openxmlformats.org/drawingml/2006/chart" xmlns:dgm="http://schemas.openxmlformats.org/drawingml/2006/diagram" xmlns:o="urn:schemas-microsoft-com:office:office" xmlns:v="urn:schemas-microsoft-com:vml" xmlns:pvml="urn:schemas-microsoft-com:office:powerpoint" xmlns:com="http://schemas.openxmlformats.org/drawingml/2006/compatibility" xmlns:p14="http://schemas.microsoft.com/office/powerpoint/2010/main" xmlns:p15="http://schemas.microsoft.com/office/powerpoint/2012/main" xmlns:ahyp="http://schemas.microsoft.com/office/drawing/2018/hyperlinkcolor">
+<p:sld xmlns:a="http://schemas.openxmlformats.org/drawingml/2006/main" xmlns:r="http://schemas.openxmlformats.org/officeDocument/2006/relationships" xmlns:p="http://schemas.openxmlformats.org/presentationml/2006/main">
   <p:cSld>
     <p:spTree>
       <p:nvGrpSpPr>
-        <p:cNvPr id="66" name="Shape 66"/>
+        <p:cNvPr id="1" name="Shape 66"/>
         <p:cNvGrpSpPr/>
         <p:nvPr/>
       </p:nvGrpSpPr>
@@ -6961,12 +7010,12 @@
           </a:ln>
         </p:spPr>
         <p:txBody>
-          <a:bodyPr anchorCtr="0" anchor="t" bIns="91425" lIns="91425" spcFirstLastPara="1" rIns="91425" wrap="square" tIns="91425">
+          <a:bodyPr spcFirstLastPara="1" wrap="square" lIns="91425" tIns="91425" rIns="91425" bIns="91425" anchor="t" anchorCtr="0">
             <a:spAutoFit/>
           </a:bodyPr>
           <a:lstStyle/>
           <a:p>
-            <a:pPr indent="0" lvl="0" marL="0" rtl="0" algn="l">
+            <a:pPr marL="0" lvl="0" indent="0" algn="l" rtl="0">
               <a:lnSpc>
                 <a:spcPct val="90000"/>
               </a:lnSpc>
@@ -6984,7 +7033,7 @@
               <a:buNone/>
             </a:pPr>
             <a:r>
-              <a:rPr b="1" lang="es" sz="3000">
+              <a:rPr lang="es" sz="3000" b="1">
                 <a:solidFill>
                   <a:srgbClr val="EC183F"/>
                 </a:solidFill>
@@ -6996,7 +7045,7 @@
               <a:t>Mesa</a:t>
             </a:r>
             <a:r>
-              <a:rPr b="1" lang="es" sz="3000">
+              <a:rPr lang="es" sz="3000" b="1">
                 <a:solidFill>
                   <a:srgbClr val="434343"/>
                 </a:solidFill>
@@ -7031,12 +7080,12 @@
           </a:ln>
         </p:spPr>
         <p:txBody>
-          <a:bodyPr anchorCtr="0" anchor="t" bIns="91425" lIns="91425" spcFirstLastPara="1" rIns="91425" wrap="square" tIns="91425">
+          <a:bodyPr spcFirstLastPara="1" wrap="square" lIns="91425" tIns="91425" rIns="91425" bIns="91425" anchor="t" anchorCtr="0">
             <a:spAutoFit/>
           </a:bodyPr>
           <a:lstStyle/>
           <a:p>
-            <a:pPr indent="0" lvl="0" marL="0" rtl="0" algn="l">
+            <a:pPr marL="0" lvl="0" indent="0" algn="l" rtl="0">
               <a:lnSpc>
                 <a:spcPct val="200000"/>
               </a:lnSpc>
@@ -7086,7 +7135,7 @@
             <a:endParaRPr/>
           </a:p>
           <a:p>
-            <a:pPr indent="0" lvl="0" marL="0" rtl="0" algn="l">
+            <a:pPr marL="0" lvl="0" indent="0" algn="l" rtl="0">
               <a:spcBef>
                 <a:spcPts val="0"/>
               </a:spcBef>
@@ -7095,9 +7144,6 @@
               </a:spcAft>
               <a:buNone/>
             </a:pPr>
-            <a:r>
-              <a:t/>
-            </a:r>
             <a:endParaRPr/>
           </a:p>
         </p:txBody>
@@ -7111,11 +7157,11 @@
 </file>
 
 <file path=ppt/slides/slide4.xml><?xml version="1.0" encoding="utf-8"?>
-<p:sld xmlns:a="http://schemas.openxmlformats.org/drawingml/2006/main" xmlns:r="http://schemas.openxmlformats.org/officeDocument/2006/relationships" xmlns:mc="http://schemas.openxmlformats.org/markup-compatibility/2006" xmlns:mv="urn:schemas-microsoft-com:mac:vml" xmlns:p="http://schemas.openxmlformats.org/presentationml/2006/main" xmlns:c="http://schemas.openxmlformats.org/drawingml/2006/chart" xmlns:dgm="http://schemas.openxmlformats.org/drawingml/2006/diagram" xmlns:o="urn:schemas-microsoft-com:office:office" xmlns:v="urn:schemas-microsoft-com:vml" xmlns:pvml="urn:schemas-microsoft-com:office:powerpoint" xmlns:com="http://schemas.openxmlformats.org/drawingml/2006/compatibility" xmlns:p14="http://schemas.microsoft.com/office/powerpoint/2010/main" xmlns:p15="http://schemas.microsoft.com/office/powerpoint/2012/main" xmlns:ahyp="http://schemas.microsoft.com/office/drawing/2018/hyperlinkcolor">
+<p:sld xmlns:a="http://schemas.openxmlformats.org/drawingml/2006/main" xmlns:r="http://schemas.openxmlformats.org/officeDocument/2006/relationships" xmlns:p="http://schemas.openxmlformats.org/presentationml/2006/main">
   <p:cSld>
     <p:spTree>
       <p:nvGrpSpPr>
-        <p:cNvPr id="72" name="Shape 72"/>
+        <p:cNvPr id="1" name="Shape 72"/>
         <p:cNvGrpSpPr/>
         <p:nvPr/>
       </p:nvGrpSpPr>
@@ -7147,12 +7193,12 @@
           </a:ln>
         </p:spPr>
         <p:txBody>
-          <a:bodyPr anchorCtr="0" anchor="t" bIns="91425" lIns="91425" spcFirstLastPara="1" rIns="91425" wrap="square" tIns="91425">
+          <a:bodyPr spcFirstLastPara="1" wrap="square" lIns="91425" tIns="91425" rIns="91425" bIns="91425" anchor="t" anchorCtr="0">
             <a:spAutoFit/>
           </a:bodyPr>
           <a:lstStyle/>
           <a:p>
-            <a:pPr indent="0" lvl="0" marL="0" rtl="0" algn="l">
+            <a:pPr marL="0" lvl="0" indent="0" algn="l" rtl="0">
               <a:lnSpc>
                 <a:spcPct val="90000"/>
               </a:lnSpc>
@@ -7170,7 +7216,7 @@
               <a:buNone/>
             </a:pPr>
             <a:r>
-              <a:rPr b="1" lang="es" sz="3000">
+              <a:rPr lang="es" sz="3000" b="1">
                 <a:solidFill>
                   <a:srgbClr val="EC183F"/>
                 </a:solidFill>
@@ -7182,7 +7228,7 @@
               <a:t>Mesa</a:t>
             </a:r>
             <a:r>
-              <a:rPr b="1" lang="es" sz="3000">
+              <a:rPr lang="es" sz="3000" b="1">
                 <a:solidFill>
                   <a:srgbClr val="434343"/>
                 </a:solidFill>
@@ -7217,12 +7263,12 @@
           </a:ln>
         </p:spPr>
         <p:txBody>
-          <a:bodyPr anchorCtr="0" anchor="t" bIns="91425" lIns="91425" spcFirstLastPara="1" rIns="91425" wrap="square" tIns="91425">
+          <a:bodyPr spcFirstLastPara="1" wrap="square" lIns="91425" tIns="91425" rIns="91425" bIns="91425" anchor="t" anchorCtr="0">
             <a:spAutoFit/>
           </a:bodyPr>
           <a:lstStyle/>
           <a:p>
-            <a:pPr indent="0" lvl="0" marL="0" rtl="0" algn="l">
+            <a:pPr marL="0" lvl="0" indent="0" algn="l" rtl="0">
               <a:lnSpc>
                 <a:spcPct val="200000"/>
               </a:lnSpc>
@@ -7272,7 +7318,7 @@
             <a:endParaRPr/>
           </a:p>
           <a:p>
-            <a:pPr indent="0" lvl="0" marL="0" rtl="0" algn="l">
+            <a:pPr marL="0" lvl="0" indent="0" algn="l" rtl="0">
               <a:spcBef>
                 <a:spcPts val="0"/>
               </a:spcBef>
@@ -7281,9 +7327,6 @@
               </a:spcAft>
               <a:buNone/>
             </a:pPr>
-            <a:r>
-              <a:t/>
-            </a:r>
             <a:endParaRPr/>
           </a:p>
         </p:txBody>
@@ -7297,11 +7340,11 @@
 </file>
 
 <file path=ppt/slides/slide5.xml><?xml version="1.0" encoding="utf-8"?>
-<p:sld xmlns:a="http://schemas.openxmlformats.org/drawingml/2006/main" xmlns:r="http://schemas.openxmlformats.org/officeDocument/2006/relationships" xmlns:mc="http://schemas.openxmlformats.org/markup-compatibility/2006" xmlns:mv="urn:schemas-microsoft-com:mac:vml" xmlns:p="http://schemas.openxmlformats.org/presentationml/2006/main" xmlns:c="http://schemas.openxmlformats.org/drawingml/2006/chart" xmlns:dgm="http://schemas.openxmlformats.org/drawingml/2006/diagram" xmlns:o="urn:schemas-microsoft-com:office:office" xmlns:v="urn:schemas-microsoft-com:vml" xmlns:pvml="urn:schemas-microsoft-com:office:powerpoint" xmlns:com="http://schemas.openxmlformats.org/drawingml/2006/compatibility" xmlns:p14="http://schemas.microsoft.com/office/powerpoint/2010/main" xmlns:p15="http://schemas.microsoft.com/office/powerpoint/2012/main" xmlns:ahyp="http://schemas.microsoft.com/office/drawing/2018/hyperlinkcolor">
+<p:sld xmlns:a="http://schemas.openxmlformats.org/drawingml/2006/main" xmlns:r="http://schemas.openxmlformats.org/officeDocument/2006/relationships" xmlns:p="http://schemas.openxmlformats.org/presentationml/2006/main">
   <p:cSld>
     <p:spTree>
       <p:nvGrpSpPr>
-        <p:cNvPr id="78" name="Shape 78"/>
+        <p:cNvPr id="1" name="Shape 78"/>
         <p:cNvGrpSpPr/>
         <p:nvPr/>
       </p:nvGrpSpPr>
@@ -7333,12 +7376,12 @@
           </a:ln>
         </p:spPr>
         <p:txBody>
-          <a:bodyPr anchorCtr="0" anchor="t" bIns="91425" lIns="91425" spcFirstLastPara="1" rIns="91425" wrap="square" tIns="91425">
+          <a:bodyPr spcFirstLastPara="1" wrap="square" lIns="91425" tIns="91425" rIns="91425" bIns="91425" anchor="t" anchorCtr="0">
             <a:spAutoFit/>
           </a:bodyPr>
           <a:lstStyle/>
           <a:p>
-            <a:pPr indent="0" lvl="0" marL="0" rtl="0" algn="l">
+            <a:pPr marL="0" lvl="0" indent="0" algn="l" rtl="0">
               <a:lnSpc>
                 <a:spcPct val="90000"/>
               </a:lnSpc>
@@ -7356,7 +7399,7 @@
               <a:buNone/>
             </a:pPr>
             <a:r>
-              <a:rPr b="1" lang="es" sz="3000">
+              <a:rPr lang="es" sz="3000" b="1">
                 <a:solidFill>
                   <a:srgbClr val="EC183F"/>
                 </a:solidFill>
@@ -7368,7 +7411,7 @@
               <a:t>Mesa</a:t>
             </a:r>
             <a:r>
-              <a:rPr b="1" lang="es" sz="3000">
+              <a:rPr lang="es" sz="3000" b="1">
                 <a:solidFill>
                   <a:srgbClr val="434343"/>
                 </a:solidFill>
@@ -7403,12 +7446,12 @@
           </a:ln>
         </p:spPr>
         <p:txBody>
-          <a:bodyPr anchorCtr="0" anchor="t" bIns="91425" lIns="91425" spcFirstLastPara="1" rIns="91425" wrap="square" tIns="91425">
+          <a:bodyPr spcFirstLastPara="1" wrap="square" lIns="91425" tIns="91425" rIns="91425" bIns="91425" anchor="t" anchorCtr="0">
             <a:spAutoFit/>
           </a:bodyPr>
           <a:lstStyle/>
           <a:p>
-            <a:pPr indent="0" lvl="0" marL="0" rtl="0" algn="l">
+            <a:pPr marL="0" lvl="0" indent="0" algn="l" rtl="0">
               <a:lnSpc>
                 <a:spcPct val="200000"/>
               </a:lnSpc>
@@ -7458,7 +7501,7 @@
             <a:endParaRPr/>
           </a:p>
           <a:p>
-            <a:pPr indent="0" lvl="0" marL="0" rtl="0" algn="l">
+            <a:pPr marL="0" lvl="0" indent="0" algn="l" rtl="0">
               <a:spcBef>
                 <a:spcPts val="0"/>
               </a:spcBef>
@@ -7467,9 +7510,6 @@
               </a:spcAft>
               <a:buNone/>
             </a:pPr>
-            <a:r>
-              <a:t/>
-            </a:r>
             <a:endParaRPr/>
           </a:p>
         </p:txBody>
@@ -7483,11 +7523,11 @@
 </file>
 
 <file path=ppt/slides/slide6.xml><?xml version="1.0" encoding="utf-8"?>
-<p:sld xmlns:a="http://schemas.openxmlformats.org/drawingml/2006/main" xmlns:r="http://schemas.openxmlformats.org/officeDocument/2006/relationships" xmlns:mc="http://schemas.openxmlformats.org/markup-compatibility/2006" xmlns:mv="urn:schemas-microsoft-com:mac:vml" xmlns:p="http://schemas.openxmlformats.org/presentationml/2006/main" xmlns:c="http://schemas.openxmlformats.org/drawingml/2006/chart" xmlns:dgm="http://schemas.openxmlformats.org/drawingml/2006/diagram" xmlns:o="urn:schemas-microsoft-com:office:office" xmlns:v="urn:schemas-microsoft-com:vml" xmlns:pvml="urn:schemas-microsoft-com:office:powerpoint" xmlns:com="http://schemas.openxmlformats.org/drawingml/2006/compatibility" xmlns:p14="http://schemas.microsoft.com/office/powerpoint/2010/main" xmlns:p15="http://schemas.microsoft.com/office/powerpoint/2012/main" xmlns:ahyp="http://schemas.microsoft.com/office/drawing/2018/hyperlinkcolor">
+<p:sld xmlns:a="http://schemas.openxmlformats.org/drawingml/2006/main" xmlns:r="http://schemas.openxmlformats.org/officeDocument/2006/relationships" xmlns:p="http://schemas.openxmlformats.org/presentationml/2006/main">
   <p:cSld>
     <p:spTree>
       <p:nvGrpSpPr>
-        <p:cNvPr id="84" name="Shape 84"/>
+        <p:cNvPr id="1" name="Shape 84"/>
         <p:cNvGrpSpPr/>
         <p:nvPr/>
       </p:nvGrpSpPr>
@@ -7519,12 +7559,12 @@
           </a:ln>
         </p:spPr>
         <p:txBody>
-          <a:bodyPr anchorCtr="0" anchor="t" bIns="91425" lIns="91425" spcFirstLastPara="1" rIns="91425" wrap="square" tIns="91425">
+          <a:bodyPr spcFirstLastPara="1" wrap="square" lIns="91425" tIns="91425" rIns="91425" bIns="91425" anchor="t" anchorCtr="0">
             <a:spAutoFit/>
           </a:bodyPr>
           <a:lstStyle/>
           <a:p>
-            <a:pPr indent="0" lvl="0" marL="0" rtl="0" algn="l">
+            <a:pPr marL="0" lvl="0" indent="0" algn="l" rtl="0">
               <a:lnSpc>
                 <a:spcPct val="90000"/>
               </a:lnSpc>
@@ -7542,7 +7582,7 @@
               <a:buNone/>
             </a:pPr>
             <a:r>
-              <a:rPr b="1" lang="es" sz="3000">
+              <a:rPr lang="es" sz="3000" b="1">
                 <a:solidFill>
                   <a:srgbClr val="EC183F"/>
                 </a:solidFill>
@@ -7554,7 +7594,7 @@
               <a:t>Mesa</a:t>
             </a:r>
             <a:r>
-              <a:rPr b="1" lang="es" sz="3000">
+              <a:rPr lang="es" sz="3000" b="1">
                 <a:solidFill>
                   <a:srgbClr val="434343"/>
                 </a:solidFill>
@@ -7589,12 +7629,12 @@
           </a:ln>
         </p:spPr>
         <p:txBody>
-          <a:bodyPr anchorCtr="0" anchor="t" bIns="91425" lIns="91425" spcFirstLastPara="1" rIns="91425" wrap="square" tIns="91425">
+          <a:bodyPr spcFirstLastPara="1" wrap="square" lIns="91425" tIns="91425" rIns="91425" bIns="91425" anchor="t" anchorCtr="0">
             <a:spAutoFit/>
           </a:bodyPr>
           <a:lstStyle/>
           <a:p>
-            <a:pPr indent="0" lvl="0" marL="0" rtl="0" algn="l">
+            <a:pPr marL="0" lvl="0" indent="0" algn="l" rtl="0">
               <a:lnSpc>
                 <a:spcPct val="200000"/>
               </a:lnSpc>
@@ -7644,7 +7684,7 @@
             <a:endParaRPr/>
           </a:p>
           <a:p>
-            <a:pPr indent="0" lvl="0" marL="0" rtl="0" algn="l">
+            <a:pPr marL="0" lvl="0" indent="0" algn="l" rtl="0">
               <a:spcBef>
                 <a:spcPts val="0"/>
               </a:spcBef>
@@ -7653,9 +7693,6 @@
               </a:spcAft>
               <a:buNone/>
             </a:pPr>
-            <a:r>
-              <a:t/>
-            </a:r>
             <a:endParaRPr/>
           </a:p>
         </p:txBody>
@@ -7669,11 +7706,11 @@
 </file>
 
 <file path=ppt/slides/slide7.xml><?xml version="1.0" encoding="utf-8"?>
-<p:sld xmlns:a="http://schemas.openxmlformats.org/drawingml/2006/main" xmlns:r="http://schemas.openxmlformats.org/officeDocument/2006/relationships" xmlns:mc="http://schemas.openxmlformats.org/markup-compatibility/2006" xmlns:mv="urn:schemas-microsoft-com:mac:vml" xmlns:p="http://schemas.openxmlformats.org/presentationml/2006/main" xmlns:c="http://schemas.openxmlformats.org/drawingml/2006/chart" xmlns:dgm="http://schemas.openxmlformats.org/drawingml/2006/diagram" xmlns:o="urn:schemas-microsoft-com:office:office" xmlns:v="urn:schemas-microsoft-com:vml" xmlns:pvml="urn:schemas-microsoft-com:office:powerpoint" xmlns:com="http://schemas.openxmlformats.org/drawingml/2006/compatibility" xmlns:p14="http://schemas.microsoft.com/office/powerpoint/2010/main" xmlns:p15="http://schemas.microsoft.com/office/powerpoint/2012/main" xmlns:ahyp="http://schemas.microsoft.com/office/drawing/2018/hyperlinkcolor">
+<p:sld xmlns:a="http://schemas.openxmlformats.org/drawingml/2006/main" xmlns:r="http://schemas.openxmlformats.org/officeDocument/2006/relationships" xmlns:p="http://schemas.openxmlformats.org/presentationml/2006/main">
   <p:cSld>
     <p:spTree>
       <p:nvGrpSpPr>
-        <p:cNvPr id="90" name="Shape 90"/>
+        <p:cNvPr id="1" name="Shape 90"/>
         <p:cNvGrpSpPr/>
         <p:nvPr/>
       </p:nvGrpSpPr>
@@ -7705,12 +7742,12 @@
           </a:ln>
         </p:spPr>
         <p:txBody>
-          <a:bodyPr anchorCtr="0" anchor="t" bIns="91425" lIns="91425" spcFirstLastPara="1" rIns="91425" wrap="square" tIns="91425">
+          <a:bodyPr spcFirstLastPara="1" wrap="square" lIns="91425" tIns="91425" rIns="91425" bIns="91425" anchor="t" anchorCtr="0">
             <a:spAutoFit/>
           </a:bodyPr>
           <a:lstStyle/>
           <a:p>
-            <a:pPr indent="0" lvl="0" marL="0" rtl="0" algn="l">
+            <a:pPr marL="0" lvl="0" indent="0" algn="l" rtl="0">
               <a:lnSpc>
                 <a:spcPct val="90000"/>
               </a:lnSpc>
@@ -7728,7 +7765,7 @@
               <a:buNone/>
             </a:pPr>
             <a:r>
-              <a:rPr b="1" lang="es" sz="3000">
+              <a:rPr lang="es" sz="3000" b="1">
                 <a:solidFill>
                   <a:srgbClr val="EC183F"/>
                 </a:solidFill>
@@ -7740,7 +7777,7 @@
               <a:t>Mesa</a:t>
             </a:r>
             <a:r>
-              <a:rPr b="1" lang="es" sz="3000">
+              <a:rPr lang="es" sz="3000" b="1">
                 <a:solidFill>
                   <a:srgbClr val="434343"/>
                 </a:solidFill>
@@ -7775,12 +7812,12 @@
           </a:ln>
         </p:spPr>
         <p:txBody>
-          <a:bodyPr anchorCtr="0" anchor="t" bIns="91425" lIns="91425" spcFirstLastPara="1" rIns="91425" wrap="square" tIns="91425">
+          <a:bodyPr spcFirstLastPara="1" wrap="square" lIns="91425" tIns="91425" rIns="91425" bIns="91425" anchor="t" anchorCtr="0">
             <a:spAutoFit/>
           </a:bodyPr>
           <a:lstStyle/>
           <a:p>
-            <a:pPr indent="0" lvl="0" marL="0" rtl="0" algn="l">
+            <a:pPr marL="0" lvl="0" indent="0" algn="l" rtl="0">
               <a:lnSpc>
                 <a:spcPct val="200000"/>
               </a:lnSpc>
@@ -7830,7 +7867,7 @@
             <a:endParaRPr/>
           </a:p>
           <a:p>
-            <a:pPr indent="0" lvl="0" marL="0" rtl="0" algn="l">
+            <a:pPr marL="0" lvl="0" indent="0" algn="l" rtl="0">
               <a:spcBef>
                 <a:spcPts val="0"/>
               </a:spcBef>
@@ -7839,9 +7876,6 @@
               </a:spcAft>
               <a:buNone/>
             </a:pPr>
-            <a:r>
-              <a:t/>
-            </a:r>
             <a:endParaRPr/>
           </a:p>
         </p:txBody>
@@ -7855,11 +7889,11 @@
 </file>
 
 <file path=ppt/slides/slide8.xml><?xml version="1.0" encoding="utf-8"?>
-<p:sld xmlns:a="http://schemas.openxmlformats.org/drawingml/2006/main" xmlns:r="http://schemas.openxmlformats.org/officeDocument/2006/relationships" xmlns:mc="http://schemas.openxmlformats.org/markup-compatibility/2006" xmlns:mv="urn:schemas-microsoft-com:mac:vml" xmlns:p="http://schemas.openxmlformats.org/presentationml/2006/main" xmlns:c="http://schemas.openxmlformats.org/drawingml/2006/chart" xmlns:dgm="http://schemas.openxmlformats.org/drawingml/2006/diagram" xmlns:o="urn:schemas-microsoft-com:office:office" xmlns:v="urn:schemas-microsoft-com:vml" xmlns:pvml="urn:schemas-microsoft-com:office:powerpoint" xmlns:com="http://schemas.openxmlformats.org/drawingml/2006/compatibility" xmlns:p14="http://schemas.microsoft.com/office/powerpoint/2010/main" xmlns:p15="http://schemas.microsoft.com/office/powerpoint/2012/main" xmlns:ahyp="http://schemas.microsoft.com/office/drawing/2018/hyperlinkcolor">
+<p:sld xmlns:a="http://schemas.openxmlformats.org/drawingml/2006/main" xmlns:r="http://schemas.openxmlformats.org/officeDocument/2006/relationships" xmlns:p="http://schemas.openxmlformats.org/presentationml/2006/main">
   <p:cSld>
     <p:spTree>
       <p:nvGrpSpPr>
-        <p:cNvPr id="96" name="Shape 96"/>
+        <p:cNvPr id="1" name="Shape 96"/>
         <p:cNvGrpSpPr/>
         <p:nvPr/>
       </p:nvGrpSpPr>
@@ -7891,12 +7925,12 @@
           </a:ln>
         </p:spPr>
         <p:txBody>
-          <a:bodyPr anchorCtr="0" anchor="t" bIns="91425" lIns="91425" spcFirstLastPara="1" rIns="91425" wrap="square" tIns="91425">
+          <a:bodyPr spcFirstLastPara="1" wrap="square" lIns="91425" tIns="91425" rIns="91425" bIns="91425" anchor="t" anchorCtr="0">
             <a:spAutoFit/>
           </a:bodyPr>
           <a:lstStyle/>
           <a:p>
-            <a:pPr indent="0" lvl="0" marL="0" rtl="0" algn="l">
+            <a:pPr marL="0" lvl="0" indent="0" algn="l" rtl="0">
               <a:lnSpc>
                 <a:spcPct val="90000"/>
               </a:lnSpc>
@@ -7914,7 +7948,7 @@
               <a:buNone/>
             </a:pPr>
             <a:r>
-              <a:rPr b="1" lang="es" sz="3000">
+              <a:rPr lang="es" sz="3000" b="1">
                 <a:solidFill>
                   <a:srgbClr val="EC183F"/>
                 </a:solidFill>
@@ -7926,7 +7960,7 @@
               <a:t>Mesa</a:t>
             </a:r>
             <a:r>
-              <a:rPr b="1" lang="es" sz="3000">
+              <a:rPr lang="es" sz="3000" b="1">
                 <a:solidFill>
                   <a:srgbClr val="434343"/>
                 </a:solidFill>
@@ -7961,12 +7995,12 @@
           </a:ln>
         </p:spPr>
         <p:txBody>
-          <a:bodyPr anchorCtr="0" anchor="t" bIns="91425" lIns="91425" spcFirstLastPara="1" rIns="91425" wrap="square" tIns="91425">
+          <a:bodyPr spcFirstLastPara="1" wrap="square" lIns="91425" tIns="91425" rIns="91425" bIns="91425" anchor="t" anchorCtr="0">
             <a:spAutoFit/>
           </a:bodyPr>
           <a:lstStyle/>
           <a:p>
-            <a:pPr indent="0" lvl="0" marL="0" rtl="0" algn="l">
+            <a:pPr marL="0" lvl="0" indent="0" algn="l" rtl="0">
               <a:lnSpc>
                 <a:spcPct val="200000"/>
               </a:lnSpc>
@@ -8016,7 +8050,7 @@
             <a:endParaRPr/>
           </a:p>
           <a:p>
-            <a:pPr indent="0" lvl="0" marL="0" rtl="0" algn="l">
+            <a:pPr marL="0" lvl="0" indent="0" algn="l" rtl="0">
               <a:spcBef>
                 <a:spcPts val="0"/>
               </a:spcBef>
@@ -8025,9 +8059,6 @@
               </a:spcAft>
               <a:buNone/>
             </a:pPr>
-            <a:r>
-              <a:t/>
-            </a:r>
             <a:endParaRPr/>
           </a:p>
         </p:txBody>
@@ -8041,11 +8072,11 @@
 </file>
 
 <file path=ppt/slides/slide9.xml><?xml version="1.0" encoding="utf-8"?>
-<p:sld xmlns:a="http://schemas.openxmlformats.org/drawingml/2006/main" xmlns:r="http://schemas.openxmlformats.org/officeDocument/2006/relationships" xmlns:mc="http://schemas.openxmlformats.org/markup-compatibility/2006" xmlns:mv="urn:schemas-microsoft-com:mac:vml" xmlns:p="http://schemas.openxmlformats.org/presentationml/2006/main" xmlns:c="http://schemas.openxmlformats.org/drawingml/2006/chart" xmlns:dgm="http://schemas.openxmlformats.org/drawingml/2006/diagram" xmlns:o="urn:schemas-microsoft-com:office:office" xmlns:v="urn:schemas-microsoft-com:vml" xmlns:pvml="urn:schemas-microsoft-com:office:powerpoint" xmlns:com="http://schemas.openxmlformats.org/drawingml/2006/compatibility" xmlns:p14="http://schemas.microsoft.com/office/powerpoint/2010/main" xmlns:p15="http://schemas.microsoft.com/office/powerpoint/2012/main" xmlns:ahyp="http://schemas.microsoft.com/office/drawing/2018/hyperlinkcolor">
+<p:sld xmlns:a="http://schemas.openxmlformats.org/drawingml/2006/main" xmlns:r="http://schemas.openxmlformats.org/officeDocument/2006/relationships" xmlns:p="http://schemas.openxmlformats.org/presentationml/2006/main">
   <p:cSld>
     <p:spTree>
       <p:nvGrpSpPr>
-        <p:cNvPr id="102" name="Shape 102"/>
+        <p:cNvPr id="1" name="Shape 102"/>
         <p:cNvGrpSpPr/>
         <p:nvPr/>
       </p:nvGrpSpPr>
@@ -8077,12 +8108,12 @@
           </a:ln>
         </p:spPr>
         <p:txBody>
-          <a:bodyPr anchorCtr="0" anchor="t" bIns="91425" lIns="91425" spcFirstLastPara="1" rIns="91425" wrap="square" tIns="91425">
+          <a:bodyPr spcFirstLastPara="1" wrap="square" lIns="91425" tIns="91425" rIns="91425" bIns="91425" anchor="t" anchorCtr="0">
             <a:spAutoFit/>
           </a:bodyPr>
           <a:lstStyle/>
           <a:p>
-            <a:pPr indent="0" lvl="0" marL="0" rtl="0" algn="l">
+            <a:pPr marL="0" lvl="0" indent="0" algn="l" rtl="0">
               <a:lnSpc>
                 <a:spcPct val="90000"/>
               </a:lnSpc>
@@ -8100,7 +8131,7 @@
               <a:buNone/>
             </a:pPr>
             <a:r>
-              <a:rPr b="1" lang="es" sz="3000">
+              <a:rPr lang="es" sz="3000" b="1">
                 <a:solidFill>
                   <a:srgbClr val="EC183F"/>
                 </a:solidFill>
@@ -8112,7 +8143,7 @@
               <a:t>Mesa</a:t>
             </a:r>
             <a:r>
-              <a:rPr b="1" lang="es" sz="3000">
+              <a:rPr lang="es" sz="3000" b="1">
                 <a:solidFill>
                   <a:srgbClr val="434343"/>
                 </a:solidFill>
@@ -8147,12 +8178,12 @@
           </a:ln>
         </p:spPr>
         <p:txBody>
-          <a:bodyPr anchorCtr="0" anchor="t" bIns="91425" lIns="91425" spcFirstLastPara="1" rIns="91425" wrap="square" tIns="91425">
+          <a:bodyPr spcFirstLastPara="1" wrap="square" lIns="91425" tIns="91425" rIns="91425" bIns="91425" anchor="t" anchorCtr="0">
             <a:spAutoFit/>
           </a:bodyPr>
           <a:lstStyle/>
           <a:p>
-            <a:pPr indent="0" lvl="0" marL="0" rtl="0" algn="l">
+            <a:pPr marL="0" lvl="0" indent="0" algn="l" rtl="0">
               <a:lnSpc>
                 <a:spcPct val="200000"/>
               </a:lnSpc>
@@ -8202,7 +8233,7 @@
             <a:endParaRPr/>
           </a:p>
           <a:p>
-            <a:pPr indent="0" lvl="0" marL="0" rtl="0" algn="l">
+            <a:pPr marL="0" lvl="0" indent="0" algn="l" rtl="0">
               <a:spcBef>
                 <a:spcPts val="0"/>
               </a:spcBef>
@@ -8211,9 +8242,6 @@
               </a:spcAft>
               <a:buNone/>
             </a:pPr>
-            <a:r>
-              <a:t/>
-            </a:r>
             <a:endParaRPr/>
           </a:p>
         </p:txBody>
@@ -8227,7 +8255,7 @@
 </file>
 
 <file path=ppt/theme/theme1.xml><?xml version="1.0" encoding="utf-8"?>
-<a:theme xmlns:a="http://schemas.openxmlformats.org/drawingml/2006/main" xmlns:r="http://schemas.openxmlformats.org/officeDocument/2006/relationships" name="Simple Light">
+<a:theme xmlns:a="http://schemas.openxmlformats.org/drawingml/2006/main" name="Simple Light">
   <a:themeElements>
     <a:clrScheme name="Simple Light">
       <a:dk1>
@@ -8502,11 +8530,13 @@
       </a:bgFillStyleLst>
     </a:fmtScheme>
   </a:themeElements>
+  <a:objectDefaults/>
+  <a:extraClrSchemeLst/>
 </a:theme>
 </file>
 
 <file path=ppt/theme/theme2.xml><?xml version="1.0" encoding="utf-8"?>
-<a:theme xmlns:a="http://schemas.openxmlformats.org/drawingml/2006/main" xmlns:r="http://schemas.openxmlformats.org/officeDocument/2006/relationships">
+<a:theme xmlns:a="http://schemas.openxmlformats.org/drawingml/2006/main">
   <a:themeElements>
     <a:clrScheme name="Default">
       <a:dk1>
@@ -8781,5 +8811,7 @@
       </a:bgFillStyleLst>
     </a:fmtScheme>
   </a:themeElements>
+  <a:objectDefaults/>
+  <a:extraClrSchemeLst/>
 </a:theme>
 </file>
</xml_diff>

<commit_message>
actividad 25 parte 1 completada G6
</commit_message>
<xml_diff>
--- a/Clase 25 - Seguriddad/Consignas/C25 - Actividad Seguridad y Auditoria ( Copiar 1 x camada - tiene 11 mesas).pptx
+++ b/Clase 25 - Seguriddad/Consignas/C25 - Actividad Seguridad y Auditoria ( Copiar 1 x camada - tiene 11 mesas).pptx
@@ -1691,7 +1691,7 @@
         </p:nvSpPr>
         <p:spPr>
           <a:xfrm>
-            <a:off x="381300" y="685800"/>
+            <a:off x="381000" y="685800"/>
             <a:ext cx="6096000" cy="3429000"/>
           </a:xfrm>
           <a:custGeom>
@@ -7753,7 +7753,7 @@
         </p:nvSpPr>
         <p:spPr>
           <a:xfrm>
-            <a:off x="766075" y="174875"/>
+            <a:off x="766075" y="198123"/>
             <a:ext cx="5927700" cy="600300"/>
           </a:xfrm>
           <a:prstGeom prst="rect">
@@ -7824,7 +7824,7 @@
         <p:spPr>
           <a:xfrm>
             <a:off x="766075" y="1203800"/>
-            <a:ext cx="7633200" cy="1385400"/>
+            <a:ext cx="7633200" cy="2862292"/>
           </a:xfrm>
           <a:prstGeom prst="rect">
             <a:avLst/>
@@ -7840,20 +7840,13 @@
           </a:bodyPr>
           <a:lstStyle/>
           <a:p>
-            <a:pPr marL="0" lvl="0" indent="0" algn="l" rtl="0">
+            <a:pPr lvl="0">
               <a:lnSpc>
                 <a:spcPct val="200000"/>
               </a:lnSpc>
-              <a:spcBef>
-                <a:spcPts val="0"/>
-              </a:spcBef>
-              <a:spcAft>
-                <a:spcPts val="0"/>
-              </a:spcAft>
-              <a:buNone/>
             </a:pPr>
             <a:r>
-              <a:rPr lang="es" sz="1600">
+              <a:rPr lang="es" sz="1600" dirty="0">
                 <a:solidFill>
                   <a:srgbClr val="3F3F3F"/>
                 </a:solidFill>
@@ -7862,10 +7855,130 @@
                 <a:cs typeface="Open Sans"/>
                 <a:sym typeface="Open Sans"/>
               </a:rPr>
-              <a:t>Mesa 6 - Plan de seguridad : &lt;Poner el link&gt;</a:t>
+              <a:t>Mesa 6 - Plan de seguridad : &lt;</a:t>
+            </a:r>
+            <a:r>
+              <a:rPr lang="es-US" sz="1600" dirty="0">
+                <a:solidFill>
+                  <a:srgbClr val="3F3F3F"/>
+                </a:solidFill>
+                <a:latin typeface="Open Sans"/>
+                <a:ea typeface="Open Sans"/>
+                <a:cs typeface="Open Sans"/>
+                <a:sym typeface="Open Sans"/>
+              </a:rPr>
+              <a:t>https://</a:t>
+            </a:r>
+            <a:r>
+              <a:rPr lang="es-US" sz="1600" dirty="0" err="1">
+                <a:solidFill>
+                  <a:srgbClr val="3F3F3F"/>
+                </a:solidFill>
+                <a:latin typeface="Open Sans"/>
+                <a:ea typeface="Open Sans"/>
+                <a:cs typeface="Open Sans"/>
+                <a:sym typeface="Open Sans"/>
+              </a:rPr>
+              <a:t>docs.google.com</a:t>
+            </a:r>
+            <a:r>
+              <a:rPr lang="es-US" sz="1600" dirty="0">
+                <a:solidFill>
+                  <a:srgbClr val="3F3F3F"/>
+                </a:solidFill>
+                <a:latin typeface="Open Sans"/>
+                <a:ea typeface="Open Sans"/>
+                <a:cs typeface="Open Sans"/>
+                <a:sym typeface="Open Sans"/>
+              </a:rPr>
+              <a:t>/</a:t>
+            </a:r>
+            <a:r>
+              <a:rPr lang="es-US" sz="1600" dirty="0" err="1">
+                <a:solidFill>
+                  <a:srgbClr val="3F3F3F"/>
+                </a:solidFill>
+                <a:latin typeface="Open Sans"/>
+                <a:ea typeface="Open Sans"/>
+                <a:cs typeface="Open Sans"/>
+                <a:sym typeface="Open Sans"/>
+              </a:rPr>
+              <a:t>document</a:t>
+            </a:r>
+            <a:r>
+              <a:rPr lang="es-US" sz="1600" dirty="0">
+                <a:solidFill>
+                  <a:srgbClr val="3F3F3F"/>
+                </a:solidFill>
+                <a:latin typeface="Open Sans"/>
+                <a:ea typeface="Open Sans"/>
+                <a:cs typeface="Open Sans"/>
+                <a:sym typeface="Open Sans"/>
+              </a:rPr>
+              <a:t>/d/1GNoKqVkV3AMRjbAFpSAaH0XXYK6AH212ADJwp8VFu0I/</a:t>
+            </a:r>
+            <a:r>
+              <a:rPr lang="es-US" sz="1600" dirty="0" err="1">
+                <a:solidFill>
+                  <a:srgbClr val="3F3F3F"/>
+                </a:solidFill>
+                <a:latin typeface="Open Sans"/>
+                <a:ea typeface="Open Sans"/>
+                <a:cs typeface="Open Sans"/>
+                <a:sym typeface="Open Sans"/>
+              </a:rPr>
+              <a:t>edit?userstoinvite</a:t>
+            </a:r>
+            <a:r>
+              <a:rPr lang="es-US" sz="1600" dirty="0">
+                <a:solidFill>
+                  <a:srgbClr val="3F3F3F"/>
+                </a:solidFill>
+                <a:latin typeface="Open Sans"/>
+                <a:ea typeface="Open Sans"/>
+                <a:cs typeface="Open Sans"/>
+                <a:sym typeface="Open Sans"/>
+              </a:rPr>
+              <a:t>=</a:t>
+            </a:r>
+            <a:r>
+              <a:rPr lang="es-US" sz="1600" dirty="0" err="1">
+                <a:solidFill>
+                  <a:srgbClr val="3F3F3F"/>
+                </a:solidFill>
+                <a:latin typeface="Open Sans"/>
+                <a:ea typeface="Open Sans"/>
+                <a:cs typeface="Open Sans"/>
+                <a:sym typeface="Open Sans"/>
+              </a:rPr>
+              <a:t>santiagogiuggia@gmail.com&amp;actionButton</a:t>
+            </a:r>
+            <a:r>
+              <a:rPr lang="es-US" sz="1600" dirty="0">
+                <a:solidFill>
+                  <a:srgbClr val="3F3F3F"/>
+                </a:solidFill>
+                <a:latin typeface="Open Sans"/>
+                <a:ea typeface="Open Sans"/>
+                <a:cs typeface="Open Sans"/>
+                <a:sym typeface="Open Sans"/>
+              </a:rPr>
+              <a:t>=1</a:t>
+            </a:r>
+            <a:r>
+              <a:rPr lang="es" sz="1600" dirty="0">
+                <a:solidFill>
+                  <a:srgbClr val="3F3F3F"/>
+                </a:solidFill>
+                <a:latin typeface="Open Sans"/>
+                <a:ea typeface="Open Sans"/>
+                <a:cs typeface="Open Sans"/>
+                <a:sym typeface="Open Sans"/>
+              </a:rPr>
+              <a:t>&gt;</a:t>
             </a:r>
             <a:br>
-              <a:rPr lang="es" sz="1600">
+              <a:rPr lang="es" sz="1600" dirty="0">
                 <a:solidFill>
                   <a:srgbClr val="3F3F3F"/>
                 </a:solidFill>
@@ -7876,7 +7989,7 @@
               </a:rPr>
             </a:br>
             <a:r>
-              <a:rPr lang="es" sz="1600">
+              <a:rPr lang="es" sz="1600" dirty="0">
                 <a:solidFill>
                   <a:srgbClr val="3F3F3F"/>
                 </a:solidFill>
@@ -7887,7 +8000,7 @@
               </a:rPr>
               <a:t>Mesa 7 - Auditoría del plan de Seguridad :   &lt;Poner el link&gt;</a:t>
             </a:r>
-            <a:endParaRPr/>
+            <a:endParaRPr dirty="0"/>
           </a:p>
           <a:p>
             <a:pPr marL="0" lvl="0" indent="0" algn="l" rtl="0">
@@ -7899,7 +8012,7 @@
               </a:spcAft>
               <a:buNone/>
             </a:pPr>
-            <a:endParaRPr/>
+            <a:endParaRPr dirty="0"/>
           </a:p>
         </p:txBody>
       </p:sp>

</xml_diff>